<commit_message>
go up JSONForMyClinics to index.js
</commit_message>
<xml_diff>
--- a/clinics-app/Schema.pptx
+++ b/clinics-app/Schema.pptx
@@ -259,7 +259,7 @@
           <a:p>
             <a:fld id="{4A64690F-3CBF-4494-BFED-D4DEA9C297BB}" type="datetimeFigureOut">
               <a:rPr lang="ru-RU" smtClean="0"/>
-              <a:t>01.08.2023</a:t>
+              <a:t>02.08.2023</a:t>
             </a:fld>
             <a:endParaRPr lang="ru-RU"/>
           </a:p>
@@ -457,7 +457,7 @@
           <a:p>
             <a:fld id="{4A64690F-3CBF-4494-BFED-D4DEA9C297BB}" type="datetimeFigureOut">
               <a:rPr lang="ru-RU" smtClean="0"/>
-              <a:t>01.08.2023</a:t>
+              <a:t>02.08.2023</a:t>
             </a:fld>
             <a:endParaRPr lang="ru-RU"/>
           </a:p>
@@ -665,7 +665,7 @@
           <a:p>
             <a:fld id="{4A64690F-3CBF-4494-BFED-D4DEA9C297BB}" type="datetimeFigureOut">
               <a:rPr lang="ru-RU" smtClean="0"/>
-              <a:t>01.08.2023</a:t>
+              <a:t>02.08.2023</a:t>
             </a:fld>
             <a:endParaRPr lang="ru-RU"/>
           </a:p>
@@ -863,7 +863,7 @@
           <a:p>
             <a:fld id="{4A64690F-3CBF-4494-BFED-D4DEA9C297BB}" type="datetimeFigureOut">
               <a:rPr lang="ru-RU" smtClean="0"/>
-              <a:t>01.08.2023</a:t>
+              <a:t>02.08.2023</a:t>
             </a:fld>
             <a:endParaRPr lang="ru-RU"/>
           </a:p>
@@ -1138,7 +1138,7 @@
           <a:p>
             <a:fld id="{4A64690F-3CBF-4494-BFED-D4DEA9C297BB}" type="datetimeFigureOut">
               <a:rPr lang="ru-RU" smtClean="0"/>
-              <a:t>01.08.2023</a:t>
+              <a:t>02.08.2023</a:t>
             </a:fld>
             <a:endParaRPr lang="ru-RU"/>
           </a:p>
@@ -1403,7 +1403,7 @@
           <a:p>
             <a:fld id="{4A64690F-3CBF-4494-BFED-D4DEA9C297BB}" type="datetimeFigureOut">
               <a:rPr lang="ru-RU" smtClean="0"/>
-              <a:t>01.08.2023</a:t>
+              <a:t>02.08.2023</a:t>
             </a:fld>
             <a:endParaRPr lang="ru-RU"/>
           </a:p>
@@ -1815,7 +1815,7 @@
           <a:p>
             <a:fld id="{4A64690F-3CBF-4494-BFED-D4DEA9C297BB}" type="datetimeFigureOut">
               <a:rPr lang="ru-RU" smtClean="0"/>
-              <a:t>01.08.2023</a:t>
+              <a:t>02.08.2023</a:t>
             </a:fld>
             <a:endParaRPr lang="ru-RU"/>
           </a:p>
@@ -1956,7 +1956,7 @@
           <a:p>
             <a:fld id="{4A64690F-3CBF-4494-BFED-D4DEA9C297BB}" type="datetimeFigureOut">
               <a:rPr lang="ru-RU" smtClean="0"/>
-              <a:t>01.08.2023</a:t>
+              <a:t>02.08.2023</a:t>
             </a:fld>
             <a:endParaRPr lang="ru-RU"/>
           </a:p>
@@ -2069,7 +2069,7 @@
           <a:p>
             <a:fld id="{4A64690F-3CBF-4494-BFED-D4DEA9C297BB}" type="datetimeFigureOut">
               <a:rPr lang="ru-RU" smtClean="0"/>
-              <a:t>01.08.2023</a:t>
+              <a:t>02.08.2023</a:t>
             </a:fld>
             <a:endParaRPr lang="ru-RU"/>
           </a:p>
@@ -2380,7 +2380,7 @@
           <a:p>
             <a:fld id="{4A64690F-3CBF-4494-BFED-D4DEA9C297BB}" type="datetimeFigureOut">
               <a:rPr lang="ru-RU" smtClean="0"/>
-              <a:t>01.08.2023</a:t>
+              <a:t>02.08.2023</a:t>
             </a:fld>
             <a:endParaRPr lang="ru-RU"/>
           </a:p>
@@ -2668,7 +2668,7 @@
           <a:p>
             <a:fld id="{4A64690F-3CBF-4494-BFED-D4DEA9C297BB}" type="datetimeFigureOut">
               <a:rPr lang="ru-RU" smtClean="0"/>
-              <a:t>01.08.2023</a:t>
+              <a:t>02.08.2023</a:t>
             </a:fld>
             <a:endParaRPr lang="ru-RU"/>
           </a:p>
@@ -2909,7 +2909,7 @@
           <a:p>
             <a:fld id="{4A64690F-3CBF-4494-BFED-D4DEA9C297BB}" type="datetimeFigureOut">
               <a:rPr lang="ru-RU" smtClean="0"/>
-              <a:t>01.08.2023</a:t>
+              <a:t>02.08.2023</a:t>
             </a:fld>
             <a:endParaRPr lang="ru-RU"/>
           </a:p>
@@ -4203,7 +4203,7 @@
         <p:spPr>
           <a:xfrm>
             <a:off x="7360262" y="4768863"/>
-            <a:ext cx="1656515" cy="923330"/>
+            <a:ext cx="1783737" cy="923330"/>
           </a:xfrm>
           <a:prstGeom prst="rect">
             <a:avLst/>
@@ -4231,19 +4231,18 @@
           <a:p>
             <a:pPr algn="ctr"/>
             <a:r>
-              <a:rPr lang="en-US" b="0" dirty="0">
+              <a:rPr lang="en-US" dirty="0">
                 <a:solidFill>
-                  <a:srgbClr val="569CD6"/>
+                  <a:schemeClr val="tx1"/>
                 </a:solidFill>
-                <a:effectLst/>
                 <a:latin typeface="Consolas" panose="020B0609020204030204" pitchFamily="49" charset="0"/>
               </a:rPr>
-              <a:t>{</a:t>
+              <a:t>&lt;</a:t>
             </a:r>
             <a:r>
               <a:rPr lang="en-US" b="0" dirty="0" err="1">
                 <a:solidFill>
-                  <a:srgbClr val="DCDCAA"/>
+                  <a:schemeClr val="tx1"/>
                 </a:solidFill>
                 <a:effectLst/>
                 <a:latin typeface="Consolas" panose="020B0609020204030204" pitchFamily="49" charset="0"/>
@@ -4253,60 +4252,35 @@
             <a:r>
               <a:rPr lang="en-US" b="0" dirty="0">
                 <a:solidFill>
-                  <a:srgbClr val="569CD6"/>
+                  <a:schemeClr val="tx1"/>
                 </a:solidFill>
                 <a:effectLst/>
                 <a:latin typeface="Consolas" panose="020B0609020204030204" pitchFamily="49" charset="0"/>
               </a:rPr>
-              <a:t>}</a:t>
-            </a:r>
-            <a:endParaRPr lang="en-US" b="0" dirty="0">
-              <a:solidFill>
-                <a:srgbClr val="CCCCCC"/>
-              </a:solidFill>
-              <a:effectLst/>
-              <a:latin typeface="Consolas" panose="020B0609020204030204" pitchFamily="49" charset="0"/>
-            </a:endParaRPr>
+              <a:t> /&gt;</a:t>
+            </a:r>
           </a:p>
           <a:p>
             <a:pPr algn="ctr"/>
+            <a:r>
+              <a:rPr lang="en-US" dirty="0">
+                <a:solidFill>
+                  <a:schemeClr val="tx1"/>
+                </a:solidFill>
+                <a:latin typeface="Consolas" panose="020B0609020204030204" pitchFamily="49" charset="0"/>
+              </a:rPr>
+              <a:t>&lt;</a:t>
+            </a:r>
             <a:r>
               <a:rPr lang="en-US" b="0" dirty="0">
                 <a:solidFill>
-                  <a:srgbClr val="569CD6"/>
+                  <a:schemeClr val="tx1"/>
                 </a:solidFill>
                 <a:effectLst/>
                 <a:latin typeface="Consolas" panose="020B0609020204030204" pitchFamily="49" charset="0"/>
               </a:rPr>
-              <a:t>{</a:t>
-            </a:r>
-            <a:r>
-              <a:rPr lang="en-US" b="0" dirty="0">
-                <a:solidFill>
-                  <a:srgbClr val="DCDCAA"/>
-                </a:solidFill>
-                <a:effectLst/>
-                <a:latin typeface="Consolas" panose="020B0609020204030204" pitchFamily="49" charset="0"/>
-              </a:rPr>
-              <a:t>Claims</a:t>
-            </a:r>
-            <a:r>
-              <a:rPr lang="en-US" b="0" dirty="0">
-                <a:solidFill>
-                  <a:srgbClr val="569CD6"/>
-                </a:solidFill>
-                <a:effectLst/>
-                <a:latin typeface="Consolas" panose="020B0609020204030204" pitchFamily="49" charset="0"/>
-              </a:rPr>
-              <a:t>}</a:t>
-            </a:r>
-            <a:endParaRPr lang="en-US" b="0" dirty="0">
-              <a:solidFill>
-                <a:srgbClr val="CCCCCC"/>
-              </a:solidFill>
-              <a:effectLst/>
-              <a:latin typeface="Consolas" panose="020B0609020204030204" pitchFamily="49" charset="0"/>
-            </a:endParaRPr>
+              <a:t>Claims /&gt;</a:t>
+            </a:r>
           </a:p>
           <a:p>
             <a:pPr algn="ctr"/>
@@ -4379,6 +4353,120 @@
           <a:xfrm>
             <a:off x="8274649" y="4494951"/>
             <a:ext cx="0" cy="265273"/>
+          </a:xfrm>
+          <a:prstGeom prst="straightConnector1">
+            <a:avLst/>
+          </a:prstGeom>
+          <a:ln>
+            <a:tailEnd type="triangle"/>
+          </a:ln>
+        </p:spPr>
+        <p:style>
+          <a:lnRef idx="1">
+            <a:schemeClr val="accent1"/>
+          </a:lnRef>
+          <a:fillRef idx="0">
+            <a:schemeClr val="accent1"/>
+          </a:fillRef>
+          <a:effectRef idx="0">
+            <a:schemeClr val="accent1"/>
+          </a:effectRef>
+          <a:fontRef idx="minor">
+            <a:schemeClr val="tx1"/>
+          </a:fontRef>
+        </p:style>
+      </p:cxnSp>
+      <p:sp>
+        <p:nvSpPr>
+          <p:cNvPr id="2" name="TextBox 1">
+            <a:extLst>
+              <a:ext uri="{FF2B5EF4-FFF2-40B4-BE49-F238E27FC236}">
+                <a16:creationId xmlns:a16="http://schemas.microsoft.com/office/drawing/2014/main" id="{D91FA4F4-9D4F-976C-F5F4-E47A4A404A3C}"/>
+              </a:ext>
+            </a:extLst>
+          </p:cNvPr>
+          <p:cNvSpPr txBox="1"/>
+          <p:nvPr/>
+        </p:nvSpPr>
+        <p:spPr>
+          <a:xfrm>
+            <a:off x="1671220" y="148579"/>
+            <a:ext cx="1920782" cy="1200329"/>
+          </a:xfrm>
+          <a:prstGeom prst="rect">
+            <a:avLst/>
+          </a:prstGeom>
+        </p:spPr>
+        <p:style>
+          <a:lnRef idx="2">
+            <a:schemeClr val="accent2"/>
+          </a:lnRef>
+          <a:fillRef idx="1">
+            <a:schemeClr val="lt1"/>
+          </a:fillRef>
+          <a:effectRef idx="0">
+            <a:schemeClr val="accent2"/>
+          </a:effectRef>
+          <a:fontRef idx="minor">
+            <a:schemeClr val="dk1"/>
+          </a:fontRef>
+        </p:style>
+        <p:txBody>
+          <a:bodyPr wrap="none" rtlCol="0">
+            <a:spAutoFit/>
+          </a:bodyPr>
+          <a:lstStyle/>
+          <a:p>
+            <a:r>
+              <a:rPr lang="en-US" b="1" dirty="0"/>
+              <a:t>Some data</a:t>
+            </a:r>
+          </a:p>
+          <a:p>
+            <a:r>
+              <a:rPr lang="en-US" dirty="0" err="1"/>
+              <a:t>navItems</a:t>
+            </a:r>
+            <a:r>
+              <a:rPr lang="en-US" dirty="0"/>
+              <a:t>, </a:t>
+            </a:r>
+          </a:p>
+          <a:p>
+            <a:r>
+              <a:rPr lang="en-US" dirty="0" err="1"/>
+              <a:t>JSONForMyClinics</a:t>
+            </a:r>
+            <a:r>
+              <a:rPr lang="en-US" dirty="0"/>
+              <a:t>,</a:t>
+            </a:r>
+          </a:p>
+          <a:p>
+            <a:r>
+              <a:rPr lang="en-US" dirty="0"/>
+              <a:t>…..</a:t>
+            </a:r>
+            <a:endParaRPr lang="ru-RU" dirty="0"/>
+          </a:p>
+        </p:txBody>
+      </p:sp>
+      <p:cxnSp>
+        <p:nvCxnSpPr>
+          <p:cNvPr id="12" name="Прямая со стрелкой 11">
+            <a:extLst>
+              <a:ext uri="{FF2B5EF4-FFF2-40B4-BE49-F238E27FC236}">
+                <a16:creationId xmlns:a16="http://schemas.microsoft.com/office/drawing/2014/main" id="{FA422340-209A-BE2C-47C0-8F3E260062E9}"/>
+              </a:ext>
+            </a:extLst>
+          </p:cNvPr>
+          <p:cNvCxnSpPr/>
+          <p:nvPr/>
+        </p:nvCxnSpPr>
+        <p:spPr>
+          <a:xfrm>
+            <a:off x="3816626" y="343692"/>
+            <a:ext cx="1519362" cy="0"/>
           </a:xfrm>
           <a:prstGeom prst="straightConnector1">
             <a:avLst/>

</xml_diff>

<commit_message>
add tests props and functions
</commit_message>
<xml_diff>
--- a/clinics-app/Schema.pptx
+++ b/clinics-app/Schema.pptx
@@ -3645,7 +3645,7 @@
         <p:spPr>
           <a:xfrm>
             <a:off x="6280200" y="3187333"/>
-            <a:ext cx="3684098" cy="646331"/>
+            <a:ext cx="3684098" cy="923330"/>
           </a:xfrm>
           <a:prstGeom prst="rect">
             <a:avLst/>
@@ -3670,6 +3670,26 @@
             <a:spAutoFit/>
           </a:bodyPr>
           <a:lstStyle/>
+          <a:p>
+            <a:pPr algn="ctr"/>
+            <a:r>
+              <a:rPr lang="en-US" b="0" dirty="0">
+                <a:solidFill>
+                  <a:schemeClr val="tx1"/>
+                </a:solidFill>
+                <a:effectLst/>
+                <a:latin typeface="Consolas" panose="020B0609020204030204" pitchFamily="49" charset="0"/>
+              </a:rPr>
+              <a:t>Pages</a:t>
+            </a:r>
+            <a:endParaRPr lang="ru-RU" b="0" dirty="0">
+              <a:solidFill>
+                <a:schemeClr val="tx1"/>
+              </a:solidFill>
+              <a:effectLst/>
+              <a:latin typeface="Consolas" panose="020B0609020204030204" pitchFamily="49" charset="0"/>
+            </a:endParaRPr>
+          </a:p>
           <a:p>
             <a:pPr algn="ctr"/>
             <a:r>
@@ -3899,7 +3919,7 @@
         </p:nvSpPr>
         <p:spPr>
           <a:xfrm>
-            <a:off x="7293991" y="4098937"/>
+            <a:off x="7349650" y="4318301"/>
             <a:ext cx="1656515" cy="369332"/>
           </a:xfrm>
           <a:prstGeom prst="rect">
@@ -4070,15 +4090,14 @@
           </p:cNvPr>
           <p:cNvCxnSpPr>
             <a:cxnSpLocks/>
-            <a:stCxn id="8" idx="2"/>
             <a:endCxn id="11" idx="0"/>
           </p:cNvCxnSpPr>
           <p:nvPr/>
         </p:nvCxnSpPr>
         <p:spPr>
-          <a:xfrm>
-            <a:off x="8122249" y="3833664"/>
-            <a:ext cx="0" cy="265273"/>
+          <a:xfrm flipH="1">
+            <a:off x="8177908" y="4110663"/>
+            <a:ext cx="298182" cy="207638"/>
           </a:xfrm>
           <a:prstGeom prst="straightConnector1">
             <a:avLst/>
@@ -4202,7 +4221,7 @@
         </p:nvSpPr>
         <p:spPr>
           <a:xfrm>
-            <a:off x="7360262" y="4768863"/>
+            <a:off x="7415921" y="4988227"/>
             <a:ext cx="1783737" cy="923330"/>
           </a:xfrm>
           <a:prstGeom prst="rect">
@@ -4351,7 +4370,7 @@
         </p:nvCxnSpPr>
         <p:spPr>
           <a:xfrm>
-            <a:off x="8274649" y="4494951"/>
+            <a:off x="8330308" y="4714315"/>
             <a:ext cx="0" cy="265273"/>
           </a:xfrm>
           <a:prstGeom prst="straightConnector1">
@@ -4419,7 +4438,7 @@
           <a:p>
             <a:r>
               <a:rPr lang="en-US" b="1" dirty="0"/>
-              <a:t>Some data</a:t>
+              <a:t>DATA &amp; Functions</a:t>
             </a:r>
           </a:p>
           <a:p>

</xml_diff>

<commit_message>
add new data to Schema
</commit_message>
<xml_diff>
--- a/clinics-app/Schema.pptx
+++ b/clinics-app/Schema.pptx
@@ -259,7 +259,7 @@
           <a:p>
             <a:fld id="{4A64690F-3CBF-4494-BFED-D4DEA9C297BB}" type="datetimeFigureOut">
               <a:rPr lang="ru-RU" smtClean="0"/>
-              <a:t>02.08.2023</a:t>
+              <a:t>04.08.2023</a:t>
             </a:fld>
             <a:endParaRPr lang="ru-RU"/>
           </a:p>
@@ -457,7 +457,7 @@
           <a:p>
             <a:fld id="{4A64690F-3CBF-4494-BFED-D4DEA9C297BB}" type="datetimeFigureOut">
               <a:rPr lang="ru-RU" smtClean="0"/>
-              <a:t>02.08.2023</a:t>
+              <a:t>04.08.2023</a:t>
             </a:fld>
             <a:endParaRPr lang="ru-RU"/>
           </a:p>
@@ -665,7 +665,7 @@
           <a:p>
             <a:fld id="{4A64690F-3CBF-4494-BFED-D4DEA9C297BB}" type="datetimeFigureOut">
               <a:rPr lang="ru-RU" smtClean="0"/>
-              <a:t>02.08.2023</a:t>
+              <a:t>04.08.2023</a:t>
             </a:fld>
             <a:endParaRPr lang="ru-RU"/>
           </a:p>
@@ -863,7 +863,7 @@
           <a:p>
             <a:fld id="{4A64690F-3CBF-4494-BFED-D4DEA9C297BB}" type="datetimeFigureOut">
               <a:rPr lang="ru-RU" smtClean="0"/>
-              <a:t>02.08.2023</a:t>
+              <a:t>04.08.2023</a:t>
             </a:fld>
             <a:endParaRPr lang="ru-RU"/>
           </a:p>
@@ -1138,7 +1138,7 @@
           <a:p>
             <a:fld id="{4A64690F-3CBF-4494-BFED-D4DEA9C297BB}" type="datetimeFigureOut">
               <a:rPr lang="ru-RU" smtClean="0"/>
-              <a:t>02.08.2023</a:t>
+              <a:t>04.08.2023</a:t>
             </a:fld>
             <a:endParaRPr lang="ru-RU"/>
           </a:p>
@@ -1403,7 +1403,7 @@
           <a:p>
             <a:fld id="{4A64690F-3CBF-4494-BFED-D4DEA9C297BB}" type="datetimeFigureOut">
               <a:rPr lang="ru-RU" smtClean="0"/>
-              <a:t>02.08.2023</a:t>
+              <a:t>04.08.2023</a:t>
             </a:fld>
             <a:endParaRPr lang="ru-RU"/>
           </a:p>
@@ -1815,7 +1815,7 @@
           <a:p>
             <a:fld id="{4A64690F-3CBF-4494-BFED-D4DEA9C297BB}" type="datetimeFigureOut">
               <a:rPr lang="ru-RU" smtClean="0"/>
-              <a:t>02.08.2023</a:t>
+              <a:t>04.08.2023</a:t>
             </a:fld>
             <a:endParaRPr lang="ru-RU"/>
           </a:p>
@@ -1956,7 +1956,7 @@
           <a:p>
             <a:fld id="{4A64690F-3CBF-4494-BFED-D4DEA9C297BB}" type="datetimeFigureOut">
               <a:rPr lang="ru-RU" smtClean="0"/>
-              <a:t>02.08.2023</a:t>
+              <a:t>04.08.2023</a:t>
             </a:fld>
             <a:endParaRPr lang="ru-RU"/>
           </a:p>
@@ -2069,7 +2069,7 @@
           <a:p>
             <a:fld id="{4A64690F-3CBF-4494-BFED-D4DEA9C297BB}" type="datetimeFigureOut">
               <a:rPr lang="ru-RU" smtClean="0"/>
-              <a:t>02.08.2023</a:t>
+              <a:t>04.08.2023</a:t>
             </a:fld>
             <a:endParaRPr lang="ru-RU"/>
           </a:p>
@@ -2380,7 +2380,7 @@
           <a:p>
             <a:fld id="{4A64690F-3CBF-4494-BFED-D4DEA9C297BB}" type="datetimeFigureOut">
               <a:rPr lang="ru-RU" smtClean="0"/>
-              <a:t>02.08.2023</a:t>
+              <a:t>04.08.2023</a:t>
             </a:fld>
             <a:endParaRPr lang="ru-RU"/>
           </a:p>
@@ -2668,7 +2668,7 @@
           <a:p>
             <a:fld id="{4A64690F-3CBF-4494-BFED-D4DEA9C297BB}" type="datetimeFigureOut">
               <a:rPr lang="ru-RU" smtClean="0"/>
-              <a:t>02.08.2023</a:t>
+              <a:t>04.08.2023</a:t>
             </a:fld>
             <a:endParaRPr lang="ru-RU"/>
           </a:p>
@@ -2909,7 +2909,7 @@
           <a:p>
             <a:fld id="{4A64690F-3CBF-4494-BFED-D4DEA9C297BB}" type="datetimeFigureOut">
               <a:rPr lang="ru-RU" smtClean="0"/>
-              <a:t>02.08.2023</a:t>
+              <a:t>04.08.2023</a:t>
             </a:fld>
             <a:endParaRPr lang="ru-RU"/>
           </a:p>
@@ -3340,8 +3340,8 @@
         </p:nvSpPr>
         <p:spPr>
           <a:xfrm>
-            <a:off x="5646751" y="159026"/>
-            <a:ext cx="898497" cy="369332"/>
+            <a:off x="7004105" y="1201878"/>
+            <a:ext cx="2201186" cy="646331"/>
           </a:xfrm>
           <a:prstGeom prst="rect">
             <a:avLst/>
@@ -3367,6 +3367,18 @@
           </a:bodyPr>
           <a:lstStyle/>
           <a:p>
+            <a:pPr algn="ctr"/>
+            <a:r>
+              <a:rPr lang="en-US" b="1" dirty="0"/>
+              <a:t>UI (</a:t>
+            </a:r>
+            <a:r>
+              <a:rPr lang="ru-RU" b="1" dirty="0"/>
+              <a:t>интерфейс)</a:t>
+            </a:r>
+          </a:p>
+          <a:p>
+            <a:pPr algn="ctr"/>
             <a:r>
               <a:rPr lang="en-US" dirty="0"/>
               <a:t>Index.js</a:t>
@@ -3389,7 +3401,7 @@
         </p:nvSpPr>
         <p:spPr>
           <a:xfrm>
-            <a:off x="5648082" y="748744"/>
+            <a:off x="7699519" y="2092514"/>
             <a:ext cx="898497" cy="369332"/>
           </a:xfrm>
           <a:prstGeom prst="rect">
@@ -3439,7 +3451,7 @@
         </p:nvSpPr>
         <p:spPr>
           <a:xfrm>
-            <a:off x="4003482" y="1410034"/>
+            <a:off x="6054919" y="2753804"/>
             <a:ext cx="4321529" cy="646331"/>
           </a:xfrm>
           <a:prstGeom prst="rect">
@@ -3594,7 +3606,7 @@
         </p:nvSpPr>
         <p:spPr>
           <a:xfrm>
-            <a:off x="2830678" y="3187333"/>
+            <a:off x="4882115" y="4531103"/>
             <a:ext cx="1315934" cy="369332"/>
           </a:xfrm>
           <a:prstGeom prst="rect">
@@ -3644,7 +3656,7 @@
         </p:nvSpPr>
         <p:spPr>
           <a:xfrm>
-            <a:off x="6280200" y="3187333"/>
+            <a:off x="8331637" y="4531103"/>
             <a:ext cx="3684098" cy="923330"/>
           </a:xfrm>
           <a:prstGeom prst="rect">
@@ -3819,7 +3831,7 @@
         </p:nvSpPr>
         <p:spPr>
           <a:xfrm>
-            <a:off x="4415629" y="3187333"/>
+            <a:off x="6467066" y="4531103"/>
             <a:ext cx="1315934" cy="369332"/>
           </a:xfrm>
           <a:prstGeom prst="rect">
@@ -3869,7 +3881,7 @@
         </p:nvSpPr>
         <p:spPr>
           <a:xfrm>
-            <a:off x="5335988" y="2300670"/>
+            <a:off x="7387425" y="3644440"/>
             <a:ext cx="1656515" cy="369332"/>
           </a:xfrm>
           <a:prstGeom prst="rect">
@@ -3919,7 +3931,7 @@
         </p:nvSpPr>
         <p:spPr>
           <a:xfrm>
-            <a:off x="7349650" y="4318301"/>
+            <a:off x="7229061" y="5725526"/>
             <a:ext cx="1656515" cy="369332"/>
           </a:xfrm>
           <a:prstGeom prst="rect">
@@ -3965,14 +3977,14 @@
             </a:extLst>
           </p:cNvPr>
           <p:cNvCxnSpPr>
-            <a:stCxn id="4" idx="2"/>
+            <a:cxnSpLocks/>
             <a:endCxn id="5" idx="0"/>
           </p:cNvCxnSpPr>
           <p:nvPr/>
         </p:nvCxnSpPr>
         <p:spPr>
           <a:xfrm>
-            <a:off x="6096000" y="528358"/>
+            <a:off x="8147437" y="1872128"/>
             <a:ext cx="1331" cy="220386"/>
           </a:xfrm>
           <a:prstGeom prst="straightConnector1">
@@ -4011,7 +4023,7 @@
         </p:nvCxnSpPr>
         <p:spPr>
           <a:xfrm>
-            <a:off x="6105279" y="1133982"/>
+            <a:off x="8156716" y="2477752"/>
             <a:ext cx="1331" cy="220386"/>
           </a:xfrm>
           <a:prstGeom prst="straightConnector1">
@@ -4054,7 +4066,7 @@
         </p:nvCxnSpPr>
         <p:spPr>
           <a:xfrm flipH="1">
-            <a:off x="6164246" y="2056365"/>
+            <a:off x="8215683" y="3400135"/>
             <a:ext cx="1" cy="244305"/>
           </a:xfrm>
           <a:prstGeom prst="straightConnector1">
@@ -4090,14 +4102,15 @@
           </p:cNvPr>
           <p:cNvCxnSpPr>
             <a:cxnSpLocks/>
+            <a:stCxn id="8" idx="1"/>
             <a:endCxn id="11" idx="0"/>
           </p:cNvCxnSpPr>
           <p:nvPr/>
         </p:nvCxnSpPr>
         <p:spPr>
           <a:xfrm flipH="1">
-            <a:off x="8177908" y="4110663"/>
-            <a:ext cx="298182" cy="207638"/>
+            <a:off x="8057319" y="4992768"/>
+            <a:ext cx="274318" cy="732758"/>
           </a:xfrm>
           <a:prstGeom prst="straightConnector1">
             <a:avLst/>
@@ -4139,7 +4152,7 @@
         </p:nvCxnSpPr>
         <p:spPr>
           <a:xfrm flipH="1">
-            <a:off x="3488645" y="2670002"/>
+            <a:off x="5540082" y="4013772"/>
             <a:ext cx="2675601" cy="517331"/>
           </a:xfrm>
           <a:prstGeom prst="straightConnector1">
@@ -4182,7 +4195,7 @@
         </p:nvCxnSpPr>
         <p:spPr>
           <a:xfrm flipH="1">
-            <a:off x="5073596" y="2670002"/>
+            <a:off x="7125033" y="4013772"/>
             <a:ext cx="1090650" cy="517331"/>
           </a:xfrm>
           <a:prstGeom prst="straightConnector1">
@@ -4221,7 +4234,7 @@
         </p:nvSpPr>
         <p:spPr>
           <a:xfrm>
-            <a:off x="7415921" y="4988227"/>
+            <a:off x="9350734" y="5681490"/>
             <a:ext cx="1783737" cy="923330"/>
           </a:xfrm>
           <a:prstGeom prst="rect">
@@ -4329,7 +4342,7 @@
         </p:nvCxnSpPr>
         <p:spPr>
           <a:xfrm>
-            <a:off x="6164246" y="2670002"/>
+            <a:off x="8215683" y="4013772"/>
             <a:ext cx="1958003" cy="517331"/>
           </a:xfrm>
           <a:prstGeom prst="straightConnector1">
@@ -4365,13 +4378,14 @@
           </p:cNvPr>
           <p:cNvCxnSpPr>
             <a:cxnSpLocks/>
+            <a:stCxn id="11" idx="3"/>
           </p:cNvCxnSpPr>
           <p:nvPr/>
         </p:nvCxnSpPr>
         <p:spPr>
           <a:xfrm>
-            <a:off x="8330308" y="4714315"/>
-            <a:ext cx="0" cy="265273"/>
+            <a:off x="8885576" y="5910192"/>
+            <a:ext cx="465158" cy="76539"/>
           </a:xfrm>
           <a:prstGeom prst="straightConnector1">
             <a:avLst/>
@@ -4409,8 +4423,8 @@
         </p:nvSpPr>
         <p:spPr>
           <a:xfrm>
-            <a:off x="1671220" y="148579"/>
-            <a:ext cx="1920782" cy="1200329"/>
+            <a:off x="1480389" y="647880"/>
+            <a:ext cx="2025170" cy="2031325"/>
           </a:xfrm>
           <a:prstGeom prst="rect">
             <a:avLst/>
@@ -4437,6 +4451,22 @@
           <a:lstStyle/>
           <a:p>
             <a:r>
+              <a:rPr lang="ru-RU" b="1" dirty="0"/>
+              <a:t>Бизнес</a:t>
+            </a:r>
+          </a:p>
+          <a:p>
+            <a:r>
+              <a:rPr lang="ru-RU" b="1" dirty="0"/>
+              <a:t>(данные и логика)</a:t>
+            </a:r>
+            <a:endParaRPr lang="en-US" b="1" dirty="0"/>
+          </a:p>
+          <a:p>
+            <a:endParaRPr lang="en-US" b="1" dirty="0"/>
+          </a:p>
+          <a:p>
+            <a:r>
               <a:rPr lang="en-US" b="1" dirty="0"/>
               <a:t>DATA &amp; Functions</a:t>
             </a:r>
@@ -4476,6 +4506,199 @@
             <a:extLst>
               <a:ext uri="{FF2B5EF4-FFF2-40B4-BE49-F238E27FC236}">
                 <a16:creationId xmlns:a16="http://schemas.microsoft.com/office/drawing/2014/main" id="{FA422340-209A-BE2C-47C0-8F3E260062E9}"/>
+              </a:ext>
+            </a:extLst>
+          </p:cNvPr>
+          <p:cNvCxnSpPr>
+            <a:cxnSpLocks/>
+          </p:cNvCxnSpPr>
+          <p:nvPr/>
+        </p:nvCxnSpPr>
+        <p:spPr>
+          <a:xfrm>
+            <a:off x="3593990" y="1661823"/>
+            <a:ext cx="3283892" cy="1719"/>
+          </a:xfrm>
+          <a:prstGeom prst="straightConnector1">
+            <a:avLst/>
+          </a:prstGeom>
+          <a:ln w="57150">
+            <a:tailEnd type="triangle"/>
+          </a:ln>
+        </p:spPr>
+        <p:style>
+          <a:lnRef idx="1">
+            <a:schemeClr val="accent1"/>
+          </a:lnRef>
+          <a:fillRef idx="0">
+            <a:schemeClr val="accent1"/>
+          </a:fillRef>
+          <a:effectRef idx="0">
+            <a:schemeClr val="accent1"/>
+          </a:effectRef>
+          <a:fontRef idx="minor">
+            <a:schemeClr val="tx1"/>
+          </a:fontRef>
+        </p:style>
+      </p:cxnSp>
+      <p:cxnSp>
+        <p:nvCxnSpPr>
+          <p:cNvPr id="20" name="Прямая со стрелкой 19">
+            <a:extLst>
+              <a:ext uri="{FF2B5EF4-FFF2-40B4-BE49-F238E27FC236}">
+                <a16:creationId xmlns:a16="http://schemas.microsoft.com/office/drawing/2014/main" id="{23D3C066-0516-0BB5-6589-512BDDA7F6ED}"/>
+              </a:ext>
+            </a:extLst>
+          </p:cNvPr>
+          <p:cNvCxnSpPr>
+            <a:cxnSpLocks/>
+          </p:cNvCxnSpPr>
+          <p:nvPr/>
+        </p:nvCxnSpPr>
+        <p:spPr>
+          <a:xfrm flipH="1">
+            <a:off x="2928052" y="6452361"/>
+            <a:ext cx="6266632" cy="0"/>
+          </a:xfrm>
+          <a:prstGeom prst="straightConnector1">
+            <a:avLst/>
+          </a:prstGeom>
+          <a:ln w="57150">
+            <a:tailEnd type="triangle"/>
+          </a:ln>
+        </p:spPr>
+        <p:style>
+          <a:lnRef idx="2">
+            <a:schemeClr val="accent6"/>
+          </a:lnRef>
+          <a:fillRef idx="0">
+            <a:schemeClr val="accent6"/>
+          </a:fillRef>
+          <a:effectRef idx="1">
+            <a:schemeClr val="accent6"/>
+          </a:effectRef>
+          <a:fontRef idx="minor">
+            <a:schemeClr val="tx1"/>
+          </a:fontRef>
+        </p:style>
+      </p:cxnSp>
+      <p:cxnSp>
+        <p:nvCxnSpPr>
+          <p:cNvPr id="26" name="Прямая со стрелкой 25">
+            <a:extLst>
+              <a:ext uri="{FF2B5EF4-FFF2-40B4-BE49-F238E27FC236}">
+                <a16:creationId xmlns:a16="http://schemas.microsoft.com/office/drawing/2014/main" id="{B04166E8-CD38-1416-E4AF-F9EA4D4D7A37}"/>
+              </a:ext>
+            </a:extLst>
+          </p:cNvPr>
+          <p:cNvCxnSpPr>
+            <a:cxnSpLocks/>
+          </p:cNvCxnSpPr>
+          <p:nvPr/>
+        </p:nvCxnSpPr>
+        <p:spPr>
+          <a:xfrm flipV="1">
+            <a:off x="2898421" y="2862470"/>
+            <a:ext cx="0" cy="3501185"/>
+          </a:xfrm>
+          <a:prstGeom prst="straightConnector1">
+            <a:avLst/>
+          </a:prstGeom>
+          <a:ln w="57150">
+            <a:tailEnd type="triangle"/>
+          </a:ln>
+        </p:spPr>
+        <p:style>
+          <a:lnRef idx="2">
+            <a:schemeClr val="accent6"/>
+          </a:lnRef>
+          <a:fillRef idx="0">
+            <a:schemeClr val="accent6"/>
+          </a:fillRef>
+          <a:effectRef idx="1">
+            <a:schemeClr val="accent6"/>
+          </a:effectRef>
+          <a:fontRef idx="minor">
+            <a:schemeClr val="tx1"/>
+          </a:fontRef>
+        </p:style>
+      </p:cxnSp>
+      <p:sp>
+        <p:nvSpPr>
+          <p:cNvPr id="36" name="TextBox 35">
+            <a:extLst>
+              <a:ext uri="{FF2B5EF4-FFF2-40B4-BE49-F238E27FC236}">
+                <a16:creationId xmlns:a16="http://schemas.microsoft.com/office/drawing/2014/main" id="{4D0C538D-A25B-EAB4-F3D5-425C5307E498}"/>
+              </a:ext>
+            </a:extLst>
+          </p:cNvPr>
+          <p:cNvSpPr txBox="1"/>
+          <p:nvPr/>
+        </p:nvSpPr>
+        <p:spPr>
+          <a:xfrm>
+            <a:off x="3737472" y="1185773"/>
+            <a:ext cx="2440027" cy="369332"/>
+          </a:xfrm>
+          <a:prstGeom prst="rect">
+            <a:avLst/>
+          </a:prstGeom>
+          <a:noFill/>
+        </p:spPr>
+        <p:txBody>
+          <a:bodyPr wrap="none" rtlCol="0">
+            <a:spAutoFit/>
+          </a:bodyPr>
+          <a:lstStyle/>
+          <a:p>
+            <a:r>
+              <a:rPr lang="ru-RU" dirty="0"/>
+              <a:t>Данные для отрисовки</a:t>
+            </a:r>
+          </a:p>
+        </p:txBody>
+      </p:sp>
+      <p:sp>
+        <p:nvSpPr>
+          <p:cNvPr id="38" name="TextBox 37">
+            <a:extLst>
+              <a:ext uri="{FF2B5EF4-FFF2-40B4-BE49-F238E27FC236}">
+                <a16:creationId xmlns:a16="http://schemas.microsoft.com/office/drawing/2014/main" id="{0E79A0C4-98AC-98CC-8CA2-88116A15787B}"/>
+              </a:ext>
+            </a:extLst>
+          </p:cNvPr>
+          <p:cNvSpPr txBox="1"/>
+          <p:nvPr/>
+        </p:nvSpPr>
+        <p:spPr>
+          <a:xfrm>
+            <a:off x="3256657" y="5897118"/>
+            <a:ext cx="2493118" cy="369332"/>
+          </a:xfrm>
+          <a:prstGeom prst="rect">
+            <a:avLst/>
+          </a:prstGeom>
+          <a:noFill/>
+        </p:spPr>
+        <p:txBody>
+          <a:bodyPr wrap="none" rtlCol="0">
+            <a:spAutoFit/>
+          </a:bodyPr>
+          <a:lstStyle/>
+          <a:p>
+            <a:r>
+              <a:rPr lang="ru-RU" dirty="0"/>
+              <a:t>Действие пользователя</a:t>
+            </a:r>
+          </a:p>
+        </p:txBody>
+      </p:sp>
+      <p:cxnSp>
+        <p:nvCxnSpPr>
+          <p:cNvPr id="47" name="Прямая соединительная линия 46">
+            <a:extLst>
+              <a:ext uri="{FF2B5EF4-FFF2-40B4-BE49-F238E27FC236}">
+                <a16:creationId xmlns:a16="http://schemas.microsoft.com/office/drawing/2014/main" id="{7C5D7128-B259-949C-8C0A-2DC0E1C04B82}"/>
               </a:ext>
             </a:extLst>
           </p:cNvPr>
@@ -4483,16 +4706,13 @@
           <p:nvPr/>
         </p:nvCxnSpPr>
         <p:spPr>
-          <a:xfrm>
-            <a:off x="3816626" y="343692"/>
-            <a:ext cx="1519362" cy="0"/>
+          <a:xfrm flipV="1">
+            <a:off x="2162755" y="365760"/>
+            <a:ext cx="5224670" cy="5997895"/>
           </a:xfrm>
-          <a:prstGeom prst="straightConnector1">
+          <a:prstGeom prst="line">
             <a:avLst/>
           </a:prstGeom>
-          <a:ln>
-            <a:tailEnd type="triangle"/>
-          </a:ln>
         </p:spPr>
         <p:style>
           <a:lnRef idx="1">

</xml_diff>

<commit_message>
add first clinics GET request
</commit_message>
<xml_diff>
--- a/clinics-app/Schema.pptx
+++ b/clinics-app/Schema.pptx
@@ -5,7 +5,10 @@
     <p:sldMasterId id="2147483648" r:id="rId1"/>
   </p:sldMasterIdLst>
   <p:sldIdLst>
-    <p:sldId id="256" r:id="rId2"/>
+    <p:sldId id="259" r:id="rId2"/>
+    <p:sldId id="261" r:id="rId3"/>
+    <p:sldId id="260" r:id="rId4"/>
+    <p:sldId id="257" r:id="rId5"/>
   </p:sldIdLst>
   <p:sldSz cx="12192000" cy="6858000"/>
   <p:notesSz cx="6858000" cy="9144000"/>
@@ -259,7 +262,7 @@
           <a:p>
             <a:fld id="{4A64690F-3CBF-4494-BFED-D4DEA9C297BB}" type="datetimeFigureOut">
               <a:rPr lang="ru-RU" smtClean="0"/>
-              <a:t>04.08.2023</a:t>
+              <a:t>07.08.2023</a:t>
             </a:fld>
             <a:endParaRPr lang="ru-RU"/>
           </a:p>
@@ -457,7 +460,7 @@
           <a:p>
             <a:fld id="{4A64690F-3CBF-4494-BFED-D4DEA9C297BB}" type="datetimeFigureOut">
               <a:rPr lang="ru-RU" smtClean="0"/>
-              <a:t>04.08.2023</a:t>
+              <a:t>07.08.2023</a:t>
             </a:fld>
             <a:endParaRPr lang="ru-RU"/>
           </a:p>
@@ -665,7 +668,7 @@
           <a:p>
             <a:fld id="{4A64690F-3CBF-4494-BFED-D4DEA9C297BB}" type="datetimeFigureOut">
               <a:rPr lang="ru-RU" smtClean="0"/>
-              <a:t>04.08.2023</a:t>
+              <a:t>07.08.2023</a:t>
             </a:fld>
             <a:endParaRPr lang="ru-RU"/>
           </a:p>
@@ -863,7 +866,7 @@
           <a:p>
             <a:fld id="{4A64690F-3CBF-4494-BFED-D4DEA9C297BB}" type="datetimeFigureOut">
               <a:rPr lang="ru-RU" smtClean="0"/>
-              <a:t>04.08.2023</a:t>
+              <a:t>07.08.2023</a:t>
             </a:fld>
             <a:endParaRPr lang="ru-RU"/>
           </a:p>
@@ -1138,7 +1141,7 @@
           <a:p>
             <a:fld id="{4A64690F-3CBF-4494-BFED-D4DEA9C297BB}" type="datetimeFigureOut">
               <a:rPr lang="ru-RU" smtClean="0"/>
-              <a:t>04.08.2023</a:t>
+              <a:t>07.08.2023</a:t>
             </a:fld>
             <a:endParaRPr lang="ru-RU"/>
           </a:p>
@@ -1403,7 +1406,7 @@
           <a:p>
             <a:fld id="{4A64690F-3CBF-4494-BFED-D4DEA9C297BB}" type="datetimeFigureOut">
               <a:rPr lang="ru-RU" smtClean="0"/>
-              <a:t>04.08.2023</a:t>
+              <a:t>07.08.2023</a:t>
             </a:fld>
             <a:endParaRPr lang="ru-RU"/>
           </a:p>
@@ -1815,7 +1818,7 @@
           <a:p>
             <a:fld id="{4A64690F-3CBF-4494-BFED-D4DEA9C297BB}" type="datetimeFigureOut">
               <a:rPr lang="ru-RU" smtClean="0"/>
-              <a:t>04.08.2023</a:t>
+              <a:t>07.08.2023</a:t>
             </a:fld>
             <a:endParaRPr lang="ru-RU"/>
           </a:p>
@@ -1956,7 +1959,7 @@
           <a:p>
             <a:fld id="{4A64690F-3CBF-4494-BFED-D4DEA9C297BB}" type="datetimeFigureOut">
               <a:rPr lang="ru-RU" smtClean="0"/>
-              <a:t>04.08.2023</a:t>
+              <a:t>07.08.2023</a:t>
             </a:fld>
             <a:endParaRPr lang="ru-RU"/>
           </a:p>
@@ -2069,7 +2072,7 @@
           <a:p>
             <a:fld id="{4A64690F-3CBF-4494-BFED-D4DEA9C297BB}" type="datetimeFigureOut">
               <a:rPr lang="ru-RU" smtClean="0"/>
-              <a:t>04.08.2023</a:t>
+              <a:t>07.08.2023</a:t>
             </a:fld>
             <a:endParaRPr lang="ru-RU"/>
           </a:p>
@@ -2380,7 +2383,7 @@
           <a:p>
             <a:fld id="{4A64690F-3CBF-4494-BFED-D4DEA9C297BB}" type="datetimeFigureOut">
               <a:rPr lang="ru-RU" smtClean="0"/>
-              <a:t>04.08.2023</a:t>
+              <a:t>07.08.2023</a:t>
             </a:fld>
             <a:endParaRPr lang="ru-RU"/>
           </a:p>
@@ -2668,7 +2671,7 @@
           <a:p>
             <a:fld id="{4A64690F-3CBF-4494-BFED-D4DEA9C297BB}" type="datetimeFigureOut">
               <a:rPr lang="ru-RU" smtClean="0"/>
-              <a:t>04.08.2023</a:t>
+              <a:t>07.08.2023</a:t>
             </a:fld>
             <a:endParaRPr lang="ru-RU"/>
           </a:p>
@@ -2909,7 +2912,7 @@
           <a:p>
             <a:fld id="{4A64690F-3CBF-4494-BFED-D4DEA9C297BB}" type="datetimeFigureOut">
               <a:rPr lang="ru-RU" smtClean="0"/>
-              <a:t>04.08.2023</a:t>
+              <a:t>07.08.2023</a:t>
             </a:fld>
             <a:endParaRPr lang="ru-RU"/>
           </a:p>
@@ -3340,8 +3343,8 @@
         </p:nvSpPr>
         <p:spPr>
           <a:xfrm>
-            <a:off x="7004105" y="1201878"/>
-            <a:ext cx="2201186" cy="646331"/>
+            <a:off x="6105609" y="1201878"/>
+            <a:ext cx="2201186" cy="369332"/>
           </a:xfrm>
           <a:prstGeom prst="rect">
             <a:avLst/>
@@ -3377,22 +3380,14 @@
               <a:t>интерфейс)</a:t>
             </a:r>
           </a:p>
-          <a:p>
-            <a:pPr algn="ctr"/>
-            <a:r>
-              <a:rPr lang="en-US" dirty="0"/>
-              <a:t>Index.js</a:t>
-            </a:r>
-            <a:endParaRPr lang="ru-RU" dirty="0"/>
-          </a:p>
-        </p:txBody>
-      </p:sp>
-      <p:sp>
-        <p:nvSpPr>
-          <p:cNvPr id="5" name="TextBox 4">
-            <a:extLst>
-              <a:ext uri="{FF2B5EF4-FFF2-40B4-BE49-F238E27FC236}">
-                <a16:creationId xmlns:a16="http://schemas.microsoft.com/office/drawing/2014/main" id="{8531AF70-F13D-C913-613F-2D0CE8822ACA}"/>
+        </p:txBody>
+      </p:sp>
+      <p:sp>
+        <p:nvSpPr>
+          <p:cNvPr id="3" name="TextBox 2">
+            <a:extLst>
+              <a:ext uri="{FF2B5EF4-FFF2-40B4-BE49-F238E27FC236}">
+                <a16:creationId xmlns:a16="http://schemas.microsoft.com/office/drawing/2014/main" id="{0A8438E5-CCA3-C4EF-2410-39C67501CCE4}"/>
               </a:ext>
             </a:extLst>
           </p:cNvPr>
@@ -3401,1030 +3396,8 @@
         </p:nvSpPr>
         <p:spPr>
           <a:xfrm>
-            <a:off x="7699519" y="2092514"/>
-            <a:ext cx="898497" cy="369332"/>
-          </a:xfrm>
-          <a:prstGeom prst="rect">
-            <a:avLst/>
-          </a:prstGeom>
-        </p:spPr>
-        <p:style>
-          <a:lnRef idx="2">
-            <a:schemeClr val="accent1"/>
-          </a:lnRef>
-          <a:fillRef idx="1">
-            <a:schemeClr val="lt1"/>
-          </a:fillRef>
-          <a:effectRef idx="0">
-            <a:schemeClr val="accent1"/>
-          </a:effectRef>
-          <a:fontRef idx="minor">
-            <a:schemeClr val="dk1"/>
-          </a:fontRef>
-        </p:style>
-        <p:txBody>
-          <a:bodyPr wrap="square" rtlCol="0">
-            <a:spAutoFit/>
-          </a:bodyPr>
-          <a:lstStyle/>
-          <a:p>
-            <a:pPr algn="ctr"/>
-            <a:r>
-              <a:rPr lang="en-US" dirty="0"/>
-              <a:t>App.js</a:t>
-            </a:r>
-            <a:endParaRPr lang="ru-RU" dirty="0"/>
-          </a:p>
-        </p:txBody>
-      </p:sp>
-      <p:sp>
-        <p:nvSpPr>
-          <p:cNvPr id="6" name="TextBox 5">
-            <a:extLst>
-              <a:ext uri="{FF2B5EF4-FFF2-40B4-BE49-F238E27FC236}">
-                <a16:creationId xmlns:a16="http://schemas.microsoft.com/office/drawing/2014/main" id="{F9434637-765B-E1DC-F463-472B4643BA8D}"/>
-              </a:ext>
-            </a:extLst>
-          </p:cNvPr>
-          <p:cNvSpPr txBox="1"/>
-          <p:nvPr/>
-        </p:nvSpPr>
-        <p:spPr>
-          <a:xfrm>
-            <a:off x="6054919" y="2753804"/>
-            <a:ext cx="4321529" cy="646331"/>
-          </a:xfrm>
-          <a:prstGeom prst="rect">
-            <a:avLst/>
-          </a:prstGeom>
-        </p:spPr>
-        <p:style>
-          <a:lnRef idx="2">
-            <a:schemeClr val="accent1"/>
-          </a:lnRef>
-          <a:fillRef idx="1">
-            <a:schemeClr val="lt1"/>
-          </a:fillRef>
-          <a:effectRef idx="0">
-            <a:schemeClr val="accent1"/>
-          </a:effectRef>
-          <a:fontRef idx="minor">
-            <a:schemeClr val="dk1"/>
-          </a:fontRef>
-        </p:style>
-        <p:txBody>
-          <a:bodyPr wrap="square" rtlCol="0">
-            <a:spAutoFit/>
-          </a:bodyPr>
-          <a:lstStyle/>
-          <a:p>
-            <a:pPr algn="ctr"/>
-            <a:r>
-              <a:rPr lang="en-US" b="0" dirty="0">
-                <a:solidFill>
-                  <a:srgbClr val="4EC9B0"/>
-                </a:solidFill>
-                <a:effectLst/>
-                <a:latin typeface="Consolas" panose="020B0609020204030204" pitchFamily="49" charset="0"/>
-              </a:rPr>
-              <a:t>&lt;</a:t>
-            </a:r>
-            <a:r>
-              <a:rPr lang="en-US" b="0" dirty="0" err="1">
-                <a:solidFill>
-                  <a:srgbClr val="4EC9B0"/>
-                </a:solidFill>
-                <a:effectLst/>
-                <a:latin typeface="Consolas" panose="020B0609020204030204" pitchFamily="49" charset="0"/>
-              </a:rPr>
-              <a:t>BrowserRouter</a:t>
-            </a:r>
-            <a:r>
-              <a:rPr lang="en-US" b="0" dirty="0">
-                <a:solidFill>
-                  <a:srgbClr val="4EC9B0"/>
-                </a:solidFill>
-                <a:effectLst/>
-                <a:latin typeface="Consolas" panose="020B0609020204030204" pitchFamily="49" charset="0"/>
-              </a:rPr>
-              <a:t>&gt;</a:t>
-            </a:r>
-          </a:p>
-          <a:p>
-            <a:pPr algn="ctr"/>
-            <a:r>
-              <a:rPr lang="en-US" b="0" dirty="0">
-                <a:solidFill>
-                  <a:srgbClr val="808080"/>
-                </a:solidFill>
-                <a:effectLst/>
-                <a:latin typeface="Consolas" panose="020B0609020204030204" pitchFamily="49" charset="0"/>
-              </a:rPr>
-              <a:t>&lt;</a:t>
-            </a:r>
-            <a:r>
-              <a:rPr lang="en-US" b="0" dirty="0">
-                <a:solidFill>
-                  <a:srgbClr val="569CD6"/>
-                </a:solidFill>
-                <a:effectLst/>
-                <a:latin typeface="Consolas" panose="020B0609020204030204" pitchFamily="49" charset="0"/>
-              </a:rPr>
-              <a:t>div</a:t>
-            </a:r>
-            <a:r>
-              <a:rPr lang="en-US" b="0" dirty="0">
-                <a:solidFill>
-                  <a:srgbClr val="CCCCCC"/>
-                </a:solidFill>
-                <a:effectLst/>
-                <a:latin typeface="Consolas" panose="020B0609020204030204" pitchFamily="49" charset="0"/>
-              </a:rPr>
-              <a:t> </a:t>
-            </a:r>
-            <a:r>
-              <a:rPr lang="en-US" b="0" dirty="0" err="1">
-                <a:solidFill>
-                  <a:srgbClr val="9CDCFE"/>
-                </a:solidFill>
-                <a:effectLst/>
-                <a:latin typeface="Consolas" panose="020B0609020204030204" pitchFamily="49" charset="0"/>
-              </a:rPr>
-              <a:t>className</a:t>
-            </a:r>
-            <a:r>
-              <a:rPr lang="en-US" b="0" dirty="0">
-                <a:solidFill>
-                  <a:srgbClr val="D4D4D4"/>
-                </a:solidFill>
-                <a:effectLst/>
-                <a:latin typeface="Consolas" panose="020B0609020204030204" pitchFamily="49" charset="0"/>
-              </a:rPr>
-              <a:t>=</a:t>
-            </a:r>
-            <a:r>
-              <a:rPr lang="en-US" b="0" dirty="0">
-                <a:solidFill>
-                  <a:srgbClr val="CE9178"/>
-                </a:solidFill>
-                <a:effectLst/>
-                <a:latin typeface="Consolas" panose="020B0609020204030204" pitchFamily="49" charset="0"/>
-              </a:rPr>
-              <a:t>"app-wrapper"</a:t>
-            </a:r>
-            <a:r>
-              <a:rPr lang="en-US" b="0" dirty="0">
-                <a:solidFill>
-                  <a:srgbClr val="808080"/>
-                </a:solidFill>
-                <a:effectLst/>
-                <a:latin typeface="Consolas" panose="020B0609020204030204" pitchFamily="49" charset="0"/>
-              </a:rPr>
-              <a:t>&gt;</a:t>
-            </a:r>
-            <a:endParaRPr lang="en-US" b="0" dirty="0">
-              <a:solidFill>
-                <a:srgbClr val="CCCCCC"/>
-              </a:solidFill>
-              <a:effectLst/>
-              <a:latin typeface="Consolas" panose="020B0609020204030204" pitchFamily="49" charset="0"/>
-            </a:endParaRPr>
-          </a:p>
-        </p:txBody>
-      </p:sp>
-      <p:sp>
-        <p:nvSpPr>
-          <p:cNvPr id="7" name="TextBox 6">
-            <a:extLst>
-              <a:ext uri="{FF2B5EF4-FFF2-40B4-BE49-F238E27FC236}">
-                <a16:creationId xmlns:a16="http://schemas.microsoft.com/office/drawing/2014/main" id="{C4E4581A-943E-3F07-D7B3-487175FDD70D}"/>
-              </a:ext>
-            </a:extLst>
-          </p:cNvPr>
-          <p:cNvSpPr txBox="1"/>
-          <p:nvPr/>
-        </p:nvSpPr>
-        <p:spPr>
-          <a:xfrm>
-            <a:off x="4882115" y="4531103"/>
-            <a:ext cx="1315934" cy="369332"/>
-          </a:xfrm>
-          <a:prstGeom prst="rect">
-            <a:avLst/>
-          </a:prstGeom>
-        </p:spPr>
-        <p:style>
-          <a:lnRef idx="2">
-            <a:schemeClr val="accent1"/>
-          </a:lnRef>
-          <a:fillRef idx="1">
-            <a:schemeClr val="lt1"/>
-          </a:fillRef>
-          <a:effectRef idx="0">
-            <a:schemeClr val="accent1"/>
-          </a:effectRef>
-          <a:fontRef idx="minor">
-            <a:schemeClr val="dk1"/>
-          </a:fontRef>
-        </p:style>
-        <p:txBody>
-          <a:bodyPr wrap="square" rtlCol="0">
-            <a:spAutoFit/>
-          </a:bodyPr>
-          <a:lstStyle/>
-          <a:p>
-            <a:pPr algn="ctr"/>
-            <a:r>
-              <a:rPr lang="en-US" dirty="0"/>
-              <a:t>&lt;Header /&gt;</a:t>
-            </a:r>
-            <a:endParaRPr lang="ru-RU" dirty="0"/>
-          </a:p>
-        </p:txBody>
-      </p:sp>
-      <p:sp>
-        <p:nvSpPr>
-          <p:cNvPr id="8" name="TextBox 7">
-            <a:extLst>
-              <a:ext uri="{FF2B5EF4-FFF2-40B4-BE49-F238E27FC236}">
-                <a16:creationId xmlns:a16="http://schemas.microsoft.com/office/drawing/2014/main" id="{09C7CD4A-5623-A969-D88D-4792EEF52F9A}"/>
-              </a:ext>
-            </a:extLst>
-          </p:cNvPr>
-          <p:cNvSpPr txBox="1"/>
-          <p:nvPr/>
-        </p:nvSpPr>
-        <p:spPr>
-          <a:xfrm>
-            <a:off x="8331637" y="4531103"/>
-            <a:ext cx="3684098" cy="923330"/>
-          </a:xfrm>
-          <a:prstGeom prst="rect">
-            <a:avLst/>
-          </a:prstGeom>
-        </p:spPr>
-        <p:style>
-          <a:lnRef idx="2">
-            <a:schemeClr val="accent1"/>
-          </a:lnRef>
-          <a:fillRef idx="1">
-            <a:schemeClr val="lt1"/>
-          </a:fillRef>
-          <a:effectRef idx="0">
-            <a:schemeClr val="accent1"/>
-          </a:effectRef>
-          <a:fontRef idx="minor">
-            <a:schemeClr val="dk1"/>
-          </a:fontRef>
-        </p:style>
-        <p:txBody>
-          <a:bodyPr wrap="square" rtlCol="0">
-            <a:spAutoFit/>
-          </a:bodyPr>
-          <a:lstStyle/>
-          <a:p>
-            <a:pPr algn="ctr"/>
-            <a:r>
-              <a:rPr lang="en-US" b="0" dirty="0">
-                <a:solidFill>
-                  <a:schemeClr val="tx1"/>
-                </a:solidFill>
-                <a:effectLst/>
-                <a:latin typeface="Consolas" panose="020B0609020204030204" pitchFamily="49" charset="0"/>
-              </a:rPr>
-              <a:t>Pages</a:t>
-            </a:r>
-            <a:endParaRPr lang="ru-RU" b="0" dirty="0">
-              <a:solidFill>
-                <a:schemeClr val="tx1"/>
-              </a:solidFill>
-              <a:effectLst/>
-              <a:latin typeface="Consolas" panose="020B0609020204030204" pitchFamily="49" charset="0"/>
-            </a:endParaRPr>
-          </a:p>
-          <a:p>
-            <a:pPr algn="ctr"/>
-            <a:r>
-              <a:rPr lang="en-US" b="0" dirty="0">
-                <a:solidFill>
-                  <a:srgbClr val="808080"/>
-                </a:solidFill>
-                <a:effectLst/>
-                <a:latin typeface="Consolas" panose="020B0609020204030204" pitchFamily="49" charset="0"/>
-              </a:rPr>
-              <a:t>&lt;</a:t>
-            </a:r>
-            <a:r>
-              <a:rPr lang="en-US" b="0" dirty="0">
-                <a:solidFill>
-                  <a:srgbClr val="569CD6"/>
-                </a:solidFill>
-                <a:effectLst/>
-                <a:latin typeface="Consolas" panose="020B0609020204030204" pitchFamily="49" charset="0"/>
-              </a:rPr>
-              <a:t>div</a:t>
-            </a:r>
-            <a:r>
-              <a:rPr lang="en-US" b="0" dirty="0">
-                <a:solidFill>
-                  <a:srgbClr val="CCCCCC"/>
-                </a:solidFill>
-                <a:effectLst/>
-                <a:latin typeface="Consolas" panose="020B0609020204030204" pitchFamily="49" charset="0"/>
-              </a:rPr>
-              <a:t> </a:t>
-            </a:r>
-            <a:r>
-              <a:rPr lang="en-US" b="0" dirty="0" err="1">
-                <a:solidFill>
-                  <a:srgbClr val="9CDCFE"/>
-                </a:solidFill>
-                <a:effectLst/>
-                <a:latin typeface="Consolas" panose="020B0609020204030204" pitchFamily="49" charset="0"/>
-              </a:rPr>
-              <a:t>className</a:t>
-            </a:r>
-            <a:r>
-              <a:rPr lang="en-US" b="0" dirty="0">
-                <a:solidFill>
-                  <a:srgbClr val="D4D4D4"/>
-                </a:solidFill>
-                <a:effectLst/>
-                <a:latin typeface="Consolas" panose="020B0609020204030204" pitchFamily="49" charset="0"/>
-              </a:rPr>
-              <a:t>=</a:t>
-            </a:r>
-            <a:r>
-              <a:rPr lang="en-US" b="0" dirty="0">
-                <a:solidFill>
-                  <a:srgbClr val="CE9178"/>
-                </a:solidFill>
-                <a:effectLst/>
-                <a:latin typeface="Consolas" panose="020B0609020204030204" pitchFamily="49" charset="0"/>
-              </a:rPr>
-              <a:t>"content"</a:t>
-            </a:r>
-            <a:r>
-              <a:rPr lang="en-US" b="0" dirty="0">
-                <a:solidFill>
-                  <a:srgbClr val="808080"/>
-                </a:solidFill>
-                <a:effectLst/>
-                <a:latin typeface="Consolas" panose="020B0609020204030204" pitchFamily="49" charset="0"/>
-              </a:rPr>
-              <a:t>&gt;</a:t>
-            </a:r>
-          </a:p>
-          <a:p>
-            <a:pPr algn="ctr"/>
-            <a:r>
-              <a:rPr lang="en-US" b="0" dirty="0">
-                <a:solidFill>
-                  <a:srgbClr val="808080"/>
-                </a:solidFill>
-                <a:effectLst/>
-                <a:latin typeface="Consolas" panose="020B0609020204030204" pitchFamily="49" charset="0"/>
-              </a:rPr>
-              <a:t>&lt;</a:t>
-            </a:r>
-            <a:r>
-              <a:rPr lang="en-US" b="0" dirty="0">
-                <a:solidFill>
-                  <a:srgbClr val="4EC9B0"/>
-                </a:solidFill>
-                <a:effectLst/>
-                <a:latin typeface="Consolas" panose="020B0609020204030204" pitchFamily="49" charset="0"/>
-              </a:rPr>
-              <a:t>Routes</a:t>
-            </a:r>
-            <a:r>
-              <a:rPr lang="en-US" b="0" dirty="0">
-                <a:solidFill>
-                  <a:srgbClr val="808080"/>
-                </a:solidFill>
-                <a:effectLst/>
-                <a:latin typeface="Consolas" panose="020B0609020204030204" pitchFamily="49" charset="0"/>
-              </a:rPr>
-              <a:t>&gt;</a:t>
-            </a:r>
-            <a:endParaRPr lang="en-US" b="0" dirty="0">
-              <a:solidFill>
-                <a:srgbClr val="CCCCCC"/>
-              </a:solidFill>
-              <a:effectLst/>
-              <a:latin typeface="Consolas" panose="020B0609020204030204" pitchFamily="49" charset="0"/>
-            </a:endParaRPr>
-          </a:p>
-        </p:txBody>
-      </p:sp>
-      <p:sp>
-        <p:nvSpPr>
-          <p:cNvPr id="9" name="TextBox 8">
-            <a:extLst>
-              <a:ext uri="{FF2B5EF4-FFF2-40B4-BE49-F238E27FC236}">
-                <a16:creationId xmlns:a16="http://schemas.microsoft.com/office/drawing/2014/main" id="{149E3223-D72A-F746-277B-E48CA946122A}"/>
-              </a:ext>
-            </a:extLst>
-          </p:cNvPr>
-          <p:cNvSpPr txBox="1"/>
-          <p:nvPr/>
-        </p:nvSpPr>
-        <p:spPr>
-          <a:xfrm>
-            <a:off x="6467066" y="4531103"/>
-            <a:ext cx="1315934" cy="369332"/>
-          </a:xfrm>
-          <a:prstGeom prst="rect">
-            <a:avLst/>
-          </a:prstGeom>
-        </p:spPr>
-        <p:style>
-          <a:lnRef idx="2">
-            <a:schemeClr val="accent1"/>
-          </a:lnRef>
-          <a:fillRef idx="1">
-            <a:schemeClr val="lt1"/>
-          </a:fillRef>
-          <a:effectRef idx="0">
-            <a:schemeClr val="accent1"/>
-          </a:effectRef>
-          <a:fontRef idx="minor">
-            <a:schemeClr val="dk1"/>
-          </a:fontRef>
-        </p:style>
-        <p:txBody>
-          <a:bodyPr wrap="square" rtlCol="0">
-            <a:spAutoFit/>
-          </a:bodyPr>
-          <a:lstStyle/>
-          <a:p>
-            <a:pPr algn="ctr"/>
-            <a:r>
-              <a:rPr lang="en-US" dirty="0"/>
-              <a:t>&lt;Footer /&gt;</a:t>
-            </a:r>
-            <a:endParaRPr lang="ru-RU" dirty="0"/>
-          </a:p>
-        </p:txBody>
-      </p:sp>
-      <p:sp>
-        <p:nvSpPr>
-          <p:cNvPr id="10" name="TextBox 9">
-            <a:extLst>
-              <a:ext uri="{FF2B5EF4-FFF2-40B4-BE49-F238E27FC236}">
-                <a16:creationId xmlns:a16="http://schemas.microsoft.com/office/drawing/2014/main" id="{7324D25F-3F9B-D4C2-00B6-203189BEAB3E}"/>
-              </a:ext>
-            </a:extLst>
-          </p:cNvPr>
-          <p:cNvSpPr txBox="1"/>
-          <p:nvPr/>
-        </p:nvSpPr>
-        <p:spPr>
-          <a:xfrm>
-            <a:off x="7387425" y="3644440"/>
-            <a:ext cx="1656515" cy="369332"/>
-          </a:xfrm>
-          <a:prstGeom prst="rect">
-            <a:avLst/>
-          </a:prstGeom>
-        </p:spPr>
-        <p:style>
-          <a:lnRef idx="2">
-            <a:schemeClr val="accent1"/>
-          </a:lnRef>
-          <a:fillRef idx="1">
-            <a:schemeClr val="lt1"/>
-          </a:fillRef>
-          <a:effectRef idx="0">
-            <a:schemeClr val="accent1"/>
-          </a:effectRef>
-          <a:fontRef idx="minor">
-            <a:schemeClr val="dk1"/>
-          </a:fontRef>
-        </p:style>
-        <p:txBody>
-          <a:bodyPr wrap="square" rtlCol="0">
-            <a:spAutoFit/>
-          </a:bodyPr>
-          <a:lstStyle/>
-          <a:p>
-            <a:pPr algn="ctr"/>
-            <a:r>
-              <a:rPr lang="en-US" dirty="0"/>
-              <a:t>Components</a:t>
-            </a:r>
-            <a:endParaRPr lang="ru-RU" dirty="0"/>
-          </a:p>
-        </p:txBody>
-      </p:sp>
-      <p:sp>
-        <p:nvSpPr>
-          <p:cNvPr id="11" name="TextBox 10">
-            <a:extLst>
-              <a:ext uri="{FF2B5EF4-FFF2-40B4-BE49-F238E27FC236}">
-                <a16:creationId xmlns:a16="http://schemas.microsoft.com/office/drawing/2014/main" id="{0AD5D19E-B371-4318-02B5-9763513E6A1D}"/>
-              </a:ext>
-            </a:extLst>
-          </p:cNvPr>
-          <p:cNvSpPr txBox="1"/>
-          <p:nvPr/>
-        </p:nvSpPr>
-        <p:spPr>
-          <a:xfrm>
-            <a:off x="7229061" y="5725526"/>
-            <a:ext cx="1656515" cy="369332"/>
-          </a:xfrm>
-          <a:prstGeom prst="rect">
-            <a:avLst/>
-          </a:prstGeom>
-        </p:spPr>
-        <p:style>
-          <a:lnRef idx="2">
-            <a:schemeClr val="accent1"/>
-          </a:lnRef>
-          <a:fillRef idx="1">
-            <a:schemeClr val="lt1"/>
-          </a:fillRef>
-          <a:effectRef idx="0">
-            <a:schemeClr val="accent1"/>
-          </a:effectRef>
-          <a:fontRef idx="minor">
-            <a:schemeClr val="dk1"/>
-          </a:fontRef>
-        </p:style>
-        <p:txBody>
-          <a:bodyPr wrap="square" rtlCol="0">
-            <a:spAutoFit/>
-          </a:bodyPr>
-          <a:lstStyle/>
-          <a:p>
-            <a:pPr algn="ctr"/>
-            <a:r>
-              <a:rPr lang="en-US" dirty="0"/>
-              <a:t>Pages</a:t>
-            </a:r>
-            <a:endParaRPr lang="ru-RU" dirty="0"/>
-          </a:p>
-        </p:txBody>
-      </p:sp>
-      <p:cxnSp>
-        <p:nvCxnSpPr>
-          <p:cNvPr id="13" name="Прямая со стрелкой 12">
-            <a:extLst>
-              <a:ext uri="{FF2B5EF4-FFF2-40B4-BE49-F238E27FC236}">
-                <a16:creationId xmlns:a16="http://schemas.microsoft.com/office/drawing/2014/main" id="{49F8C886-8CB8-5E76-D5EB-D0BD5849E884}"/>
-              </a:ext>
-            </a:extLst>
-          </p:cNvPr>
-          <p:cNvCxnSpPr>
-            <a:cxnSpLocks/>
-            <a:endCxn id="5" idx="0"/>
-          </p:cNvCxnSpPr>
-          <p:nvPr/>
-        </p:nvCxnSpPr>
-        <p:spPr>
-          <a:xfrm>
-            <a:off x="8147437" y="1872128"/>
-            <a:ext cx="1331" cy="220386"/>
-          </a:xfrm>
-          <a:prstGeom prst="straightConnector1">
-            <a:avLst/>
-          </a:prstGeom>
-          <a:ln>
-            <a:tailEnd type="triangle"/>
-          </a:ln>
-        </p:spPr>
-        <p:style>
-          <a:lnRef idx="1">
-            <a:schemeClr val="accent1"/>
-          </a:lnRef>
-          <a:fillRef idx="0">
-            <a:schemeClr val="accent1"/>
-          </a:fillRef>
-          <a:effectRef idx="0">
-            <a:schemeClr val="accent1"/>
-          </a:effectRef>
-          <a:fontRef idx="minor">
-            <a:schemeClr val="tx1"/>
-          </a:fontRef>
-        </p:style>
-      </p:cxnSp>
-      <p:cxnSp>
-        <p:nvCxnSpPr>
-          <p:cNvPr id="14" name="Прямая со стрелкой 13">
-            <a:extLst>
-              <a:ext uri="{FF2B5EF4-FFF2-40B4-BE49-F238E27FC236}">
-                <a16:creationId xmlns:a16="http://schemas.microsoft.com/office/drawing/2014/main" id="{F0FEE40E-62DB-1F31-AE30-5DC65489B89F}"/>
-              </a:ext>
-            </a:extLst>
-          </p:cNvPr>
-          <p:cNvCxnSpPr/>
-          <p:nvPr/>
-        </p:nvCxnSpPr>
-        <p:spPr>
-          <a:xfrm>
-            <a:off x="8156716" y="2477752"/>
-            <a:ext cx="1331" cy="220386"/>
-          </a:xfrm>
-          <a:prstGeom prst="straightConnector1">
-            <a:avLst/>
-          </a:prstGeom>
-          <a:ln>
-            <a:tailEnd type="triangle"/>
-          </a:ln>
-        </p:spPr>
-        <p:style>
-          <a:lnRef idx="1">
-            <a:schemeClr val="accent1"/>
-          </a:lnRef>
-          <a:fillRef idx="0">
-            <a:schemeClr val="accent1"/>
-          </a:fillRef>
-          <a:effectRef idx="0">
-            <a:schemeClr val="accent1"/>
-          </a:effectRef>
-          <a:fontRef idx="minor">
-            <a:schemeClr val="tx1"/>
-          </a:fontRef>
-        </p:style>
-      </p:cxnSp>
-      <p:cxnSp>
-        <p:nvCxnSpPr>
-          <p:cNvPr id="15" name="Прямая со стрелкой 14">
-            <a:extLst>
-              <a:ext uri="{FF2B5EF4-FFF2-40B4-BE49-F238E27FC236}">
-                <a16:creationId xmlns:a16="http://schemas.microsoft.com/office/drawing/2014/main" id="{C6FD266F-6C3A-68F8-821F-B62F40F36E48}"/>
-              </a:ext>
-            </a:extLst>
-          </p:cNvPr>
-          <p:cNvCxnSpPr>
-            <a:cxnSpLocks/>
-            <a:stCxn id="6" idx="2"/>
-            <a:endCxn id="10" idx="0"/>
-          </p:cNvCxnSpPr>
-          <p:nvPr/>
-        </p:nvCxnSpPr>
-        <p:spPr>
-          <a:xfrm flipH="1">
-            <a:off x="8215683" y="3400135"/>
-            <a:ext cx="1" cy="244305"/>
-          </a:xfrm>
-          <a:prstGeom prst="straightConnector1">
-            <a:avLst/>
-          </a:prstGeom>
-          <a:ln>
-            <a:tailEnd type="triangle"/>
-          </a:ln>
-        </p:spPr>
-        <p:style>
-          <a:lnRef idx="1">
-            <a:schemeClr val="accent1"/>
-          </a:lnRef>
-          <a:fillRef idx="0">
-            <a:schemeClr val="accent1"/>
-          </a:fillRef>
-          <a:effectRef idx="0">
-            <a:schemeClr val="accent1"/>
-          </a:effectRef>
-          <a:fontRef idx="minor">
-            <a:schemeClr val="tx1"/>
-          </a:fontRef>
-        </p:style>
-      </p:cxnSp>
-      <p:cxnSp>
-        <p:nvCxnSpPr>
-          <p:cNvPr id="19" name="Прямая со стрелкой 18">
-            <a:extLst>
-              <a:ext uri="{FF2B5EF4-FFF2-40B4-BE49-F238E27FC236}">
-                <a16:creationId xmlns:a16="http://schemas.microsoft.com/office/drawing/2014/main" id="{F6AD63E0-8362-E9DE-B1F2-AB83DF299BAF}"/>
-              </a:ext>
-            </a:extLst>
-          </p:cNvPr>
-          <p:cNvCxnSpPr>
-            <a:cxnSpLocks/>
-            <a:stCxn id="8" idx="1"/>
-            <a:endCxn id="11" idx="0"/>
-          </p:cNvCxnSpPr>
-          <p:nvPr/>
-        </p:nvCxnSpPr>
-        <p:spPr>
-          <a:xfrm flipH="1">
-            <a:off x="8057319" y="4992768"/>
-            <a:ext cx="274318" cy="732758"/>
-          </a:xfrm>
-          <a:prstGeom prst="straightConnector1">
-            <a:avLst/>
-          </a:prstGeom>
-          <a:ln>
-            <a:tailEnd type="triangle"/>
-          </a:ln>
-        </p:spPr>
-        <p:style>
-          <a:lnRef idx="1">
-            <a:schemeClr val="accent1"/>
-          </a:lnRef>
-          <a:fillRef idx="0">
-            <a:schemeClr val="accent1"/>
-          </a:fillRef>
-          <a:effectRef idx="0">
-            <a:schemeClr val="accent1"/>
-          </a:effectRef>
-          <a:fontRef idx="minor">
-            <a:schemeClr val="tx1"/>
-          </a:fontRef>
-        </p:style>
-      </p:cxnSp>
-      <p:cxnSp>
-        <p:nvCxnSpPr>
-          <p:cNvPr id="22" name="Прямая со стрелкой 21">
-            <a:extLst>
-              <a:ext uri="{FF2B5EF4-FFF2-40B4-BE49-F238E27FC236}">
-                <a16:creationId xmlns:a16="http://schemas.microsoft.com/office/drawing/2014/main" id="{3E0788DF-E13C-544F-9E0D-1CAD2F38628C}"/>
-              </a:ext>
-            </a:extLst>
-          </p:cNvPr>
-          <p:cNvCxnSpPr>
-            <a:cxnSpLocks/>
-            <a:stCxn id="10" idx="2"/>
-            <a:endCxn id="7" idx="0"/>
-          </p:cNvCxnSpPr>
-          <p:nvPr/>
-        </p:nvCxnSpPr>
-        <p:spPr>
-          <a:xfrm flipH="1">
-            <a:off x="5540082" y="4013772"/>
-            <a:ext cx="2675601" cy="517331"/>
-          </a:xfrm>
-          <a:prstGeom prst="straightConnector1">
-            <a:avLst/>
-          </a:prstGeom>
-          <a:ln>
-            <a:tailEnd type="triangle"/>
-          </a:ln>
-        </p:spPr>
-        <p:style>
-          <a:lnRef idx="1">
-            <a:schemeClr val="accent1"/>
-          </a:lnRef>
-          <a:fillRef idx="0">
-            <a:schemeClr val="accent1"/>
-          </a:fillRef>
-          <a:effectRef idx="0">
-            <a:schemeClr val="accent1"/>
-          </a:effectRef>
-          <a:fontRef idx="minor">
-            <a:schemeClr val="tx1"/>
-          </a:fontRef>
-        </p:style>
-      </p:cxnSp>
-      <p:cxnSp>
-        <p:nvCxnSpPr>
-          <p:cNvPr id="25" name="Прямая со стрелкой 24">
-            <a:extLst>
-              <a:ext uri="{FF2B5EF4-FFF2-40B4-BE49-F238E27FC236}">
-                <a16:creationId xmlns:a16="http://schemas.microsoft.com/office/drawing/2014/main" id="{471B19FE-3298-9398-7ADD-85F4FB22B0FD}"/>
-              </a:ext>
-            </a:extLst>
-          </p:cNvPr>
-          <p:cNvCxnSpPr>
-            <a:cxnSpLocks/>
-            <a:stCxn id="10" idx="2"/>
-            <a:endCxn id="9" idx="0"/>
-          </p:cNvCxnSpPr>
-          <p:nvPr/>
-        </p:nvCxnSpPr>
-        <p:spPr>
-          <a:xfrm flipH="1">
-            <a:off x="7125033" y="4013772"/>
-            <a:ext cx="1090650" cy="517331"/>
-          </a:xfrm>
-          <a:prstGeom prst="straightConnector1">
-            <a:avLst/>
-          </a:prstGeom>
-          <a:ln>
-            <a:tailEnd type="triangle"/>
-          </a:ln>
-        </p:spPr>
-        <p:style>
-          <a:lnRef idx="1">
-            <a:schemeClr val="accent1"/>
-          </a:lnRef>
-          <a:fillRef idx="0">
-            <a:schemeClr val="accent1"/>
-          </a:fillRef>
-          <a:effectRef idx="0">
-            <a:schemeClr val="accent1"/>
-          </a:effectRef>
-          <a:fontRef idx="minor">
-            <a:schemeClr val="tx1"/>
-          </a:fontRef>
-        </p:style>
-      </p:cxnSp>
-      <p:sp>
-        <p:nvSpPr>
-          <p:cNvPr id="39" name="TextBox 38">
-            <a:extLst>
-              <a:ext uri="{FF2B5EF4-FFF2-40B4-BE49-F238E27FC236}">
-                <a16:creationId xmlns:a16="http://schemas.microsoft.com/office/drawing/2014/main" id="{D4D94474-6CDA-CAB2-1385-826235736900}"/>
-              </a:ext>
-            </a:extLst>
-          </p:cNvPr>
-          <p:cNvSpPr txBox="1"/>
-          <p:nvPr/>
-        </p:nvSpPr>
-        <p:spPr>
-          <a:xfrm>
-            <a:off x="9350734" y="5681490"/>
-            <a:ext cx="1783737" cy="923330"/>
-          </a:xfrm>
-          <a:prstGeom prst="rect">
-            <a:avLst/>
-          </a:prstGeom>
-        </p:spPr>
-        <p:style>
-          <a:lnRef idx="2">
-            <a:schemeClr val="accent1"/>
-          </a:lnRef>
-          <a:fillRef idx="1">
-            <a:schemeClr val="lt1"/>
-          </a:fillRef>
-          <a:effectRef idx="0">
-            <a:schemeClr val="accent1"/>
-          </a:effectRef>
-          <a:fontRef idx="minor">
-            <a:schemeClr val="dk1"/>
-          </a:fontRef>
-        </p:style>
-        <p:txBody>
-          <a:bodyPr wrap="square" rtlCol="0">
-            <a:spAutoFit/>
-          </a:bodyPr>
-          <a:lstStyle/>
-          <a:p>
-            <a:pPr algn="ctr"/>
-            <a:r>
-              <a:rPr lang="en-US" dirty="0">
-                <a:solidFill>
-                  <a:schemeClr val="tx1"/>
-                </a:solidFill>
-                <a:latin typeface="Consolas" panose="020B0609020204030204" pitchFamily="49" charset="0"/>
-              </a:rPr>
-              <a:t>&lt;</a:t>
-            </a:r>
-            <a:r>
-              <a:rPr lang="en-US" b="0" dirty="0" err="1">
-                <a:solidFill>
-                  <a:schemeClr val="tx1"/>
-                </a:solidFill>
-                <a:effectLst/>
-                <a:latin typeface="Consolas" panose="020B0609020204030204" pitchFamily="49" charset="0"/>
-              </a:rPr>
-              <a:t>MyClinic</a:t>
-            </a:r>
-            <a:r>
-              <a:rPr lang="en-US" b="0" dirty="0">
-                <a:solidFill>
-                  <a:schemeClr val="tx1"/>
-                </a:solidFill>
-                <a:effectLst/>
-                <a:latin typeface="Consolas" panose="020B0609020204030204" pitchFamily="49" charset="0"/>
-              </a:rPr>
-              <a:t> /&gt;</a:t>
-            </a:r>
-          </a:p>
-          <a:p>
-            <a:pPr algn="ctr"/>
-            <a:r>
-              <a:rPr lang="en-US" dirty="0">
-                <a:solidFill>
-                  <a:schemeClr val="tx1"/>
-                </a:solidFill>
-                <a:latin typeface="Consolas" panose="020B0609020204030204" pitchFamily="49" charset="0"/>
-              </a:rPr>
-              <a:t>&lt;</a:t>
-            </a:r>
-            <a:r>
-              <a:rPr lang="en-US" b="0" dirty="0">
-                <a:solidFill>
-                  <a:schemeClr val="tx1"/>
-                </a:solidFill>
-                <a:effectLst/>
-                <a:latin typeface="Consolas" panose="020B0609020204030204" pitchFamily="49" charset="0"/>
-              </a:rPr>
-              <a:t>Claims /&gt;</a:t>
-            </a:r>
-          </a:p>
-          <a:p>
-            <a:pPr algn="ctr"/>
-            <a:r>
-              <a:rPr lang="en-US" dirty="0"/>
-              <a:t>…</a:t>
-            </a:r>
-            <a:endParaRPr lang="ru-RU" dirty="0"/>
-          </a:p>
-        </p:txBody>
-      </p:sp>
-      <p:cxnSp>
-        <p:nvCxnSpPr>
-          <p:cNvPr id="49" name="Прямая со стрелкой 48">
-            <a:extLst>
-              <a:ext uri="{FF2B5EF4-FFF2-40B4-BE49-F238E27FC236}">
-                <a16:creationId xmlns:a16="http://schemas.microsoft.com/office/drawing/2014/main" id="{5584B274-3141-068F-7183-3F0819B08A9E}"/>
-              </a:ext>
-            </a:extLst>
-          </p:cNvPr>
-          <p:cNvCxnSpPr>
-            <a:cxnSpLocks/>
-            <a:stCxn id="10" idx="2"/>
-            <a:endCxn id="8" idx="0"/>
-          </p:cNvCxnSpPr>
-          <p:nvPr/>
-        </p:nvCxnSpPr>
-        <p:spPr>
-          <a:xfrm>
-            <a:off x="8215683" y="4013772"/>
-            <a:ext cx="1958003" cy="517331"/>
-          </a:xfrm>
-          <a:prstGeom prst="straightConnector1">
-            <a:avLst/>
-          </a:prstGeom>
-          <a:ln>
-            <a:tailEnd type="triangle"/>
-          </a:ln>
-        </p:spPr>
-        <p:style>
-          <a:lnRef idx="1">
-            <a:schemeClr val="accent1"/>
-          </a:lnRef>
-          <a:fillRef idx="0">
-            <a:schemeClr val="accent1"/>
-          </a:fillRef>
-          <a:effectRef idx="0">
-            <a:schemeClr val="accent1"/>
-          </a:effectRef>
-          <a:fontRef idx="minor">
-            <a:schemeClr val="tx1"/>
-          </a:fontRef>
-        </p:style>
-      </p:cxnSp>
-      <p:cxnSp>
-        <p:nvCxnSpPr>
-          <p:cNvPr id="33" name="Прямая со стрелкой 32">
-            <a:extLst>
-              <a:ext uri="{FF2B5EF4-FFF2-40B4-BE49-F238E27FC236}">
-                <a16:creationId xmlns:a16="http://schemas.microsoft.com/office/drawing/2014/main" id="{D3A87899-AAA5-DD8B-45C3-56862AF8FF6A}"/>
-              </a:ext>
-            </a:extLst>
-          </p:cNvPr>
-          <p:cNvCxnSpPr>
-            <a:cxnSpLocks/>
-            <a:stCxn id="11" idx="3"/>
-          </p:cNvCxnSpPr>
-          <p:nvPr/>
-        </p:nvCxnSpPr>
-        <p:spPr>
-          <a:xfrm>
-            <a:off x="8885576" y="5910192"/>
-            <a:ext cx="465158" cy="76539"/>
-          </a:xfrm>
-          <a:prstGeom prst="straightConnector1">
-            <a:avLst/>
-          </a:prstGeom>
-          <a:ln>
-            <a:tailEnd type="triangle"/>
-          </a:ln>
-        </p:spPr>
-        <p:style>
-          <a:lnRef idx="1">
-            <a:schemeClr val="accent1"/>
-          </a:lnRef>
-          <a:fillRef idx="0">
-            <a:schemeClr val="accent1"/>
-          </a:fillRef>
-          <a:effectRef idx="0">
-            <a:schemeClr val="accent1"/>
-          </a:effectRef>
-          <a:fontRef idx="minor">
-            <a:schemeClr val="tx1"/>
-          </a:fontRef>
-        </p:style>
-      </p:cxnSp>
-      <p:sp>
-        <p:nvSpPr>
-          <p:cNvPr id="2" name="TextBox 1">
-            <a:extLst>
-              <a:ext uri="{FF2B5EF4-FFF2-40B4-BE49-F238E27FC236}">
-                <a16:creationId xmlns:a16="http://schemas.microsoft.com/office/drawing/2014/main" id="{D91FA4F4-9D4F-976C-F5F4-E47A4A404A3C}"/>
-              </a:ext>
-            </a:extLst>
-          </p:cNvPr>
-          <p:cNvSpPr txBox="1"/>
-          <p:nvPr/>
-        </p:nvSpPr>
-        <p:spPr>
-          <a:xfrm>
-            <a:off x="1480389" y="647880"/>
-            <a:ext cx="2025170" cy="2031325"/>
+            <a:off x="581893" y="647880"/>
+            <a:ext cx="2025170" cy="646331"/>
           </a:xfrm>
           <a:prstGeom prst="rect">
             <a:avLst/>
@@ -4462,6 +3435,3047 @@
             </a:r>
             <a:endParaRPr lang="en-US" b="1" dirty="0"/>
           </a:p>
+        </p:txBody>
+      </p:sp>
+      <p:cxnSp>
+        <p:nvCxnSpPr>
+          <p:cNvPr id="16" name="Прямая соединительная линия 15">
+            <a:extLst>
+              <a:ext uri="{FF2B5EF4-FFF2-40B4-BE49-F238E27FC236}">
+                <a16:creationId xmlns:a16="http://schemas.microsoft.com/office/drawing/2014/main" id="{DB8E3EDF-9287-DEB8-6104-FE40E91C93D4}"/>
+              </a:ext>
+            </a:extLst>
+          </p:cNvPr>
+          <p:cNvCxnSpPr/>
+          <p:nvPr/>
+        </p:nvCxnSpPr>
+        <p:spPr>
+          <a:xfrm flipV="1">
+            <a:off x="1264259" y="365760"/>
+            <a:ext cx="5224670" cy="5997895"/>
+          </a:xfrm>
+          <a:prstGeom prst="line">
+            <a:avLst/>
+          </a:prstGeom>
+        </p:spPr>
+        <p:style>
+          <a:lnRef idx="1">
+            <a:schemeClr val="accent1"/>
+          </a:lnRef>
+          <a:fillRef idx="0">
+            <a:schemeClr val="accent1"/>
+          </a:fillRef>
+          <a:effectRef idx="0">
+            <a:schemeClr val="accent1"/>
+          </a:effectRef>
+          <a:fontRef idx="minor">
+            <a:schemeClr val="tx1"/>
+          </a:fontRef>
+        </p:style>
+      </p:cxnSp>
+    </p:spTree>
+    <p:extLst>
+      <p:ext uri="{BB962C8B-B14F-4D97-AF65-F5344CB8AC3E}">
+        <p14:creationId xmlns:p14="http://schemas.microsoft.com/office/powerpoint/2010/main" val="3286016228"/>
+      </p:ext>
+    </p:extLst>
+  </p:cSld>
+  <p:clrMapOvr>
+    <a:masterClrMapping/>
+  </p:clrMapOvr>
+</p:sld>
+</file>
+
+<file path=ppt/slides/slide2.xml><?xml version="1.0" encoding="utf-8"?>
+<p:sld xmlns:a="http://schemas.openxmlformats.org/drawingml/2006/main" xmlns:r="http://schemas.openxmlformats.org/officeDocument/2006/relationships" xmlns:p="http://schemas.openxmlformats.org/presentationml/2006/main">
+  <p:cSld>
+    <p:spTree>
+      <p:nvGrpSpPr>
+        <p:cNvPr id="1" name=""/>
+        <p:cNvGrpSpPr/>
+        <p:nvPr/>
+      </p:nvGrpSpPr>
+      <p:grpSpPr>
+        <a:xfrm>
+          <a:off x="0" y="0"/>
+          <a:ext cx="0" cy="0"/>
+          <a:chOff x="0" y="0"/>
+          <a:chExt cx="0" cy="0"/>
+        </a:xfrm>
+      </p:grpSpPr>
+      <p:sp>
+        <p:nvSpPr>
+          <p:cNvPr id="4" name="TextBox 3">
+            <a:extLst>
+              <a:ext uri="{FF2B5EF4-FFF2-40B4-BE49-F238E27FC236}">
+                <a16:creationId xmlns:a16="http://schemas.microsoft.com/office/drawing/2014/main" id="{7E8C3E92-4A98-69F1-71CD-BB379DCC44E1}"/>
+              </a:ext>
+            </a:extLst>
+          </p:cNvPr>
+          <p:cNvSpPr txBox="1"/>
+          <p:nvPr/>
+        </p:nvSpPr>
+        <p:spPr>
+          <a:xfrm>
+            <a:off x="6105609" y="1201878"/>
+            <a:ext cx="2201186" cy="646331"/>
+          </a:xfrm>
+          <a:prstGeom prst="rect">
+            <a:avLst/>
+          </a:prstGeom>
+        </p:spPr>
+        <p:style>
+          <a:lnRef idx="2">
+            <a:schemeClr val="accent2"/>
+          </a:lnRef>
+          <a:fillRef idx="1">
+            <a:schemeClr val="lt1"/>
+          </a:fillRef>
+          <a:effectRef idx="0">
+            <a:schemeClr val="accent2"/>
+          </a:effectRef>
+          <a:fontRef idx="minor">
+            <a:schemeClr val="dk1"/>
+          </a:fontRef>
+        </p:style>
+        <p:txBody>
+          <a:bodyPr wrap="square" rtlCol="0">
+            <a:spAutoFit/>
+          </a:bodyPr>
+          <a:lstStyle/>
+          <a:p>
+            <a:pPr algn="ctr"/>
+            <a:r>
+              <a:rPr lang="en-US" b="1" dirty="0"/>
+              <a:t>UI (</a:t>
+            </a:r>
+            <a:r>
+              <a:rPr lang="ru-RU" b="1" dirty="0"/>
+              <a:t>интерфейс)</a:t>
+            </a:r>
+          </a:p>
+          <a:p>
+            <a:pPr algn="ctr"/>
+            <a:r>
+              <a:rPr lang="en-US" dirty="0"/>
+              <a:t>Index.js</a:t>
+            </a:r>
+            <a:endParaRPr lang="ru-RU" dirty="0"/>
+          </a:p>
+        </p:txBody>
+      </p:sp>
+      <p:sp>
+        <p:nvSpPr>
+          <p:cNvPr id="5" name="TextBox 4">
+            <a:extLst>
+              <a:ext uri="{FF2B5EF4-FFF2-40B4-BE49-F238E27FC236}">
+                <a16:creationId xmlns:a16="http://schemas.microsoft.com/office/drawing/2014/main" id="{8531AF70-F13D-C913-613F-2D0CE8822ACA}"/>
+              </a:ext>
+            </a:extLst>
+          </p:cNvPr>
+          <p:cNvSpPr txBox="1"/>
+          <p:nvPr/>
+        </p:nvSpPr>
+        <p:spPr>
+          <a:xfrm>
+            <a:off x="6801023" y="2092514"/>
+            <a:ext cx="898497" cy="369332"/>
+          </a:xfrm>
+          <a:prstGeom prst="rect">
+            <a:avLst/>
+          </a:prstGeom>
+        </p:spPr>
+        <p:style>
+          <a:lnRef idx="2">
+            <a:schemeClr val="accent1"/>
+          </a:lnRef>
+          <a:fillRef idx="1">
+            <a:schemeClr val="lt1"/>
+          </a:fillRef>
+          <a:effectRef idx="0">
+            <a:schemeClr val="accent1"/>
+          </a:effectRef>
+          <a:fontRef idx="minor">
+            <a:schemeClr val="dk1"/>
+          </a:fontRef>
+        </p:style>
+        <p:txBody>
+          <a:bodyPr wrap="square" rtlCol="0">
+            <a:spAutoFit/>
+          </a:bodyPr>
+          <a:lstStyle/>
+          <a:p>
+            <a:pPr algn="ctr"/>
+            <a:r>
+              <a:rPr lang="en-US" dirty="0"/>
+              <a:t>App.js</a:t>
+            </a:r>
+            <a:endParaRPr lang="ru-RU" dirty="0"/>
+          </a:p>
+        </p:txBody>
+      </p:sp>
+      <p:sp>
+        <p:nvSpPr>
+          <p:cNvPr id="6" name="TextBox 5">
+            <a:extLst>
+              <a:ext uri="{FF2B5EF4-FFF2-40B4-BE49-F238E27FC236}">
+                <a16:creationId xmlns:a16="http://schemas.microsoft.com/office/drawing/2014/main" id="{F9434637-765B-E1DC-F463-472B4643BA8D}"/>
+              </a:ext>
+            </a:extLst>
+          </p:cNvPr>
+          <p:cNvSpPr txBox="1"/>
+          <p:nvPr/>
+        </p:nvSpPr>
+        <p:spPr>
+          <a:xfrm>
+            <a:off x="5156423" y="2753804"/>
+            <a:ext cx="4321529" cy="646331"/>
+          </a:xfrm>
+          <a:prstGeom prst="rect">
+            <a:avLst/>
+          </a:prstGeom>
+        </p:spPr>
+        <p:style>
+          <a:lnRef idx="2">
+            <a:schemeClr val="accent1"/>
+          </a:lnRef>
+          <a:fillRef idx="1">
+            <a:schemeClr val="lt1"/>
+          </a:fillRef>
+          <a:effectRef idx="0">
+            <a:schemeClr val="accent1"/>
+          </a:effectRef>
+          <a:fontRef idx="minor">
+            <a:schemeClr val="dk1"/>
+          </a:fontRef>
+        </p:style>
+        <p:txBody>
+          <a:bodyPr wrap="square" rtlCol="0">
+            <a:spAutoFit/>
+          </a:bodyPr>
+          <a:lstStyle/>
+          <a:p>
+            <a:pPr algn="ctr"/>
+            <a:r>
+              <a:rPr lang="en-US" b="0" dirty="0">
+                <a:solidFill>
+                  <a:srgbClr val="4EC9B0"/>
+                </a:solidFill>
+                <a:effectLst/>
+                <a:latin typeface="Consolas" panose="020B0609020204030204" pitchFamily="49" charset="0"/>
+              </a:rPr>
+              <a:t>&lt;</a:t>
+            </a:r>
+            <a:r>
+              <a:rPr lang="en-US" b="0" dirty="0" err="1">
+                <a:solidFill>
+                  <a:srgbClr val="4EC9B0"/>
+                </a:solidFill>
+                <a:effectLst/>
+                <a:latin typeface="Consolas" panose="020B0609020204030204" pitchFamily="49" charset="0"/>
+              </a:rPr>
+              <a:t>BrowserRouter</a:t>
+            </a:r>
+            <a:r>
+              <a:rPr lang="en-US" b="0" dirty="0">
+                <a:solidFill>
+                  <a:srgbClr val="4EC9B0"/>
+                </a:solidFill>
+                <a:effectLst/>
+                <a:latin typeface="Consolas" panose="020B0609020204030204" pitchFamily="49" charset="0"/>
+              </a:rPr>
+              <a:t>&gt;</a:t>
+            </a:r>
+          </a:p>
+          <a:p>
+            <a:pPr algn="ctr"/>
+            <a:r>
+              <a:rPr lang="en-US" b="0" dirty="0">
+                <a:solidFill>
+                  <a:srgbClr val="808080"/>
+                </a:solidFill>
+                <a:effectLst/>
+                <a:latin typeface="Consolas" panose="020B0609020204030204" pitchFamily="49" charset="0"/>
+              </a:rPr>
+              <a:t>&lt;</a:t>
+            </a:r>
+            <a:r>
+              <a:rPr lang="en-US" b="0" dirty="0">
+                <a:solidFill>
+                  <a:srgbClr val="569CD6"/>
+                </a:solidFill>
+                <a:effectLst/>
+                <a:latin typeface="Consolas" panose="020B0609020204030204" pitchFamily="49" charset="0"/>
+              </a:rPr>
+              <a:t>div</a:t>
+            </a:r>
+            <a:r>
+              <a:rPr lang="en-US" b="0" dirty="0">
+                <a:solidFill>
+                  <a:srgbClr val="CCCCCC"/>
+                </a:solidFill>
+                <a:effectLst/>
+                <a:latin typeface="Consolas" panose="020B0609020204030204" pitchFamily="49" charset="0"/>
+              </a:rPr>
+              <a:t> </a:t>
+            </a:r>
+            <a:r>
+              <a:rPr lang="en-US" b="0" dirty="0" err="1">
+                <a:solidFill>
+                  <a:srgbClr val="9CDCFE"/>
+                </a:solidFill>
+                <a:effectLst/>
+                <a:latin typeface="Consolas" panose="020B0609020204030204" pitchFamily="49" charset="0"/>
+              </a:rPr>
+              <a:t>className</a:t>
+            </a:r>
+            <a:r>
+              <a:rPr lang="en-US" b="0" dirty="0">
+                <a:solidFill>
+                  <a:srgbClr val="D4D4D4"/>
+                </a:solidFill>
+                <a:effectLst/>
+                <a:latin typeface="Consolas" panose="020B0609020204030204" pitchFamily="49" charset="0"/>
+              </a:rPr>
+              <a:t>=</a:t>
+            </a:r>
+            <a:r>
+              <a:rPr lang="en-US" b="0" dirty="0">
+                <a:solidFill>
+                  <a:srgbClr val="CE9178"/>
+                </a:solidFill>
+                <a:effectLst/>
+                <a:latin typeface="Consolas" panose="020B0609020204030204" pitchFamily="49" charset="0"/>
+              </a:rPr>
+              <a:t>"app-wrapper"</a:t>
+            </a:r>
+            <a:r>
+              <a:rPr lang="en-US" b="0" dirty="0">
+                <a:solidFill>
+                  <a:srgbClr val="808080"/>
+                </a:solidFill>
+                <a:effectLst/>
+                <a:latin typeface="Consolas" panose="020B0609020204030204" pitchFamily="49" charset="0"/>
+              </a:rPr>
+              <a:t>&gt;</a:t>
+            </a:r>
+            <a:endParaRPr lang="en-US" b="0" dirty="0">
+              <a:solidFill>
+                <a:srgbClr val="CCCCCC"/>
+              </a:solidFill>
+              <a:effectLst/>
+              <a:latin typeface="Consolas" panose="020B0609020204030204" pitchFamily="49" charset="0"/>
+            </a:endParaRPr>
+          </a:p>
+        </p:txBody>
+      </p:sp>
+      <p:sp>
+        <p:nvSpPr>
+          <p:cNvPr id="10" name="TextBox 9">
+            <a:extLst>
+              <a:ext uri="{FF2B5EF4-FFF2-40B4-BE49-F238E27FC236}">
+                <a16:creationId xmlns:a16="http://schemas.microsoft.com/office/drawing/2014/main" id="{7324D25F-3F9B-D4C2-00B6-203189BEAB3E}"/>
+              </a:ext>
+            </a:extLst>
+          </p:cNvPr>
+          <p:cNvSpPr txBox="1"/>
+          <p:nvPr/>
+        </p:nvSpPr>
+        <p:spPr>
+          <a:xfrm>
+            <a:off x="6488929" y="3644440"/>
+            <a:ext cx="1656515" cy="369332"/>
+          </a:xfrm>
+          <a:prstGeom prst="rect">
+            <a:avLst/>
+          </a:prstGeom>
+        </p:spPr>
+        <p:style>
+          <a:lnRef idx="2">
+            <a:schemeClr val="accent1"/>
+          </a:lnRef>
+          <a:fillRef idx="1">
+            <a:schemeClr val="lt1"/>
+          </a:fillRef>
+          <a:effectRef idx="0">
+            <a:schemeClr val="accent1"/>
+          </a:effectRef>
+          <a:fontRef idx="minor">
+            <a:schemeClr val="dk1"/>
+          </a:fontRef>
+        </p:style>
+        <p:txBody>
+          <a:bodyPr wrap="square" rtlCol="0">
+            <a:spAutoFit/>
+          </a:bodyPr>
+          <a:lstStyle/>
+          <a:p>
+            <a:pPr algn="ctr"/>
+            <a:r>
+              <a:rPr lang="en-US" dirty="0"/>
+              <a:t>Components</a:t>
+            </a:r>
+            <a:endParaRPr lang="ru-RU" dirty="0"/>
+          </a:p>
+        </p:txBody>
+      </p:sp>
+      <p:cxnSp>
+        <p:nvCxnSpPr>
+          <p:cNvPr id="13" name="Прямая со стрелкой 12">
+            <a:extLst>
+              <a:ext uri="{FF2B5EF4-FFF2-40B4-BE49-F238E27FC236}">
+                <a16:creationId xmlns:a16="http://schemas.microsoft.com/office/drawing/2014/main" id="{49F8C886-8CB8-5E76-D5EB-D0BD5849E884}"/>
+              </a:ext>
+            </a:extLst>
+          </p:cNvPr>
+          <p:cNvCxnSpPr>
+            <a:cxnSpLocks/>
+            <a:endCxn id="5" idx="0"/>
+          </p:cNvCxnSpPr>
+          <p:nvPr/>
+        </p:nvCxnSpPr>
+        <p:spPr>
+          <a:xfrm>
+            <a:off x="7248941" y="1872128"/>
+            <a:ext cx="1331" cy="220386"/>
+          </a:xfrm>
+          <a:prstGeom prst="straightConnector1">
+            <a:avLst/>
+          </a:prstGeom>
+          <a:ln>
+            <a:tailEnd type="triangle"/>
+          </a:ln>
+        </p:spPr>
+        <p:style>
+          <a:lnRef idx="1">
+            <a:schemeClr val="accent1"/>
+          </a:lnRef>
+          <a:fillRef idx="0">
+            <a:schemeClr val="accent1"/>
+          </a:fillRef>
+          <a:effectRef idx="0">
+            <a:schemeClr val="accent1"/>
+          </a:effectRef>
+          <a:fontRef idx="minor">
+            <a:schemeClr val="tx1"/>
+          </a:fontRef>
+        </p:style>
+      </p:cxnSp>
+      <p:cxnSp>
+        <p:nvCxnSpPr>
+          <p:cNvPr id="14" name="Прямая со стрелкой 13">
+            <a:extLst>
+              <a:ext uri="{FF2B5EF4-FFF2-40B4-BE49-F238E27FC236}">
+                <a16:creationId xmlns:a16="http://schemas.microsoft.com/office/drawing/2014/main" id="{F0FEE40E-62DB-1F31-AE30-5DC65489B89F}"/>
+              </a:ext>
+            </a:extLst>
+          </p:cNvPr>
+          <p:cNvCxnSpPr/>
+          <p:nvPr/>
+        </p:nvCxnSpPr>
+        <p:spPr>
+          <a:xfrm>
+            <a:off x="7258220" y="2477752"/>
+            <a:ext cx="1331" cy="220386"/>
+          </a:xfrm>
+          <a:prstGeom prst="straightConnector1">
+            <a:avLst/>
+          </a:prstGeom>
+          <a:ln>
+            <a:tailEnd type="triangle"/>
+          </a:ln>
+        </p:spPr>
+        <p:style>
+          <a:lnRef idx="1">
+            <a:schemeClr val="accent1"/>
+          </a:lnRef>
+          <a:fillRef idx="0">
+            <a:schemeClr val="accent1"/>
+          </a:fillRef>
+          <a:effectRef idx="0">
+            <a:schemeClr val="accent1"/>
+          </a:effectRef>
+          <a:fontRef idx="minor">
+            <a:schemeClr val="tx1"/>
+          </a:fontRef>
+        </p:style>
+      </p:cxnSp>
+      <p:cxnSp>
+        <p:nvCxnSpPr>
+          <p:cNvPr id="15" name="Прямая со стрелкой 14">
+            <a:extLst>
+              <a:ext uri="{FF2B5EF4-FFF2-40B4-BE49-F238E27FC236}">
+                <a16:creationId xmlns:a16="http://schemas.microsoft.com/office/drawing/2014/main" id="{C6FD266F-6C3A-68F8-821F-B62F40F36E48}"/>
+              </a:ext>
+            </a:extLst>
+          </p:cNvPr>
+          <p:cNvCxnSpPr>
+            <a:cxnSpLocks/>
+            <a:stCxn id="6" idx="2"/>
+            <a:endCxn id="10" idx="0"/>
+          </p:cNvCxnSpPr>
+          <p:nvPr/>
+        </p:nvCxnSpPr>
+        <p:spPr>
+          <a:xfrm flipH="1">
+            <a:off x="7317187" y="3400135"/>
+            <a:ext cx="1" cy="244305"/>
+          </a:xfrm>
+          <a:prstGeom prst="straightConnector1">
+            <a:avLst/>
+          </a:prstGeom>
+          <a:ln>
+            <a:tailEnd type="triangle"/>
+          </a:ln>
+        </p:spPr>
+        <p:style>
+          <a:lnRef idx="1">
+            <a:schemeClr val="accent1"/>
+          </a:lnRef>
+          <a:fillRef idx="0">
+            <a:schemeClr val="accent1"/>
+          </a:fillRef>
+          <a:effectRef idx="0">
+            <a:schemeClr val="accent1"/>
+          </a:effectRef>
+          <a:fontRef idx="minor">
+            <a:schemeClr val="tx1"/>
+          </a:fontRef>
+        </p:style>
+      </p:cxnSp>
+      <p:sp>
+        <p:nvSpPr>
+          <p:cNvPr id="3" name="TextBox 2">
+            <a:extLst>
+              <a:ext uri="{FF2B5EF4-FFF2-40B4-BE49-F238E27FC236}">
+                <a16:creationId xmlns:a16="http://schemas.microsoft.com/office/drawing/2014/main" id="{0A8438E5-CCA3-C4EF-2410-39C67501CCE4}"/>
+              </a:ext>
+            </a:extLst>
+          </p:cNvPr>
+          <p:cNvSpPr txBox="1"/>
+          <p:nvPr/>
+        </p:nvSpPr>
+        <p:spPr>
+          <a:xfrm>
+            <a:off x="581893" y="647880"/>
+            <a:ext cx="2025170" cy="2031325"/>
+          </a:xfrm>
+          <a:prstGeom prst="rect">
+            <a:avLst/>
+          </a:prstGeom>
+        </p:spPr>
+        <p:style>
+          <a:lnRef idx="2">
+            <a:schemeClr val="accent2"/>
+          </a:lnRef>
+          <a:fillRef idx="1">
+            <a:schemeClr val="lt1"/>
+          </a:fillRef>
+          <a:effectRef idx="0">
+            <a:schemeClr val="accent2"/>
+          </a:effectRef>
+          <a:fontRef idx="minor">
+            <a:schemeClr val="dk1"/>
+          </a:fontRef>
+        </p:style>
+        <p:txBody>
+          <a:bodyPr wrap="none" rtlCol="0">
+            <a:spAutoFit/>
+          </a:bodyPr>
+          <a:lstStyle/>
+          <a:p>
+            <a:r>
+              <a:rPr lang="ru-RU" b="1" dirty="0"/>
+              <a:t>Бизнес</a:t>
+            </a:r>
+          </a:p>
+          <a:p>
+            <a:r>
+              <a:rPr lang="ru-RU" b="1" dirty="0"/>
+              <a:t>(данные и логика)</a:t>
+            </a:r>
+            <a:endParaRPr lang="en-US" b="1" dirty="0"/>
+          </a:p>
+          <a:p>
+            <a:endParaRPr lang="en-US" b="1" dirty="0"/>
+          </a:p>
+          <a:p>
+            <a:r>
+              <a:rPr lang="en-US" b="1" dirty="0"/>
+              <a:t>DATA &amp; Functions</a:t>
+            </a:r>
+          </a:p>
+          <a:p>
+            <a:r>
+              <a:rPr lang="en-US" dirty="0" err="1"/>
+              <a:t>navItems</a:t>
+            </a:r>
+            <a:r>
+              <a:rPr lang="en-US" dirty="0"/>
+              <a:t>, </a:t>
+            </a:r>
+          </a:p>
+          <a:p>
+            <a:r>
+              <a:rPr lang="en-US" dirty="0" err="1"/>
+              <a:t>JSONForMyClinics</a:t>
+            </a:r>
+            <a:r>
+              <a:rPr lang="en-US" dirty="0"/>
+              <a:t>,</a:t>
+            </a:r>
+          </a:p>
+          <a:p>
+            <a:r>
+              <a:rPr lang="en-US" dirty="0"/>
+              <a:t>…..</a:t>
+            </a:r>
+            <a:endParaRPr lang="ru-RU" dirty="0"/>
+          </a:p>
+        </p:txBody>
+      </p:sp>
+      <p:cxnSp>
+        <p:nvCxnSpPr>
+          <p:cNvPr id="16" name="Прямая соединительная линия 15">
+            <a:extLst>
+              <a:ext uri="{FF2B5EF4-FFF2-40B4-BE49-F238E27FC236}">
+                <a16:creationId xmlns:a16="http://schemas.microsoft.com/office/drawing/2014/main" id="{DB8E3EDF-9287-DEB8-6104-FE40E91C93D4}"/>
+              </a:ext>
+            </a:extLst>
+          </p:cNvPr>
+          <p:cNvCxnSpPr/>
+          <p:nvPr/>
+        </p:nvCxnSpPr>
+        <p:spPr>
+          <a:xfrm flipV="1">
+            <a:off x="1264259" y="365760"/>
+            <a:ext cx="5224670" cy="5997895"/>
+          </a:xfrm>
+          <a:prstGeom prst="line">
+            <a:avLst/>
+          </a:prstGeom>
+        </p:spPr>
+        <p:style>
+          <a:lnRef idx="1">
+            <a:schemeClr val="accent1"/>
+          </a:lnRef>
+          <a:fillRef idx="0">
+            <a:schemeClr val="accent1"/>
+          </a:fillRef>
+          <a:effectRef idx="0">
+            <a:schemeClr val="accent1"/>
+          </a:effectRef>
+          <a:fontRef idx="minor">
+            <a:schemeClr val="tx1"/>
+          </a:fontRef>
+        </p:style>
+      </p:cxnSp>
+    </p:spTree>
+    <p:extLst>
+      <p:ext uri="{BB962C8B-B14F-4D97-AF65-F5344CB8AC3E}">
+        <p14:creationId xmlns:p14="http://schemas.microsoft.com/office/powerpoint/2010/main" val="3166132551"/>
+      </p:ext>
+    </p:extLst>
+  </p:cSld>
+  <p:clrMapOvr>
+    <a:masterClrMapping/>
+  </p:clrMapOvr>
+</p:sld>
+</file>
+
+<file path=ppt/slides/slide3.xml><?xml version="1.0" encoding="utf-8"?>
+<p:sld xmlns:a="http://schemas.openxmlformats.org/drawingml/2006/main" xmlns:r="http://schemas.openxmlformats.org/officeDocument/2006/relationships" xmlns:p="http://schemas.openxmlformats.org/presentationml/2006/main">
+  <p:cSld>
+    <p:spTree>
+      <p:nvGrpSpPr>
+        <p:cNvPr id="1" name=""/>
+        <p:cNvGrpSpPr/>
+        <p:nvPr/>
+      </p:nvGrpSpPr>
+      <p:grpSpPr>
+        <a:xfrm>
+          <a:off x="0" y="0"/>
+          <a:ext cx="0" cy="0"/>
+          <a:chOff x="0" y="0"/>
+          <a:chExt cx="0" cy="0"/>
+        </a:xfrm>
+      </p:grpSpPr>
+      <p:sp>
+        <p:nvSpPr>
+          <p:cNvPr id="4" name="TextBox 3">
+            <a:extLst>
+              <a:ext uri="{FF2B5EF4-FFF2-40B4-BE49-F238E27FC236}">
+                <a16:creationId xmlns:a16="http://schemas.microsoft.com/office/drawing/2014/main" id="{7E8C3E92-4A98-69F1-71CD-BB379DCC44E1}"/>
+              </a:ext>
+            </a:extLst>
+          </p:cNvPr>
+          <p:cNvSpPr txBox="1"/>
+          <p:nvPr/>
+        </p:nvSpPr>
+        <p:spPr>
+          <a:xfrm>
+            <a:off x="6105609" y="1201878"/>
+            <a:ext cx="2201186" cy="646331"/>
+          </a:xfrm>
+          <a:prstGeom prst="rect">
+            <a:avLst/>
+          </a:prstGeom>
+        </p:spPr>
+        <p:style>
+          <a:lnRef idx="2">
+            <a:schemeClr val="accent2"/>
+          </a:lnRef>
+          <a:fillRef idx="1">
+            <a:schemeClr val="lt1"/>
+          </a:fillRef>
+          <a:effectRef idx="0">
+            <a:schemeClr val="accent2"/>
+          </a:effectRef>
+          <a:fontRef idx="minor">
+            <a:schemeClr val="dk1"/>
+          </a:fontRef>
+        </p:style>
+        <p:txBody>
+          <a:bodyPr wrap="square" rtlCol="0">
+            <a:spAutoFit/>
+          </a:bodyPr>
+          <a:lstStyle/>
+          <a:p>
+            <a:pPr algn="ctr"/>
+            <a:r>
+              <a:rPr lang="en-US" b="1" dirty="0"/>
+              <a:t>UI (</a:t>
+            </a:r>
+            <a:r>
+              <a:rPr lang="ru-RU" b="1" dirty="0"/>
+              <a:t>интерфейс)</a:t>
+            </a:r>
+          </a:p>
+          <a:p>
+            <a:pPr algn="ctr"/>
+            <a:r>
+              <a:rPr lang="en-US" dirty="0"/>
+              <a:t>Index.js</a:t>
+            </a:r>
+            <a:endParaRPr lang="ru-RU" dirty="0"/>
+          </a:p>
+        </p:txBody>
+      </p:sp>
+      <p:sp>
+        <p:nvSpPr>
+          <p:cNvPr id="5" name="TextBox 4">
+            <a:extLst>
+              <a:ext uri="{FF2B5EF4-FFF2-40B4-BE49-F238E27FC236}">
+                <a16:creationId xmlns:a16="http://schemas.microsoft.com/office/drawing/2014/main" id="{8531AF70-F13D-C913-613F-2D0CE8822ACA}"/>
+              </a:ext>
+            </a:extLst>
+          </p:cNvPr>
+          <p:cNvSpPr txBox="1"/>
+          <p:nvPr/>
+        </p:nvSpPr>
+        <p:spPr>
+          <a:xfrm>
+            <a:off x="6801023" y="2092514"/>
+            <a:ext cx="898497" cy="369332"/>
+          </a:xfrm>
+          <a:prstGeom prst="rect">
+            <a:avLst/>
+          </a:prstGeom>
+        </p:spPr>
+        <p:style>
+          <a:lnRef idx="2">
+            <a:schemeClr val="accent1"/>
+          </a:lnRef>
+          <a:fillRef idx="1">
+            <a:schemeClr val="lt1"/>
+          </a:fillRef>
+          <a:effectRef idx="0">
+            <a:schemeClr val="accent1"/>
+          </a:effectRef>
+          <a:fontRef idx="minor">
+            <a:schemeClr val="dk1"/>
+          </a:fontRef>
+        </p:style>
+        <p:txBody>
+          <a:bodyPr wrap="square" rtlCol="0">
+            <a:spAutoFit/>
+          </a:bodyPr>
+          <a:lstStyle/>
+          <a:p>
+            <a:pPr algn="ctr"/>
+            <a:r>
+              <a:rPr lang="en-US" dirty="0"/>
+              <a:t>App.js</a:t>
+            </a:r>
+            <a:endParaRPr lang="ru-RU" dirty="0"/>
+          </a:p>
+        </p:txBody>
+      </p:sp>
+      <p:sp>
+        <p:nvSpPr>
+          <p:cNvPr id="6" name="TextBox 5">
+            <a:extLst>
+              <a:ext uri="{FF2B5EF4-FFF2-40B4-BE49-F238E27FC236}">
+                <a16:creationId xmlns:a16="http://schemas.microsoft.com/office/drawing/2014/main" id="{F9434637-765B-E1DC-F463-472B4643BA8D}"/>
+              </a:ext>
+            </a:extLst>
+          </p:cNvPr>
+          <p:cNvSpPr txBox="1"/>
+          <p:nvPr/>
+        </p:nvSpPr>
+        <p:spPr>
+          <a:xfrm>
+            <a:off x="5156423" y="2753804"/>
+            <a:ext cx="4321529" cy="646331"/>
+          </a:xfrm>
+          <a:prstGeom prst="rect">
+            <a:avLst/>
+          </a:prstGeom>
+        </p:spPr>
+        <p:style>
+          <a:lnRef idx="2">
+            <a:schemeClr val="accent1"/>
+          </a:lnRef>
+          <a:fillRef idx="1">
+            <a:schemeClr val="lt1"/>
+          </a:fillRef>
+          <a:effectRef idx="0">
+            <a:schemeClr val="accent1"/>
+          </a:effectRef>
+          <a:fontRef idx="minor">
+            <a:schemeClr val="dk1"/>
+          </a:fontRef>
+        </p:style>
+        <p:txBody>
+          <a:bodyPr wrap="square" rtlCol="0">
+            <a:spAutoFit/>
+          </a:bodyPr>
+          <a:lstStyle/>
+          <a:p>
+            <a:pPr algn="ctr"/>
+            <a:r>
+              <a:rPr lang="en-US" b="0" dirty="0">
+                <a:solidFill>
+                  <a:srgbClr val="4EC9B0"/>
+                </a:solidFill>
+                <a:effectLst/>
+                <a:latin typeface="Consolas" panose="020B0609020204030204" pitchFamily="49" charset="0"/>
+              </a:rPr>
+              <a:t>&lt;</a:t>
+            </a:r>
+            <a:r>
+              <a:rPr lang="en-US" b="0" dirty="0" err="1">
+                <a:solidFill>
+                  <a:srgbClr val="4EC9B0"/>
+                </a:solidFill>
+                <a:effectLst/>
+                <a:latin typeface="Consolas" panose="020B0609020204030204" pitchFamily="49" charset="0"/>
+              </a:rPr>
+              <a:t>BrowserRouter</a:t>
+            </a:r>
+            <a:r>
+              <a:rPr lang="en-US" b="0" dirty="0">
+                <a:solidFill>
+                  <a:srgbClr val="4EC9B0"/>
+                </a:solidFill>
+                <a:effectLst/>
+                <a:latin typeface="Consolas" panose="020B0609020204030204" pitchFamily="49" charset="0"/>
+              </a:rPr>
+              <a:t>&gt;</a:t>
+            </a:r>
+          </a:p>
+          <a:p>
+            <a:pPr algn="ctr"/>
+            <a:r>
+              <a:rPr lang="en-US" b="0" dirty="0">
+                <a:solidFill>
+                  <a:srgbClr val="808080"/>
+                </a:solidFill>
+                <a:effectLst/>
+                <a:latin typeface="Consolas" panose="020B0609020204030204" pitchFamily="49" charset="0"/>
+              </a:rPr>
+              <a:t>&lt;</a:t>
+            </a:r>
+            <a:r>
+              <a:rPr lang="en-US" b="0" dirty="0">
+                <a:solidFill>
+                  <a:srgbClr val="569CD6"/>
+                </a:solidFill>
+                <a:effectLst/>
+                <a:latin typeface="Consolas" panose="020B0609020204030204" pitchFamily="49" charset="0"/>
+              </a:rPr>
+              <a:t>div</a:t>
+            </a:r>
+            <a:r>
+              <a:rPr lang="en-US" b="0" dirty="0">
+                <a:solidFill>
+                  <a:srgbClr val="CCCCCC"/>
+                </a:solidFill>
+                <a:effectLst/>
+                <a:latin typeface="Consolas" panose="020B0609020204030204" pitchFamily="49" charset="0"/>
+              </a:rPr>
+              <a:t> </a:t>
+            </a:r>
+            <a:r>
+              <a:rPr lang="en-US" b="0" dirty="0" err="1">
+                <a:solidFill>
+                  <a:srgbClr val="9CDCFE"/>
+                </a:solidFill>
+                <a:effectLst/>
+                <a:latin typeface="Consolas" panose="020B0609020204030204" pitchFamily="49" charset="0"/>
+              </a:rPr>
+              <a:t>className</a:t>
+            </a:r>
+            <a:r>
+              <a:rPr lang="en-US" b="0" dirty="0">
+                <a:solidFill>
+                  <a:srgbClr val="D4D4D4"/>
+                </a:solidFill>
+                <a:effectLst/>
+                <a:latin typeface="Consolas" panose="020B0609020204030204" pitchFamily="49" charset="0"/>
+              </a:rPr>
+              <a:t>=</a:t>
+            </a:r>
+            <a:r>
+              <a:rPr lang="en-US" b="0" dirty="0">
+                <a:solidFill>
+                  <a:srgbClr val="CE9178"/>
+                </a:solidFill>
+                <a:effectLst/>
+                <a:latin typeface="Consolas" panose="020B0609020204030204" pitchFamily="49" charset="0"/>
+              </a:rPr>
+              <a:t>"app-wrapper"</a:t>
+            </a:r>
+            <a:r>
+              <a:rPr lang="en-US" b="0" dirty="0">
+                <a:solidFill>
+                  <a:srgbClr val="808080"/>
+                </a:solidFill>
+                <a:effectLst/>
+                <a:latin typeface="Consolas" panose="020B0609020204030204" pitchFamily="49" charset="0"/>
+              </a:rPr>
+              <a:t>&gt;</a:t>
+            </a:r>
+            <a:endParaRPr lang="en-US" b="0" dirty="0">
+              <a:solidFill>
+                <a:srgbClr val="CCCCCC"/>
+              </a:solidFill>
+              <a:effectLst/>
+              <a:latin typeface="Consolas" panose="020B0609020204030204" pitchFamily="49" charset="0"/>
+            </a:endParaRPr>
+          </a:p>
+        </p:txBody>
+      </p:sp>
+      <p:sp>
+        <p:nvSpPr>
+          <p:cNvPr id="7" name="TextBox 6">
+            <a:extLst>
+              <a:ext uri="{FF2B5EF4-FFF2-40B4-BE49-F238E27FC236}">
+                <a16:creationId xmlns:a16="http://schemas.microsoft.com/office/drawing/2014/main" id="{C4E4581A-943E-3F07-D7B3-487175FDD70D}"/>
+              </a:ext>
+            </a:extLst>
+          </p:cNvPr>
+          <p:cNvSpPr txBox="1"/>
+          <p:nvPr/>
+        </p:nvSpPr>
+        <p:spPr>
+          <a:xfrm>
+            <a:off x="3983619" y="4531103"/>
+            <a:ext cx="1315934" cy="369332"/>
+          </a:xfrm>
+          <a:prstGeom prst="rect">
+            <a:avLst/>
+          </a:prstGeom>
+        </p:spPr>
+        <p:style>
+          <a:lnRef idx="2">
+            <a:schemeClr val="accent1"/>
+          </a:lnRef>
+          <a:fillRef idx="1">
+            <a:schemeClr val="lt1"/>
+          </a:fillRef>
+          <a:effectRef idx="0">
+            <a:schemeClr val="accent1"/>
+          </a:effectRef>
+          <a:fontRef idx="minor">
+            <a:schemeClr val="dk1"/>
+          </a:fontRef>
+        </p:style>
+        <p:txBody>
+          <a:bodyPr wrap="square" rtlCol="0">
+            <a:spAutoFit/>
+          </a:bodyPr>
+          <a:lstStyle/>
+          <a:p>
+            <a:pPr algn="ctr"/>
+            <a:r>
+              <a:rPr lang="en-US" dirty="0"/>
+              <a:t>&lt;Header /&gt;</a:t>
+            </a:r>
+            <a:endParaRPr lang="ru-RU" dirty="0"/>
+          </a:p>
+        </p:txBody>
+      </p:sp>
+      <p:sp>
+        <p:nvSpPr>
+          <p:cNvPr id="8" name="TextBox 7">
+            <a:extLst>
+              <a:ext uri="{FF2B5EF4-FFF2-40B4-BE49-F238E27FC236}">
+                <a16:creationId xmlns:a16="http://schemas.microsoft.com/office/drawing/2014/main" id="{09C7CD4A-5623-A969-D88D-4792EEF52F9A}"/>
+              </a:ext>
+            </a:extLst>
+          </p:cNvPr>
+          <p:cNvSpPr txBox="1"/>
+          <p:nvPr/>
+        </p:nvSpPr>
+        <p:spPr>
+          <a:xfrm>
+            <a:off x="7433141" y="4531103"/>
+            <a:ext cx="3684098" cy="923330"/>
+          </a:xfrm>
+          <a:prstGeom prst="rect">
+            <a:avLst/>
+          </a:prstGeom>
+        </p:spPr>
+        <p:style>
+          <a:lnRef idx="2">
+            <a:schemeClr val="accent1"/>
+          </a:lnRef>
+          <a:fillRef idx="1">
+            <a:schemeClr val="lt1"/>
+          </a:fillRef>
+          <a:effectRef idx="0">
+            <a:schemeClr val="accent1"/>
+          </a:effectRef>
+          <a:fontRef idx="minor">
+            <a:schemeClr val="dk1"/>
+          </a:fontRef>
+        </p:style>
+        <p:txBody>
+          <a:bodyPr wrap="square" rtlCol="0">
+            <a:spAutoFit/>
+          </a:bodyPr>
+          <a:lstStyle/>
+          <a:p>
+            <a:pPr algn="ctr"/>
+            <a:r>
+              <a:rPr lang="en-US" b="0" dirty="0">
+                <a:solidFill>
+                  <a:schemeClr val="tx1"/>
+                </a:solidFill>
+                <a:effectLst/>
+                <a:latin typeface="Consolas" panose="020B0609020204030204" pitchFamily="49" charset="0"/>
+              </a:rPr>
+              <a:t>Pages</a:t>
+            </a:r>
+            <a:endParaRPr lang="ru-RU" b="0" dirty="0">
+              <a:solidFill>
+                <a:schemeClr val="tx1"/>
+              </a:solidFill>
+              <a:effectLst/>
+              <a:latin typeface="Consolas" panose="020B0609020204030204" pitchFamily="49" charset="0"/>
+            </a:endParaRPr>
+          </a:p>
+          <a:p>
+            <a:pPr algn="ctr"/>
+            <a:r>
+              <a:rPr lang="en-US" b="0" dirty="0">
+                <a:solidFill>
+                  <a:srgbClr val="808080"/>
+                </a:solidFill>
+                <a:effectLst/>
+                <a:latin typeface="Consolas" panose="020B0609020204030204" pitchFamily="49" charset="0"/>
+              </a:rPr>
+              <a:t>&lt;</a:t>
+            </a:r>
+            <a:r>
+              <a:rPr lang="en-US" b="0" dirty="0">
+                <a:solidFill>
+                  <a:srgbClr val="569CD6"/>
+                </a:solidFill>
+                <a:effectLst/>
+                <a:latin typeface="Consolas" panose="020B0609020204030204" pitchFamily="49" charset="0"/>
+              </a:rPr>
+              <a:t>div</a:t>
+            </a:r>
+            <a:r>
+              <a:rPr lang="en-US" b="0" dirty="0">
+                <a:solidFill>
+                  <a:srgbClr val="CCCCCC"/>
+                </a:solidFill>
+                <a:effectLst/>
+                <a:latin typeface="Consolas" panose="020B0609020204030204" pitchFamily="49" charset="0"/>
+              </a:rPr>
+              <a:t> </a:t>
+            </a:r>
+            <a:r>
+              <a:rPr lang="en-US" b="0" dirty="0" err="1">
+                <a:solidFill>
+                  <a:srgbClr val="9CDCFE"/>
+                </a:solidFill>
+                <a:effectLst/>
+                <a:latin typeface="Consolas" panose="020B0609020204030204" pitchFamily="49" charset="0"/>
+              </a:rPr>
+              <a:t>className</a:t>
+            </a:r>
+            <a:r>
+              <a:rPr lang="en-US" b="0" dirty="0">
+                <a:solidFill>
+                  <a:srgbClr val="D4D4D4"/>
+                </a:solidFill>
+                <a:effectLst/>
+                <a:latin typeface="Consolas" panose="020B0609020204030204" pitchFamily="49" charset="0"/>
+              </a:rPr>
+              <a:t>=</a:t>
+            </a:r>
+            <a:r>
+              <a:rPr lang="en-US" b="0" dirty="0">
+                <a:solidFill>
+                  <a:srgbClr val="CE9178"/>
+                </a:solidFill>
+                <a:effectLst/>
+                <a:latin typeface="Consolas" panose="020B0609020204030204" pitchFamily="49" charset="0"/>
+              </a:rPr>
+              <a:t>"content"</a:t>
+            </a:r>
+            <a:r>
+              <a:rPr lang="en-US" b="0" dirty="0">
+                <a:solidFill>
+                  <a:srgbClr val="808080"/>
+                </a:solidFill>
+                <a:effectLst/>
+                <a:latin typeface="Consolas" panose="020B0609020204030204" pitchFamily="49" charset="0"/>
+              </a:rPr>
+              <a:t>&gt;</a:t>
+            </a:r>
+          </a:p>
+          <a:p>
+            <a:pPr algn="ctr"/>
+            <a:r>
+              <a:rPr lang="en-US" b="0" dirty="0">
+                <a:solidFill>
+                  <a:srgbClr val="808080"/>
+                </a:solidFill>
+                <a:effectLst/>
+                <a:latin typeface="Consolas" panose="020B0609020204030204" pitchFamily="49" charset="0"/>
+              </a:rPr>
+              <a:t>&lt;</a:t>
+            </a:r>
+            <a:r>
+              <a:rPr lang="en-US" b="0" dirty="0">
+                <a:solidFill>
+                  <a:srgbClr val="4EC9B0"/>
+                </a:solidFill>
+                <a:effectLst/>
+                <a:latin typeface="Consolas" panose="020B0609020204030204" pitchFamily="49" charset="0"/>
+              </a:rPr>
+              <a:t>Routes</a:t>
+            </a:r>
+            <a:r>
+              <a:rPr lang="en-US" b="0" dirty="0">
+                <a:solidFill>
+                  <a:srgbClr val="808080"/>
+                </a:solidFill>
+                <a:effectLst/>
+                <a:latin typeface="Consolas" panose="020B0609020204030204" pitchFamily="49" charset="0"/>
+              </a:rPr>
+              <a:t>&gt;</a:t>
+            </a:r>
+            <a:endParaRPr lang="en-US" b="0" dirty="0">
+              <a:solidFill>
+                <a:srgbClr val="CCCCCC"/>
+              </a:solidFill>
+              <a:effectLst/>
+              <a:latin typeface="Consolas" panose="020B0609020204030204" pitchFamily="49" charset="0"/>
+            </a:endParaRPr>
+          </a:p>
+        </p:txBody>
+      </p:sp>
+      <p:sp>
+        <p:nvSpPr>
+          <p:cNvPr id="9" name="TextBox 8">
+            <a:extLst>
+              <a:ext uri="{FF2B5EF4-FFF2-40B4-BE49-F238E27FC236}">
+                <a16:creationId xmlns:a16="http://schemas.microsoft.com/office/drawing/2014/main" id="{149E3223-D72A-F746-277B-E48CA946122A}"/>
+              </a:ext>
+            </a:extLst>
+          </p:cNvPr>
+          <p:cNvSpPr txBox="1"/>
+          <p:nvPr/>
+        </p:nvSpPr>
+        <p:spPr>
+          <a:xfrm>
+            <a:off x="5568570" y="4531103"/>
+            <a:ext cx="1315934" cy="369332"/>
+          </a:xfrm>
+          <a:prstGeom prst="rect">
+            <a:avLst/>
+          </a:prstGeom>
+        </p:spPr>
+        <p:style>
+          <a:lnRef idx="2">
+            <a:schemeClr val="accent1"/>
+          </a:lnRef>
+          <a:fillRef idx="1">
+            <a:schemeClr val="lt1"/>
+          </a:fillRef>
+          <a:effectRef idx="0">
+            <a:schemeClr val="accent1"/>
+          </a:effectRef>
+          <a:fontRef idx="minor">
+            <a:schemeClr val="dk1"/>
+          </a:fontRef>
+        </p:style>
+        <p:txBody>
+          <a:bodyPr wrap="square" rtlCol="0">
+            <a:spAutoFit/>
+          </a:bodyPr>
+          <a:lstStyle/>
+          <a:p>
+            <a:pPr algn="ctr"/>
+            <a:r>
+              <a:rPr lang="en-US" dirty="0"/>
+              <a:t>&lt;Footer /&gt;</a:t>
+            </a:r>
+            <a:endParaRPr lang="ru-RU" dirty="0"/>
+          </a:p>
+        </p:txBody>
+      </p:sp>
+      <p:sp>
+        <p:nvSpPr>
+          <p:cNvPr id="10" name="TextBox 9">
+            <a:extLst>
+              <a:ext uri="{FF2B5EF4-FFF2-40B4-BE49-F238E27FC236}">
+                <a16:creationId xmlns:a16="http://schemas.microsoft.com/office/drawing/2014/main" id="{7324D25F-3F9B-D4C2-00B6-203189BEAB3E}"/>
+              </a:ext>
+            </a:extLst>
+          </p:cNvPr>
+          <p:cNvSpPr txBox="1"/>
+          <p:nvPr/>
+        </p:nvSpPr>
+        <p:spPr>
+          <a:xfrm>
+            <a:off x="6488929" y="3644440"/>
+            <a:ext cx="1656515" cy="369332"/>
+          </a:xfrm>
+          <a:prstGeom prst="rect">
+            <a:avLst/>
+          </a:prstGeom>
+        </p:spPr>
+        <p:style>
+          <a:lnRef idx="2">
+            <a:schemeClr val="accent1"/>
+          </a:lnRef>
+          <a:fillRef idx="1">
+            <a:schemeClr val="lt1"/>
+          </a:fillRef>
+          <a:effectRef idx="0">
+            <a:schemeClr val="accent1"/>
+          </a:effectRef>
+          <a:fontRef idx="minor">
+            <a:schemeClr val="dk1"/>
+          </a:fontRef>
+        </p:style>
+        <p:txBody>
+          <a:bodyPr wrap="square" rtlCol="0">
+            <a:spAutoFit/>
+          </a:bodyPr>
+          <a:lstStyle/>
+          <a:p>
+            <a:pPr algn="ctr"/>
+            <a:r>
+              <a:rPr lang="en-US" dirty="0"/>
+              <a:t>Components</a:t>
+            </a:r>
+            <a:endParaRPr lang="ru-RU" dirty="0"/>
+          </a:p>
+        </p:txBody>
+      </p:sp>
+      <p:sp>
+        <p:nvSpPr>
+          <p:cNvPr id="11" name="TextBox 10">
+            <a:extLst>
+              <a:ext uri="{FF2B5EF4-FFF2-40B4-BE49-F238E27FC236}">
+                <a16:creationId xmlns:a16="http://schemas.microsoft.com/office/drawing/2014/main" id="{0AD5D19E-B371-4318-02B5-9763513E6A1D}"/>
+              </a:ext>
+            </a:extLst>
+          </p:cNvPr>
+          <p:cNvSpPr txBox="1"/>
+          <p:nvPr/>
+        </p:nvSpPr>
+        <p:spPr>
+          <a:xfrm>
+            <a:off x="6330565" y="5725526"/>
+            <a:ext cx="1656515" cy="369332"/>
+          </a:xfrm>
+          <a:prstGeom prst="rect">
+            <a:avLst/>
+          </a:prstGeom>
+        </p:spPr>
+        <p:style>
+          <a:lnRef idx="2">
+            <a:schemeClr val="accent1"/>
+          </a:lnRef>
+          <a:fillRef idx="1">
+            <a:schemeClr val="lt1"/>
+          </a:fillRef>
+          <a:effectRef idx="0">
+            <a:schemeClr val="accent1"/>
+          </a:effectRef>
+          <a:fontRef idx="minor">
+            <a:schemeClr val="dk1"/>
+          </a:fontRef>
+        </p:style>
+        <p:txBody>
+          <a:bodyPr wrap="square" rtlCol="0">
+            <a:spAutoFit/>
+          </a:bodyPr>
+          <a:lstStyle/>
+          <a:p>
+            <a:pPr algn="ctr"/>
+            <a:r>
+              <a:rPr lang="en-US" dirty="0"/>
+              <a:t>Pages</a:t>
+            </a:r>
+            <a:endParaRPr lang="ru-RU" dirty="0"/>
+          </a:p>
+        </p:txBody>
+      </p:sp>
+      <p:cxnSp>
+        <p:nvCxnSpPr>
+          <p:cNvPr id="13" name="Прямая со стрелкой 12">
+            <a:extLst>
+              <a:ext uri="{FF2B5EF4-FFF2-40B4-BE49-F238E27FC236}">
+                <a16:creationId xmlns:a16="http://schemas.microsoft.com/office/drawing/2014/main" id="{49F8C886-8CB8-5E76-D5EB-D0BD5849E884}"/>
+              </a:ext>
+            </a:extLst>
+          </p:cNvPr>
+          <p:cNvCxnSpPr>
+            <a:cxnSpLocks/>
+            <a:endCxn id="5" idx="0"/>
+          </p:cNvCxnSpPr>
+          <p:nvPr/>
+        </p:nvCxnSpPr>
+        <p:spPr>
+          <a:xfrm>
+            <a:off x="7248941" y="1872128"/>
+            <a:ext cx="1331" cy="220386"/>
+          </a:xfrm>
+          <a:prstGeom prst="straightConnector1">
+            <a:avLst/>
+          </a:prstGeom>
+          <a:ln>
+            <a:tailEnd type="triangle"/>
+          </a:ln>
+        </p:spPr>
+        <p:style>
+          <a:lnRef idx="1">
+            <a:schemeClr val="accent1"/>
+          </a:lnRef>
+          <a:fillRef idx="0">
+            <a:schemeClr val="accent1"/>
+          </a:fillRef>
+          <a:effectRef idx="0">
+            <a:schemeClr val="accent1"/>
+          </a:effectRef>
+          <a:fontRef idx="minor">
+            <a:schemeClr val="tx1"/>
+          </a:fontRef>
+        </p:style>
+      </p:cxnSp>
+      <p:cxnSp>
+        <p:nvCxnSpPr>
+          <p:cNvPr id="14" name="Прямая со стрелкой 13">
+            <a:extLst>
+              <a:ext uri="{FF2B5EF4-FFF2-40B4-BE49-F238E27FC236}">
+                <a16:creationId xmlns:a16="http://schemas.microsoft.com/office/drawing/2014/main" id="{F0FEE40E-62DB-1F31-AE30-5DC65489B89F}"/>
+              </a:ext>
+            </a:extLst>
+          </p:cNvPr>
+          <p:cNvCxnSpPr/>
+          <p:nvPr/>
+        </p:nvCxnSpPr>
+        <p:spPr>
+          <a:xfrm>
+            <a:off x="7258220" y="2477752"/>
+            <a:ext cx="1331" cy="220386"/>
+          </a:xfrm>
+          <a:prstGeom prst="straightConnector1">
+            <a:avLst/>
+          </a:prstGeom>
+          <a:ln>
+            <a:tailEnd type="triangle"/>
+          </a:ln>
+        </p:spPr>
+        <p:style>
+          <a:lnRef idx="1">
+            <a:schemeClr val="accent1"/>
+          </a:lnRef>
+          <a:fillRef idx="0">
+            <a:schemeClr val="accent1"/>
+          </a:fillRef>
+          <a:effectRef idx="0">
+            <a:schemeClr val="accent1"/>
+          </a:effectRef>
+          <a:fontRef idx="minor">
+            <a:schemeClr val="tx1"/>
+          </a:fontRef>
+        </p:style>
+      </p:cxnSp>
+      <p:cxnSp>
+        <p:nvCxnSpPr>
+          <p:cNvPr id="15" name="Прямая со стрелкой 14">
+            <a:extLst>
+              <a:ext uri="{FF2B5EF4-FFF2-40B4-BE49-F238E27FC236}">
+                <a16:creationId xmlns:a16="http://schemas.microsoft.com/office/drawing/2014/main" id="{C6FD266F-6C3A-68F8-821F-B62F40F36E48}"/>
+              </a:ext>
+            </a:extLst>
+          </p:cNvPr>
+          <p:cNvCxnSpPr>
+            <a:cxnSpLocks/>
+            <a:stCxn id="6" idx="2"/>
+            <a:endCxn id="10" idx="0"/>
+          </p:cNvCxnSpPr>
+          <p:nvPr/>
+        </p:nvCxnSpPr>
+        <p:spPr>
+          <a:xfrm flipH="1">
+            <a:off x="7317187" y="3400135"/>
+            <a:ext cx="1" cy="244305"/>
+          </a:xfrm>
+          <a:prstGeom prst="straightConnector1">
+            <a:avLst/>
+          </a:prstGeom>
+          <a:ln>
+            <a:tailEnd type="triangle"/>
+          </a:ln>
+        </p:spPr>
+        <p:style>
+          <a:lnRef idx="1">
+            <a:schemeClr val="accent1"/>
+          </a:lnRef>
+          <a:fillRef idx="0">
+            <a:schemeClr val="accent1"/>
+          </a:fillRef>
+          <a:effectRef idx="0">
+            <a:schemeClr val="accent1"/>
+          </a:effectRef>
+          <a:fontRef idx="minor">
+            <a:schemeClr val="tx1"/>
+          </a:fontRef>
+        </p:style>
+      </p:cxnSp>
+      <p:cxnSp>
+        <p:nvCxnSpPr>
+          <p:cNvPr id="19" name="Прямая со стрелкой 18">
+            <a:extLst>
+              <a:ext uri="{FF2B5EF4-FFF2-40B4-BE49-F238E27FC236}">
+                <a16:creationId xmlns:a16="http://schemas.microsoft.com/office/drawing/2014/main" id="{F6AD63E0-8362-E9DE-B1F2-AB83DF299BAF}"/>
+              </a:ext>
+            </a:extLst>
+          </p:cNvPr>
+          <p:cNvCxnSpPr>
+            <a:cxnSpLocks/>
+            <a:stCxn id="8" idx="1"/>
+            <a:endCxn id="11" idx="0"/>
+          </p:cNvCxnSpPr>
+          <p:nvPr/>
+        </p:nvCxnSpPr>
+        <p:spPr>
+          <a:xfrm flipH="1">
+            <a:off x="7158823" y="4992768"/>
+            <a:ext cx="274318" cy="732758"/>
+          </a:xfrm>
+          <a:prstGeom prst="straightConnector1">
+            <a:avLst/>
+          </a:prstGeom>
+          <a:ln>
+            <a:tailEnd type="triangle"/>
+          </a:ln>
+        </p:spPr>
+        <p:style>
+          <a:lnRef idx="1">
+            <a:schemeClr val="accent1"/>
+          </a:lnRef>
+          <a:fillRef idx="0">
+            <a:schemeClr val="accent1"/>
+          </a:fillRef>
+          <a:effectRef idx="0">
+            <a:schemeClr val="accent1"/>
+          </a:effectRef>
+          <a:fontRef idx="minor">
+            <a:schemeClr val="tx1"/>
+          </a:fontRef>
+        </p:style>
+      </p:cxnSp>
+      <p:cxnSp>
+        <p:nvCxnSpPr>
+          <p:cNvPr id="22" name="Прямая со стрелкой 21">
+            <a:extLst>
+              <a:ext uri="{FF2B5EF4-FFF2-40B4-BE49-F238E27FC236}">
+                <a16:creationId xmlns:a16="http://schemas.microsoft.com/office/drawing/2014/main" id="{3E0788DF-E13C-544F-9E0D-1CAD2F38628C}"/>
+              </a:ext>
+            </a:extLst>
+          </p:cNvPr>
+          <p:cNvCxnSpPr>
+            <a:cxnSpLocks/>
+            <a:stCxn id="10" idx="2"/>
+            <a:endCxn id="7" idx="0"/>
+          </p:cNvCxnSpPr>
+          <p:nvPr/>
+        </p:nvCxnSpPr>
+        <p:spPr>
+          <a:xfrm flipH="1">
+            <a:off x="4641586" y="4013772"/>
+            <a:ext cx="2675601" cy="517331"/>
+          </a:xfrm>
+          <a:prstGeom prst="straightConnector1">
+            <a:avLst/>
+          </a:prstGeom>
+          <a:ln>
+            <a:tailEnd type="triangle"/>
+          </a:ln>
+        </p:spPr>
+        <p:style>
+          <a:lnRef idx="1">
+            <a:schemeClr val="accent1"/>
+          </a:lnRef>
+          <a:fillRef idx="0">
+            <a:schemeClr val="accent1"/>
+          </a:fillRef>
+          <a:effectRef idx="0">
+            <a:schemeClr val="accent1"/>
+          </a:effectRef>
+          <a:fontRef idx="minor">
+            <a:schemeClr val="tx1"/>
+          </a:fontRef>
+        </p:style>
+      </p:cxnSp>
+      <p:cxnSp>
+        <p:nvCxnSpPr>
+          <p:cNvPr id="25" name="Прямая со стрелкой 24">
+            <a:extLst>
+              <a:ext uri="{FF2B5EF4-FFF2-40B4-BE49-F238E27FC236}">
+                <a16:creationId xmlns:a16="http://schemas.microsoft.com/office/drawing/2014/main" id="{471B19FE-3298-9398-7ADD-85F4FB22B0FD}"/>
+              </a:ext>
+            </a:extLst>
+          </p:cNvPr>
+          <p:cNvCxnSpPr>
+            <a:cxnSpLocks/>
+            <a:stCxn id="10" idx="2"/>
+            <a:endCxn id="9" idx="0"/>
+          </p:cNvCxnSpPr>
+          <p:nvPr/>
+        </p:nvCxnSpPr>
+        <p:spPr>
+          <a:xfrm flipH="1">
+            <a:off x="6226537" y="4013772"/>
+            <a:ext cx="1090650" cy="517331"/>
+          </a:xfrm>
+          <a:prstGeom prst="straightConnector1">
+            <a:avLst/>
+          </a:prstGeom>
+          <a:ln>
+            <a:tailEnd type="triangle"/>
+          </a:ln>
+        </p:spPr>
+        <p:style>
+          <a:lnRef idx="1">
+            <a:schemeClr val="accent1"/>
+          </a:lnRef>
+          <a:fillRef idx="0">
+            <a:schemeClr val="accent1"/>
+          </a:fillRef>
+          <a:effectRef idx="0">
+            <a:schemeClr val="accent1"/>
+          </a:effectRef>
+          <a:fontRef idx="minor">
+            <a:schemeClr val="tx1"/>
+          </a:fontRef>
+        </p:style>
+      </p:cxnSp>
+      <p:sp>
+        <p:nvSpPr>
+          <p:cNvPr id="39" name="TextBox 38">
+            <a:extLst>
+              <a:ext uri="{FF2B5EF4-FFF2-40B4-BE49-F238E27FC236}">
+                <a16:creationId xmlns:a16="http://schemas.microsoft.com/office/drawing/2014/main" id="{D4D94474-6CDA-CAB2-1385-826235736900}"/>
+              </a:ext>
+            </a:extLst>
+          </p:cNvPr>
+          <p:cNvSpPr txBox="1"/>
+          <p:nvPr/>
+        </p:nvSpPr>
+        <p:spPr>
+          <a:xfrm>
+            <a:off x="8452238" y="5681490"/>
+            <a:ext cx="1783737" cy="923330"/>
+          </a:xfrm>
+          <a:prstGeom prst="rect">
+            <a:avLst/>
+          </a:prstGeom>
+        </p:spPr>
+        <p:style>
+          <a:lnRef idx="2">
+            <a:schemeClr val="accent1"/>
+          </a:lnRef>
+          <a:fillRef idx="1">
+            <a:schemeClr val="lt1"/>
+          </a:fillRef>
+          <a:effectRef idx="0">
+            <a:schemeClr val="accent1"/>
+          </a:effectRef>
+          <a:fontRef idx="minor">
+            <a:schemeClr val="dk1"/>
+          </a:fontRef>
+        </p:style>
+        <p:txBody>
+          <a:bodyPr wrap="square" rtlCol="0">
+            <a:spAutoFit/>
+          </a:bodyPr>
+          <a:lstStyle/>
+          <a:p>
+            <a:pPr algn="ctr"/>
+            <a:r>
+              <a:rPr lang="en-US" dirty="0">
+                <a:solidFill>
+                  <a:schemeClr val="tx1"/>
+                </a:solidFill>
+                <a:latin typeface="Consolas" panose="020B0609020204030204" pitchFamily="49" charset="0"/>
+              </a:rPr>
+              <a:t>&lt;</a:t>
+            </a:r>
+            <a:r>
+              <a:rPr lang="en-US" b="0" dirty="0" err="1">
+                <a:solidFill>
+                  <a:schemeClr val="tx1"/>
+                </a:solidFill>
+                <a:effectLst/>
+                <a:latin typeface="Consolas" panose="020B0609020204030204" pitchFamily="49" charset="0"/>
+              </a:rPr>
+              <a:t>MyClinic</a:t>
+            </a:r>
+            <a:r>
+              <a:rPr lang="en-US" b="0" dirty="0">
+                <a:solidFill>
+                  <a:schemeClr val="tx1"/>
+                </a:solidFill>
+                <a:effectLst/>
+                <a:latin typeface="Consolas" panose="020B0609020204030204" pitchFamily="49" charset="0"/>
+              </a:rPr>
+              <a:t> /&gt;</a:t>
+            </a:r>
+          </a:p>
+          <a:p>
+            <a:pPr algn="ctr"/>
+            <a:r>
+              <a:rPr lang="en-US" dirty="0">
+                <a:solidFill>
+                  <a:schemeClr val="tx1"/>
+                </a:solidFill>
+                <a:latin typeface="Consolas" panose="020B0609020204030204" pitchFamily="49" charset="0"/>
+              </a:rPr>
+              <a:t>&lt;</a:t>
+            </a:r>
+            <a:r>
+              <a:rPr lang="en-US" b="0" dirty="0">
+                <a:solidFill>
+                  <a:schemeClr val="tx1"/>
+                </a:solidFill>
+                <a:effectLst/>
+                <a:latin typeface="Consolas" panose="020B0609020204030204" pitchFamily="49" charset="0"/>
+              </a:rPr>
+              <a:t>Claims /&gt;</a:t>
+            </a:r>
+          </a:p>
+          <a:p>
+            <a:pPr algn="ctr"/>
+            <a:r>
+              <a:rPr lang="en-US" dirty="0"/>
+              <a:t>…</a:t>
+            </a:r>
+            <a:endParaRPr lang="ru-RU" dirty="0"/>
+          </a:p>
+        </p:txBody>
+      </p:sp>
+      <p:cxnSp>
+        <p:nvCxnSpPr>
+          <p:cNvPr id="49" name="Прямая со стрелкой 48">
+            <a:extLst>
+              <a:ext uri="{FF2B5EF4-FFF2-40B4-BE49-F238E27FC236}">
+                <a16:creationId xmlns:a16="http://schemas.microsoft.com/office/drawing/2014/main" id="{5584B274-3141-068F-7183-3F0819B08A9E}"/>
+              </a:ext>
+            </a:extLst>
+          </p:cNvPr>
+          <p:cNvCxnSpPr>
+            <a:cxnSpLocks/>
+            <a:stCxn id="10" idx="2"/>
+            <a:endCxn id="8" idx="0"/>
+          </p:cNvCxnSpPr>
+          <p:nvPr/>
+        </p:nvCxnSpPr>
+        <p:spPr>
+          <a:xfrm>
+            <a:off x="7317187" y="4013772"/>
+            <a:ext cx="1958003" cy="517331"/>
+          </a:xfrm>
+          <a:prstGeom prst="straightConnector1">
+            <a:avLst/>
+          </a:prstGeom>
+          <a:ln>
+            <a:tailEnd type="triangle"/>
+          </a:ln>
+        </p:spPr>
+        <p:style>
+          <a:lnRef idx="1">
+            <a:schemeClr val="accent1"/>
+          </a:lnRef>
+          <a:fillRef idx="0">
+            <a:schemeClr val="accent1"/>
+          </a:fillRef>
+          <a:effectRef idx="0">
+            <a:schemeClr val="accent1"/>
+          </a:effectRef>
+          <a:fontRef idx="minor">
+            <a:schemeClr val="tx1"/>
+          </a:fontRef>
+        </p:style>
+      </p:cxnSp>
+      <p:cxnSp>
+        <p:nvCxnSpPr>
+          <p:cNvPr id="33" name="Прямая со стрелкой 32">
+            <a:extLst>
+              <a:ext uri="{FF2B5EF4-FFF2-40B4-BE49-F238E27FC236}">
+                <a16:creationId xmlns:a16="http://schemas.microsoft.com/office/drawing/2014/main" id="{D3A87899-AAA5-DD8B-45C3-56862AF8FF6A}"/>
+              </a:ext>
+            </a:extLst>
+          </p:cNvPr>
+          <p:cNvCxnSpPr>
+            <a:cxnSpLocks/>
+            <a:stCxn id="11" idx="3"/>
+          </p:cNvCxnSpPr>
+          <p:nvPr/>
+        </p:nvCxnSpPr>
+        <p:spPr>
+          <a:xfrm>
+            <a:off x="7987080" y="5910192"/>
+            <a:ext cx="465158" cy="76539"/>
+          </a:xfrm>
+          <a:prstGeom prst="straightConnector1">
+            <a:avLst/>
+          </a:prstGeom>
+          <a:ln>
+            <a:tailEnd type="triangle"/>
+          </a:ln>
+        </p:spPr>
+        <p:style>
+          <a:lnRef idx="1">
+            <a:schemeClr val="accent1"/>
+          </a:lnRef>
+          <a:fillRef idx="0">
+            <a:schemeClr val="accent1"/>
+          </a:fillRef>
+          <a:effectRef idx="0">
+            <a:schemeClr val="accent1"/>
+          </a:effectRef>
+          <a:fontRef idx="minor">
+            <a:schemeClr val="tx1"/>
+          </a:fontRef>
+        </p:style>
+      </p:cxnSp>
+      <p:sp>
+        <p:nvSpPr>
+          <p:cNvPr id="2" name="TextBox 1">
+            <a:extLst>
+              <a:ext uri="{FF2B5EF4-FFF2-40B4-BE49-F238E27FC236}">
+                <a16:creationId xmlns:a16="http://schemas.microsoft.com/office/drawing/2014/main" id="{D91FA4F4-9D4F-976C-F5F4-E47A4A404A3C}"/>
+              </a:ext>
+            </a:extLst>
+          </p:cNvPr>
+          <p:cNvSpPr txBox="1"/>
+          <p:nvPr/>
+        </p:nvSpPr>
+        <p:spPr>
+          <a:xfrm>
+            <a:off x="581893" y="647880"/>
+            <a:ext cx="2025170" cy="2031325"/>
+          </a:xfrm>
+          <a:prstGeom prst="rect">
+            <a:avLst/>
+          </a:prstGeom>
+        </p:spPr>
+        <p:style>
+          <a:lnRef idx="2">
+            <a:schemeClr val="accent2"/>
+          </a:lnRef>
+          <a:fillRef idx="1">
+            <a:schemeClr val="lt1"/>
+          </a:fillRef>
+          <a:effectRef idx="0">
+            <a:schemeClr val="accent2"/>
+          </a:effectRef>
+          <a:fontRef idx="minor">
+            <a:schemeClr val="dk1"/>
+          </a:fontRef>
+        </p:style>
+        <p:txBody>
+          <a:bodyPr wrap="none" rtlCol="0">
+            <a:spAutoFit/>
+          </a:bodyPr>
+          <a:lstStyle/>
+          <a:p>
+            <a:r>
+              <a:rPr lang="ru-RU" b="1" dirty="0"/>
+              <a:t>Бизнес</a:t>
+            </a:r>
+          </a:p>
+          <a:p>
+            <a:r>
+              <a:rPr lang="ru-RU" b="1" dirty="0"/>
+              <a:t>(данные и логика)</a:t>
+            </a:r>
+            <a:endParaRPr lang="en-US" b="1" dirty="0"/>
+          </a:p>
+          <a:p>
+            <a:endParaRPr lang="en-US" b="1" dirty="0"/>
+          </a:p>
+          <a:p>
+            <a:r>
+              <a:rPr lang="en-US" b="1" dirty="0"/>
+              <a:t>DATA &amp; Functions</a:t>
+            </a:r>
+          </a:p>
+          <a:p>
+            <a:r>
+              <a:rPr lang="en-US" dirty="0" err="1"/>
+              <a:t>navItems</a:t>
+            </a:r>
+            <a:r>
+              <a:rPr lang="en-US" dirty="0"/>
+              <a:t>, </a:t>
+            </a:r>
+          </a:p>
+          <a:p>
+            <a:r>
+              <a:rPr lang="en-US" dirty="0" err="1"/>
+              <a:t>JSONForMyClinics</a:t>
+            </a:r>
+            <a:r>
+              <a:rPr lang="en-US" dirty="0"/>
+              <a:t>,</a:t>
+            </a:r>
+          </a:p>
+          <a:p>
+            <a:r>
+              <a:rPr lang="en-US" dirty="0"/>
+              <a:t>…..</a:t>
+            </a:r>
+            <a:endParaRPr lang="ru-RU" dirty="0"/>
+          </a:p>
+        </p:txBody>
+      </p:sp>
+      <p:cxnSp>
+        <p:nvCxnSpPr>
+          <p:cNvPr id="47" name="Прямая соединительная линия 46">
+            <a:extLst>
+              <a:ext uri="{FF2B5EF4-FFF2-40B4-BE49-F238E27FC236}">
+                <a16:creationId xmlns:a16="http://schemas.microsoft.com/office/drawing/2014/main" id="{7C5D7128-B259-949C-8C0A-2DC0E1C04B82}"/>
+              </a:ext>
+            </a:extLst>
+          </p:cNvPr>
+          <p:cNvCxnSpPr/>
+          <p:nvPr/>
+        </p:nvCxnSpPr>
+        <p:spPr>
+          <a:xfrm flipV="1">
+            <a:off x="1264259" y="365760"/>
+            <a:ext cx="5224670" cy="5997895"/>
+          </a:xfrm>
+          <a:prstGeom prst="line">
+            <a:avLst/>
+          </a:prstGeom>
+        </p:spPr>
+        <p:style>
+          <a:lnRef idx="1">
+            <a:schemeClr val="accent1"/>
+          </a:lnRef>
+          <a:fillRef idx="0">
+            <a:schemeClr val="accent1"/>
+          </a:fillRef>
+          <a:effectRef idx="0">
+            <a:schemeClr val="accent1"/>
+          </a:effectRef>
+          <a:fontRef idx="minor">
+            <a:schemeClr val="tx1"/>
+          </a:fontRef>
+        </p:style>
+      </p:cxnSp>
+    </p:spTree>
+    <p:extLst>
+      <p:ext uri="{BB962C8B-B14F-4D97-AF65-F5344CB8AC3E}">
+        <p14:creationId xmlns:p14="http://schemas.microsoft.com/office/powerpoint/2010/main" val="476156720"/>
+      </p:ext>
+    </p:extLst>
+  </p:cSld>
+  <p:clrMapOvr>
+    <a:masterClrMapping/>
+  </p:clrMapOvr>
+</p:sld>
+</file>
+
+<file path=ppt/slides/slide4.xml><?xml version="1.0" encoding="utf-8"?>
+<p:sld xmlns:a="http://schemas.openxmlformats.org/drawingml/2006/main" xmlns:r="http://schemas.openxmlformats.org/officeDocument/2006/relationships" xmlns:p="http://schemas.openxmlformats.org/presentationml/2006/main">
+  <p:cSld>
+    <p:spTree>
+      <p:nvGrpSpPr>
+        <p:cNvPr id="1" name=""/>
+        <p:cNvGrpSpPr/>
+        <p:nvPr/>
+      </p:nvGrpSpPr>
+      <p:grpSpPr>
+        <a:xfrm>
+          <a:off x="0" y="0"/>
+          <a:ext cx="0" cy="0"/>
+          <a:chOff x="0" y="0"/>
+          <a:chExt cx="0" cy="0"/>
+        </a:xfrm>
+      </p:grpSpPr>
+      <p:sp>
+        <p:nvSpPr>
+          <p:cNvPr id="4" name="TextBox 3">
+            <a:extLst>
+              <a:ext uri="{FF2B5EF4-FFF2-40B4-BE49-F238E27FC236}">
+                <a16:creationId xmlns:a16="http://schemas.microsoft.com/office/drawing/2014/main" id="{7E8C3E92-4A98-69F1-71CD-BB379DCC44E1}"/>
+              </a:ext>
+            </a:extLst>
+          </p:cNvPr>
+          <p:cNvSpPr txBox="1"/>
+          <p:nvPr/>
+        </p:nvSpPr>
+        <p:spPr>
+          <a:xfrm>
+            <a:off x="6105609" y="1201878"/>
+            <a:ext cx="2201186" cy="646331"/>
+          </a:xfrm>
+          <a:prstGeom prst="rect">
+            <a:avLst/>
+          </a:prstGeom>
+        </p:spPr>
+        <p:style>
+          <a:lnRef idx="2">
+            <a:schemeClr val="accent2"/>
+          </a:lnRef>
+          <a:fillRef idx="1">
+            <a:schemeClr val="lt1"/>
+          </a:fillRef>
+          <a:effectRef idx="0">
+            <a:schemeClr val="accent2"/>
+          </a:effectRef>
+          <a:fontRef idx="minor">
+            <a:schemeClr val="dk1"/>
+          </a:fontRef>
+        </p:style>
+        <p:txBody>
+          <a:bodyPr wrap="square" rtlCol="0">
+            <a:spAutoFit/>
+          </a:bodyPr>
+          <a:lstStyle/>
+          <a:p>
+            <a:pPr algn="ctr"/>
+            <a:r>
+              <a:rPr lang="en-US" b="1" dirty="0"/>
+              <a:t>UI (</a:t>
+            </a:r>
+            <a:r>
+              <a:rPr lang="ru-RU" b="1" dirty="0"/>
+              <a:t>интерфейс)</a:t>
+            </a:r>
+          </a:p>
+          <a:p>
+            <a:pPr algn="ctr"/>
+            <a:r>
+              <a:rPr lang="en-US" dirty="0"/>
+              <a:t>Index.js</a:t>
+            </a:r>
+            <a:endParaRPr lang="ru-RU" dirty="0"/>
+          </a:p>
+        </p:txBody>
+      </p:sp>
+      <p:sp>
+        <p:nvSpPr>
+          <p:cNvPr id="5" name="TextBox 4">
+            <a:extLst>
+              <a:ext uri="{FF2B5EF4-FFF2-40B4-BE49-F238E27FC236}">
+                <a16:creationId xmlns:a16="http://schemas.microsoft.com/office/drawing/2014/main" id="{8531AF70-F13D-C913-613F-2D0CE8822ACA}"/>
+              </a:ext>
+            </a:extLst>
+          </p:cNvPr>
+          <p:cNvSpPr txBox="1"/>
+          <p:nvPr/>
+        </p:nvSpPr>
+        <p:spPr>
+          <a:xfrm>
+            <a:off x="6801023" y="2092514"/>
+            <a:ext cx="898497" cy="369332"/>
+          </a:xfrm>
+          <a:prstGeom prst="rect">
+            <a:avLst/>
+          </a:prstGeom>
+        </p:spPr>
+        <p:style>
+          <a:lnRef idx="2">
+            <a:schemeClr val="accent1"/>
+          </a:lnRef>
+          <a:fillRef idx="1">
+            <a:schemeClr val="lt1"/>
+          </a:fillRef>
+          <a:effectRef idx="0">
+            <a:schemeClr val="accent1"/>
+          </a:effectRef>
+          <a:fontRef idx="minor">
+            <a:schemeClr val="dk1"/>
+          </a:fontRef>
+        </p:style>
+        <p:txBody>
+          <a:bodyPr wrap="square" rtlCol="0">
+            <a:spAutoFit/>
+          </a:bodyPr>
+          <a:lstStyle/>
+          <a:p>
+            <a:pPr algn="ctr"/>
+            <a:r>
+              <a:rPr lang="en-US" dirty="0"/>
+              <a:t>App.js</a:t>
+            </a:r>
+            <a:endParaRPr lang="ru-RU" dirty="0"/>
+          </a:p>
+        </p:txBody>
+      </p:sp>
+      <p:sp>
+        <p:nvSpPr>
+          <p:cNvPr id="6" name="TextBox 5">
+            <a:extLst>
+              <a:ext uri="{FF2B5EF4-FFF2-40B4-BE49-F238E27FC236}">
+                <a16:creationId xmlns:a16="http://schemas.microsoft.com/office/drawing/2014/main" id="{F9434637-765B-E1DC-F463-472B4643BA8D}"/>
+              </a:ext>
+            </a:extLst>
+          </p:cNvPr>
+          <p:cNvSpPr txBox="1"/>
+          <p:nvPr/>
+        </p:nvSpPr>
+        <p:spPr>
+          <a:xfrm>
+            <a:off x="5156423" y="2753804"/>
+            <a:ext cx="4321529" cy="646331"/>
+          </a:xfrm>
+          <a:prstGeom prst="rect">
+            <a:avLst/>
+          </a:prstGeom>
+        </p:spPr>
+        <p:style>
+          <a:lnRef idx="2">
+            <a:schemeClr val="accent1"/>
+          </a:lnRef>
+          <a:fillRef idx="1">
+            <a:schemeClr val="lt1"/>
+          </a:fillRef>
+          <a:effectRef idx="0">
+            <a:schemeClr val="accent1"/>
+          </a:effectRef>
+          <a:fontRef idx="minor">
+            <a:schemeClr val="dk1"/>
+          </a:fontRef>
+        </p:style>
+        <p:txBody>
+          <a:bodyPr wrap="square" rtlCol="0">
+            <a:spAutoFit/>
+          </a:bodyPr>
+          <a:lstStyle/>
+          <a:p>
+            <a:pPr algn="ctr"/>
+            <a:r>
+              <a:rPr lang="en-US" b="0" dirty="0">
+                <a:solidFill>
+                  <a:srgbClr val="4EC9B0"/>
+                </a:solidFill>
+                <a:effectLst/>
+                <a:latin typeface="Consolas" panose="020B0609020204030204" pitchFamily="49" charset="0"/>
+              </a:rPr>
+              <a:t>&lt;</a:t>
+            </a:r>
+            <a:r>
+              <a:rPr lang="en-US" b="0" dirty="0" err="1">
+                <a:solidFill>
+                  <a:srgbClr val="4EC9B0"/>
+                </a:solidFill>
+                <a:effectLst/>
+                <a:latin typeface="Consolas" panose="020B0609020204030204" pitchFamily="49" charset="0"/>
+              </a:rPr>
+              <a:t>BrowserRouter</a:t>
+            </a:r>
+            <a:r>
+              <a:rPr lang="en-US" b="0" dirty="0">
+                <a:solidFill>
+                  <a:srgbClr val="4EC9B0"/>
+                </a:solidFill>
+                <a:effectLst/>
+                <a:latin typeface="Consolas" panose="020B0609020204030204" pitchFamily="49" charset="0"/>
+              </a:rPr>
+              <a:t>&gt;</a:t>
+            </a:r>
+          </a:p>
+          <a:p>
+            <a:pPr algn="ctr"/>
+            <a:r>
+              <a:rPr lang="en-US" b="0" dirty="0">
+                <a:solidFill>
+                  <a:srgbClr val="808080"/>
+                </a:solidFill>
+                <a:effectLst/>
+                <a:latin typeface="Consolas" panose="020B0609020204030204" pitchFamily="49" charset="0"/>
+              </a:rPr>
+              <a:t>&lt;</a:t>
+            </a:r>
+            <a:r>
+              <a:rPr lang="en-US" b="0" dirty="0">
+                <a:solidFill>
+                  <a:srgbClr val="569CD6"/>
+                </a:solidFill>
+                <a:effectLst/>
+                <a:latin typeface="Consolas" panose="020B0609020204030204" pitchFamily="49" charset="0"/>
+              </a:rPr>
+              <a:t>div</a:t>
+            </a:r>
+            <a:r>
+              <a:rPr lang="en-US" b="0" dirty="0">
+                <a:solidFill>
+                  <a:srgbClr val="CCCCCC"/>
+                </a:solidFill>
+                <a:effectLst/>
+                <a:latin typeface="Consolas" panose="020B0609020204030204" pitchFamily="49" charset="0"/>
+              </a:rPr>
+              <a:t> </a:t>
+            </a:r>
+            <a:r>
+              <a:rPr lang="en-US" b="0" dirty="0" err="1">
+                <a:solidFill>
+                  <a:srgbClr val="9CDCFE"/>
+                </a:solidFill>
+                <a:effectLst/>
+                <a:latin typeface="Consolas" panose="020B0609020204030204" pitchFamily="49" charset="0"/>
+              </a:rPr>
+              <a:t>className</a:t>
+            </a:r>
+            <a:r>
+              <a:rPr lang="en-US" b="0" dirty="0">
+                <a:solidFill>
+                  <a:srgbClr val="D4D4D4"/>
+                </a:solidFill>
+                <a:effectLst/>
+                <a:latin typeface="Consolas" panose="020B0609020204030204" pitchFamily="49" charset="0"/>
+              </a:rPr>
+              <a:t>=</a:t>
+            </a:r>
+            <a:r>
+              <a:rPr lang="en-US" b="0" dirty="0">
+                <a:solidFill>
+                  <a:srgbClr val="CE9178"/>
+                </a:solidFill>
+                <a:effectLst/>
+                <a:latin typeface="Consolas" panose="020B0609020204030204" pitchFamily="49" charset="0"/>
+              </a:rPr>
+              <a:t>"app-wrapper"</a:t>
+            </a:r>
+            <a:r>
+              <a:rPr lang="en-US" b="0" dirty="0">
+                <a:solidFill>
+                  <a:srgbClr val="808080"/>
+                </a:solidFill>
+                <a:effectLst/>
+                <a:latin typeface="Consolas" panose="020B0609020204030204" pitchFamily="49" charset="0"/>
+              </a:rPr>
+              <a:t>&gt;</a:t>
+            </a:r>
+            <a:endParaRPr lang="en-US" b="0" dirty="0">
+              <a:solidFill>
+                <a:srgbClr val="CCCCCC"/>
+              </a:solidFill>
+              <a:effectLst/>
+              <a:latin typeface="Consolas" panose="020B0609020204030204" pitchFamily="49" charset="0"/>
+            </a:endParaRPr>
+          </a:p>
+        </p:txBody>
+      </p:sp>
+      <p:sp>
+        <p:nvSpPr>
+          <p:cNvPr id="7" name="TextBox 6">
+            <a:extLst>
+              <a:ext uri="{FF2B5EF4-FFF2-40B4-BE49-F238E27FC236}">
+                <a16:creationId xmlns:a16="http://schemas.microsoft.com/office/drawing/2014/main" id="{C4E4581A-943E-3F07-D7B3-487175FDD70D}"/>
+              </a:ext>
+            </a:extLst>
+          </p:cNvPr>
+          <p:cNvSpPr txBox="1"/>
+          <p:nvPr/>
+        </p:nvSpPr>
+        <p:spPr>
+          <a:xfrm>
+            <a:off x="3983619" y="4531103"/>
+            <a:ext cx="1315934" cy="369332"/>
+          </a:xfrm>
+          <a:prstGeom prst="rect">
+            <a:avLst/>
+          </a:prstGeom>
+        </p:spPr>
+        <p:style>
+          <a:lnRef idx="2">
+            <a:schemeClr val="accent1"/>
+          </a:lnRef>
+          <a:fillRef idx="1">
+            <a:schemeClr val="lt1"/>
+          </a:fillRef>
+          <a:effectRef idx="0">
+            <a:schemeClr val="accent1"/>
+          </a:effectRef>
+          <a:fontRef idx="minor">
+            <a:schemeClr val="dk1"/>
+          </a:fontRef>
+        </p:style>
+        <p:txBody>
+          <a:bodyPr wrap="square" rtlCol="0">
+            <a:spAutoFit/>
+          </a:bodyPr>
+          <a:lstStyle/>
+          <a:p>
+            <a:pPr algn="ctr"/>
+            <a:r>
+              <a:rPr lang="en-US" dirty="0"/>
+              <a:t>&lt;Header /&gt;</a:t>
+            </a:r>
+            <a:endParaRPr lang="ru-RU" dirty="0"/>
+          </a:p>
+        </p:txBody>
+      </p:sp>
+      <p:sp>
+        <p:nvSpPr>
+          <p:cNvPr id="8" name="TextBox 7">
+            <a:extLst>
+              <a:ext uri="{FF2B5EF4-FFF2-40B4-BE49-F238E27FC236}">
+                <a16:creationId xmlns:a16="http://schemas.microsoft.com/office/drawing/2014/main" id="{09C7CD4A-5623-A969-D88D-4792EEF52F9A}"/>
+              </a:ext>
+            </a:extLst>
+          </p:cNvPr>
+          <p:cNvSpPr txBox="1"/>
+          <p:nvPr/>
+        </p:nvSpPr>
+        <p:spPr>
+          <a:xfrm>
+            <a:off x="7433141" y="4531103"/>
+            <a:ext cx="3684098" cy="923330"/>
+          </a:xfrm>
+          <a:prstGeom prst="rect">
+            <a:avLst/>
+          </a:prstGeom>
+        </p:spPr>
+        <p:style>
+          <a:lnRef idx="2">
+            <a:schemeClr val="accent1"/>
+          </a:lnRef>
+          <a:fillRef idx="1">
+            <a:schemeClr val="lt1"/>
+          </a:fillRef>
+          <a:effectRef idx="0">
+            <a:schemeClr val="accent1"/>
+          </a:effectRef>
+          <a:fontRef idx="minor">
+            <a:schemeClr val="dk1"/>
+          </a:fontRef>
+        </p:style>
+        <p:txBody>
+          <a:bodyPr wrap="square" rtlCol="0">
+            <a:spAutoFit/>
+          </a:bodyPr>
+          <a:lstStyle/>
+          <a:p>
+            <a:pPr algn="ctr"/>
+            <a:r>
+              <a:rPr lang="en-US" b="0" dirty="0">
+                <a:solidFill>
+                  <a:schemeClr val="tx1"/>
+                </a:solidFill>
+                <a:effectLst/>
+                <a:latin typeface="Consolas" panose="020B0609020204030204" pitchFamily="49" charset="0"/>
+              </a:rPr>
+              <a:t>Pages</a:t>
+            </a:r>
+            <a:endParaRPr lang="ru-RU" b="0" dirty="0">
+              <a:solidFill>
+                <a:schemeClr val="tx1"/>
+              </a:solidFill>
+              <a:effectLst/>
+              <a:latin typeface="Consolas" panose="020B0609020204030204" pitchFamily="49" charset="0"/>
+            </a:endParaRPr>
+          </a:p>
+          <a:p>
+            <a:pPr algn="ctr"/>
+            <a:r>
+              <a:rPr lang="en-US" b="0" dirty="0">
+                <a:solidFill>
+                  <a:srgbClr val="808080"/>
+                </a:solidFill>
+                <a:effectLst/>
+                <a:latin typeface="Consolas" panose="020B0609020204030204" pitchFamily="49" charset="0"/>
+              </a:rPr>
+              <a:t>&lt;</a:t>
+            </a:r>
+            <a:r>
+              <a:rPr lang="en-US" b="0" dirty="0">
+                <a:solidFill>
+                  <a:srgbClr val="569CD6"/>
+                </a:solidFill>
+                <a:effectLst/>
+                <a:latin typeface="Consolas" panose="020B0609020204030204" pitchFamily="49" charset="0"/>
+              </a:rPr>
+              <a:t>div</a:t>
+            </a:r>
+            <a:r>
+              <a:rPr lang="en-US" b="0" dirty="0">
+                <a:solidFill>
+                  <a:srgbClr val="CCCCCC"/>
+                </a:solidFill>
+                <a:effectLst/>
+                <a:latin typeface="Consolas" panose="020B0609020204030204" pitchFamily="49" charset="0"/>
+              </a:rPr>
+              <a:t> </a:t>
+            </a:r>
+            <a:r>
+              <a:rPr lang="en-US" b="0" dirty="0" err="1">
+                <a:solidFill>
+                  <a:srgbClr val="9CDCFE"/>
+                </a:solidFill>
+                <a:effectLst/>
+                <a:latin typeface="Consolas" panose="020B0609020204030204" pitchFamily="49" charset="0"/>
+              </a:rPr>
+              <a:t>className</a:t>
+            </a:r>
+            <a:r>
+              <a:rPr lang="en-US" b="0" dirty="0">
+                <a:solidFill>
+                  <a:srgbClr val="D4D4D4"/>
+                </a:solidFill>
+                <a:effectLst/>
+                <a:latin typeface="Consolas" panose="020B0609020204030204" pitchFamily="49" charset="0"/>
+              </a:rPr>
+              <a:t>=</a:t>
+            </a:r>
+            <a:r>
+              <a:rPr lang="en-US" b="0" dirty="0">
+                <a:solidFill>
+                  <a:srgbClr val="CE9178"/>
+                </a:solidFill>
+                <a:effectLst/>
+                <a:latin typeface="Consolas" panose="020B0609020204030204" pitchFamily="49" charset="0"/>
+              </a:rPr>
+              <a:t>"content"</a:t>
+            </a:r>
+            <a:r>
+              <a:rPr lang="en-US" b="0" dirty="0">
+                <a:solidFill>
+                  <a:srgbClr val="808080"/>
+                </a:solidFill>
+                <a:effectLst/>
+                <a:latin typeface="Consolas" panose="020B0609020204030204" pitchFamily="49" charset="0"/>
+              </a:rPr>
+              <a:t>&gt;</a:t>
+            </a:r>
+          </a:p>
+          <a:p>
+            <a:pPr algn="ctr"/>
+            <a:r>
+              <a:rPr lang="en-US" b="0" dirty="0">
+                <a:solidFill>
+                  <a:srgbClr val="808080"/>
+                </a:solidFill>
+                <a:effectLst/>
+                <a:latin typeface="Consolas" panose="020B0609020204030204" pitchFamily="49" charset="0"/>
+              </a:rPr>
+              <a:t>&lt;</a:t>
+            </a:r>
+            <a:r>
+              <a:rPr lang="en-US" b="0" dirty="0">
+                <a:solidFill>
+                  <a:srgbClr val="4EC9B0"/>
+                </a:solidFill>
+                <a:effectLst/>
+                <a:latin typeface="Consolas" panose="020B0609020204030204" pitchFamily="49" charset="0"/>
+              </a:rPr>
+              <a:t>Routes</a:t>
+            </a:r>
+            <a:r>
+              <a:rPr lang="en-US" b="0" dirty="0">
+                <a:solidFill>
+                  <a:srgbClr val="808080"/>
+                </a:solidFill>
+                <a:effectLst/>
+                <a:latin typeface="Consolas" panose="020B0609020204030204" pitchFamily="49" charset="0"/>
+              </a:rPr>
+              <a:t>&gt;</a:t>
+            </a:r>
+            <a:endParaRPr lang="en-US" b="0" dirty="0">
+              <a:solidFill>
+                <a:srgbClr val="CCCCCC"/>
+              </a:solidFill>
+              <a:effectLst/>
+              <a:latin typeface="Consolas" panose="020B0609020204030204" pitchFamily="49" charset="0"/>
+            </a:endParaRPr>
+          </a:p>
+        </p:txBody>
+      </p:sp>
+      <p:sp>
+        <p:nvSpPr>
+          <p:cNvPr id="9" name="TextBox 8">
+            <a:extLst>
+              <a:ext uri="{FF2B5EF4-FFF2-40B4-BE49-F238E27FC236}">
+                <a16:creationId xmlns:a16="http://schemas.microsoft.com/office/drawing/2014/main" id="{149E3223-D72A-F746-277B-E48CA946122A}"/>
+              </a:ext>
+            </a:extLst>
+          </p:cNvPr>
+          <p:cNvSpPr txBox="1"/>
+          <p:nvPr/>
+        </p:nvSpPr>
+        <p:spPr>
+          <a:xfrm>
+            <a:off x="5568570" y="4531103"/>
+            <a:ext cx="1315934" cy="369332"/>
+          </a:xfrm>
+          <a:prstGeom prst="rect">
+            <a:avLst/>
+          </a:prstGeom>
+        </p:spPr>
+        <p:style>
+          <a:lnRef idx="2">
+            <a:schemeClr val="accent1"/>
+          </a:lnRef>
+          <a:fillRef idx="1">
+            <a:schemeClr val="lt1"/>
+          </a:fillRef>
+          <a:effectRef idx="0">
+            <a:schemeClr val="accent1"/>
+          </a:effectRef>
+          <a:fontRef idx="minor">
+            <a:schemeClr val="dk1"/>
+          </a:fontRef>
+        </p:style>
+        <p:txBody>
+          <a:bodyPr wrap="square" rtlCol="0">
+            <a:spAutoFit/>
+          </a:bodyPr>
+          <a:lstStyle/>
+          <a:p>
+            <a:pPr algn="ctr"/>
+            <a:r>
+              <a:rPr lang="en-US" dirty="0"/>
+              <a:t>&lt;Footer /&gt;</a:t>
+            </a:r>
+            <a:endParaRPr lang="ru-RU" dirty="0"/>
+          </a:p>
+        </p:txBody>
+      </p:sp>
+      <p:sp>
+        <p:nvSpPr>
+          <p:cNvPr id="10" name="TextBox 9">
+            <a:extLst>
+              <a:ext uri="{FF2B5EF4-FFF2-40B4-BE49-F238E27FC236}">
+                <a16:creationId xmlns:a16="http://schemas.microsoft.com/office/drawing/2014/main" id="{7324D25F-3F9B-D4C2-00B6-203189BEAB3E}"/>
+              </a:ext>
+            </a:extLst>
+          </p:cNvPr>
+          <p:cNvSpPr txBox="1"/>
+          <p:nvPr/>
+        </p:nvSpPr>
+        <p:spPr>
+          <a:xfrm>
+            <a:off x="6488929" y="3644440"/>
+            <a:ext cx="1656515" cy="369332"/>
+          </a:xfrm>
+          <a:prstGeom prst="rect">
+            <a:avLst/>
+          </a:prstGeom>
+        </p:spPr>
+        <p:style>
+          <a:lnRef idx="2">
+            <a:schemeClr val="accent1"/>
+          </a:lnRef>
+          <a:fillRef idx="1">
+            <a:schemeClr val="lt1"/>
+          </a:fillRef>
+          <a:effectRef idx="0">
+            <a:schemeClr val="accent1"/>
+          </a:effectRef>
+          <a:fontRef idx="minor">
+            <a:schemeClr val="dk1"/>
+          </a:fontRef>
+        </p:style>
+        <p:txBody>
+          <a:bodyPr wrap="square" rtlCol="0">
+            <a:spAutoFit/>
+          </a:bodyPr>
+          <a:lstStyle/>
+          <a:p>
+            <a:pPr algn="ctr"/>
+            <a:r>
+              <a:rPr lang="en-US" dirty="0"/>
+              <a:t>Components</a:t>
+            </a:r>
+            <a:endParaRPr lang="ru-RU" dirty="0"/>
+          </a:p>
+        </p:txBody>
+      </p:sp>
+      <p:sp>
+        <p:nvSpPr>
+          <p:cNvPr id="11" name="TextBox 10">
+            <a:extLst>
+              <a:ext uri="{FF2B5EF4-FFF2-40B4-BE49-F238E27FC236}">
+                <a16:creationId xmlns:a16="http://schemas.microsoft.com/office/drawing/2014/main" id="{0AD5D19E-B371-4318-02B5-9763513E6A1D}"/>
+              </a:ext>
+            </a:extLst>
+          </p:cNvPr>
+          <p:cNvSpPr txBox="1"/>
+          <p:nvPr/>
+        </p:nvSpPr>
+        <p:spPr>
+          <a:xfrm>
+            <a:off x="6330565" y="5725526"/>
+            <a:ext cx="1656515" cy="369332"/>
+          </a:xfrm>
+          <a:prstGeom prst="rect">
+            <a:avLst/>
+          </a:prstGeom>
+        </p:spPr>
+        <p:style>
+          <a:lnRef idx="2">
+            <a:schemeClr val="accent1"/>
+          </a:lnRef>
+          <a:fillRef idx="1">
+            <a:schemeClr val="lt1"/>
+          </a:fillRef>
+          <a:effectRef idx="0">
+            <a:schemeClr val="accent1"/>
+          </a:effectRef>
+          <a:fontRef idx="minor">
+            <a:schemeClr val="dk1"/>
+          </a:fontRef>
+        </p:style>
+        <p:txBody>
+          <a:bodyPr wrap="square" rtlCol="0">
+            <a:spAutoFit/>
+          </a:bodyPr>
+          <a:lstStyle/>
+          <a:p>
+            <a:pPr algn="ctr"/>
+            <a:r>
+              <a:rPr lang="en-US" dirty="0"/>
+              <a:t>Pages</a:t>
+            </a:r>
+            <a:endParaRPr lang="ru-RU" dirty="0"/>
+          </a:p>
+        </p:txBody>
+      </p:sp>
+      <p:cxnSp>
+        <p:nvCxnSpPr>
+          <p:cNvPr id="13" name="Прямая со стрелкой 12">
+            <a:extLst>
+              <a:ext uri="{FF2B5EF4-FFF2-40B4-BE49-F238E27FC236}">
+                <a16:creationId xmlns:a16="http://schemas.microsoft.com/office/drawing/2014/main" id="{49F8C886-8CB8-5E76-D5EB-D0BD5849E884}"/>
+              </a:ext>
+            </a:extLst>
+          </p:cNvPr>
+          <p:cNvCxnSpPr>
+            <a:cxnSpLocks/>
+            <a:endCxn id="5" idx="0"/>
+          </p:cNvCxnSpPr>
+          <p:nvPr/>
+        </p:nvCxnSpPr>
+        <p:spPr>
+          <a:xfrm>
+            <a:off x="7248941" y="1872128"/>
+            <a:ext cx="1331" cy="220386"/>
+          </a:xfrm>
+          <a:prstGeom prst="straightConnector1">
+            <a:avLst/>
+          </a:prstGeom>
+          <a:ln>
+            <a:tailEnd type="triangle"/>
+          </a:ln>
+        </p:spPr>
+        <p:style>
+          <a:lnRef idx="1">
+            <a:schemeClr val="accent1"/>
+          </a:lnRef>
+          <a:fillRef idx="0">
+            <a:schemeClr val="accent1"/>
+          </a:fillRef>
+          <a:effectRef idx="0">
+            <a:schemeClr val="accent1"/>
+          </a:effectRef>
+          <a:fontRef idx="minor">
+            <a:schemeClr val="tx1"/>
+          </a:fontRef>
+        </p:style>
+      </p:cxnSp>
+      <p:cxnSp>
+        <p:nvCxnSpPr>
+          <p:cNvPr id="14" name="Прямая со стрелкой 13">
+            <a:extLst>
+              <a:ext uri="{FF2B5EF4-FFF2-40B4-BE49-F238E27FC236}">
+                <a16:creationId xmlns:a16="http://schemas.microsoft.com/office/drawing/2014/main" id="{F0FEE40E-62DB-1F31-AE30-5DC65489B89F}"/>
+              </a:ext>
+            </a:extLst>
+          </p:cNvPr>
+          <p:cNvCxnSpPr/>
+          <p:nvPr/>
+        </p:nvCxnSpPr>
+        <p:spPr>
+          <a:xfrm>
+            <a:off x="7258220" y="2477752"/>
+            <a:ext cx="1331" cy="220386"/>
+          </a:xfrm>
+          <a:prstGeom prst="straightConnector1">
+            <a:avLst/>
+          </a:prstGeom>
+          <a:ln>
+            <a:tailEnd type="triangle"/>
+          </a:ln>
+        </p:spPr>
+        <p:style>
+          <a:lnRef idx="1">
+            <a:schemeClr val="accent1"/>
+          </a:lnRef>
+          <a:fillRef idx="0">
+            <a:schemeClr val="accent1"/>
+          </a:fillRef>
+          <a:effectRef idx="0">
+            <a:schemeClr val="accent1"/>
+          </a:effectRef>
+          <a:fontRef idx="minor">
+            <a:schemeClr val="tx1"/>
+          </a:fontRef>
+        </p:style>
+      </p:cxnSp>
+      <p:cxnSp>
+        <p:nvCxnSpPr>
+          <p:cNvPr id="15" name="Прямая со стрелкой 14">
+            <a:extLst>
+              <a:ext uri="{FF2B5EF4-FFF2-40B4-BE49-F238E27FC236}">
+                <a16:creationId xmlns:a16="http://schemas.microsoft.com/office/drawing/2014/main" id="{C6FD266F-6C3A-68F8-821F-B62F40F36E48}"/>
+              </a:ext>
+            </a:extLst>
+          </p:cNvPr>
+          <p:cNvCxnSpPr>
+            <a:cxnSpLocks/>
+            <a:stCxn id="6" idx="2"/>
+            <a:endCxn id="10" idx="0"/>
+          </p:cNvCxnSpPr>
+          <p:nvPr/>
+        </p:nvCxnSpPr>
+        <p:spPr>
+          <a:xfrm flipH="1">
+            <a:off x="7317187" y="3400135"/>
+            <a:ext cx="1" cy="244305"/>
+          </a:xfrm>
+          <a:prstGeom prst="straightConnector1">
+            <a:avLst/>
+          </a:prstGeom>
+          <a:ln>
+            <a:tailEnd type="triangle"/>
+          </a:ln>
+        </p:spPr>
+        <p:style>
+          <a:lnRef idx="1">
+            <a:schemeClr val="accent1"/>
+          </a:lnRef>
+          <a:fillRef idx="0">
+            <a:schemeClr val="accent1"/>
+          </a:fillRef>
+          <a:effectRef idx="0">
+            <a:schemeClr val="accent1"/>
+          </a:effectRef>
+          <a:fontRef idx="minor">
+            <a:schemeClr val="tx1"/>
+          </a:fontRef>
+        </p:style>
+      </p:cxnSp>
+      <p:cxnSp>
+        <p:nvCxnSpPr>
+          <p:cNvPr id="19" name="Прямая со стрелкой 18">
+            <a:extLst>
+              <a:ext uri="{FF2B5EF4-FFF2-40B4-BE49-F238E27FC236}">
+                <a16:creationId xmlns:a16="http://schemas.microsoft.com/office/drawing/2014/main" id="{F6AD63E0-8362-E9DE-B1F2-AB83DF299BAF}"/>
+              </a:ext>
+            </a:extLst>
+          </p:cNvPr>
+          <p:cNvCxnSpPr>
+            <a:cxnSpLocks/>
+            <a:stCxn id="8" idx="1"/>
+            <a:endCxn id="11" idx="0"/>
+          </p:cNvCxnSpPr>
+          <p:nvPr/>
+        </p:nvCxnSpPr>
+        <p:spPr>
+          <a:xfrm flipH="1">
+            <a:off x="7158823" y="4992768"/>
+            <a:ext cx="274318" cy="732758"/>
+          </a:xfrm>
+          <a:prstGeom prst="straightConnector1">
+            <a:avLst/>
+          </a:prstGeom>
+          <a:ln>
+            <a:tailEnd type="triangle"/>
+          </a:ln>
+        </p:spPr>
+        <p:style>
+          <a:lnRef idx="1">
+            <a:schemeClr val="accent1"/>
+          </a:lnRef>
+          <a:fillRef idx="0">
+            <a:schemeClr val="accent1"/>
+          </a:fillRef>
+          <a:effectRef idx="0">
+            <a:schemeClr val="accent1"/>
+          </a:effectRef>
+          <a:fontRef idx="minor">
+            <a:schemeClr val="tx1"/>
+          </a:fontRef>
+        </p:style>
+      </p:cxnSp>
+      <p:cxnSp>
+        <p:nvCxnSpPr>
+          <p:cNvPr id="22" name="Прямая со стрелкой 21">
+            <a:extLst>
+              <a:ext uri="{FF2B5EF4-FFF2-40B4-BE49-F238E27FC236}">
+                <a16:creationId xmlns:a16="http://schemas.microsoft.com/office/drawing/2014/main" id="{3E0788DF-E13C-544F-9E0D-1CAD2F38628C}"/>
+              </a:ext>
+            </a:extLst>
+          </p:cNvPr>
+          <p:cNvCxnSpPr>
+            <a:cxnSpLocks/>
+            <a:stCxn id="10" idx="2"/>
+            <a:endCxn id="7" idx="0"/>
+          </p:cNvCxnSpPr>
+          <p:nvPr/>
+        </p:nvCxnSpPr>
+        <p:spPr>
+          <a:xfrm flipH="1">
+            <a:off x="4641586" y="4013772"/>
+            <a:ext cx="2675601" cy="517331"/>
+          </a:xfrm>
+          <a:prstGeom prst="straightConnector1">
+            <a:avLst/>
+          </a:prstGeom>
+          <a:ln>
+            <a:tailEnd type="triangle"/>
+          </a:ln>
+        </p:spPr>
+        <p:style>
+          <a:lnRef idx="1">
+            <a:schemeClr val="accent1"/>
+          </a:lnRef>
+          <a:fillRef idx="0">
+            <a:schemeClr val="accent1"/>
+          </a:fillRef>
+          <a:effectRef idx="0">
+            <a:schemeClr val="accent1"/>
+          </a:effectRef>
+          <a:fontRef idx="minor">
+            <a:schemeClr val="tx1"/>
+          </a:fontRef>
+        </p:style>
+      </p:cxnSp>
+      <p:cxnSp>
+        <p:nvCxnSpPr>
+          <p:cNvPr id="25" name="Прямая со стрелкой 24">
+            <a:extLst>
+              <a:ext uri="{FF2B5EF4-FFF2-40B4-BE49-F238E27FC236}">
+                <a16:creationId xmlns:a16="http://schemas.microsoft.com/office/drawing/2014/main" id="{471B19FE-3298-9398-7ADD-85F4FB22B0FD}"/>
+              </a:ext>
+            </a:extLst>
+          </p:cNvPr>
+          <p:cNvCxnSpPr>
+            <a:cxnSpLocks/>
+            <a:stCxn id="10" idx="2"/>
+            <a:endCxn id="9" idx="0"/>
+          </p:cNvCxnSpPr>
+          <p:nvPr/>
+        </p:nvCxnSpPr>
+        <p:spPr>
+          <a:xfrm flipH="1">
+            <a:off x="6226537" y="4013772"/>
+            <a:ext cx="1090650" cy="517331"/>
+          </a:xfrm>
+          <a:prstGeom prst="straightConnector1">
+            <a:avLst/>
+          </a:prstGeom>
+          <a:ln>
+            <a:tailEnd type="triangle"/>
+          </a:ln>
+        </p:spPr>
+        <p:style>
+          <a:lnRef idx="1">
+            <a:schemeClr val="accent1"/>
+          </a:lnRef>
+          <a:fillRef idx="0">
+            <a:schemeClr val="accent1"/>
+          </a:fillRef>
+          <a:effectRef idx="0">
+            <a:schemeClr val="accent1"/>
+          </a:effectRef>
+          <a:fontRef idx="minor">
+            <a:schemeClr val="tx1"/>
+          </a:fontRef>
+        </p:style>
+      </p:cxnSp>
+      <p:sp>
+        <p:nvSpPr>
+          <p:cNvPr id="39" name="TextBox 38">
+            <a:extLst>
+              <a:ext uri="{FF2B5EF4-FFF2-40B4-BE49-F238E27FC236}">
+                <a16:creationId xmlns:a16="http://schemas.microsoft.com/office/drawing/2014/main" id="{D4D94474-6CDA-CAB2-1385-826235736900}"/>
+              </a:ext>
+            </a:extLst>
+          </p:cNvPr>
+          <p:cNvSpPr txBox="1"/>
+          <p:nvPr/>
+        </p:nvSpPr>
+        <p:spPr>
+          <a:xfrm>
+            <a:off x="8452238" y="5681490"/>
+            <a:ext cx="1783737" cy="923330"/>
+          </a:xfrm>
+          <a:prstGeom prst="rect">
+            <a:avLst/>
+          </a:prstGeom>
+        </p:spPr>
+        <p:style>
+          <a:lnRef idx="2">
+            <a:schemeClr val="accent1"/>
+          </a:lnRef>
+          <a:fillRef idx="1">
+            <a:schemeClr val="lt1"/>
+          </a:fillRef>
+          <a:effectRef idx="0">
+            <a:schemeClr val="accent1"/>
+          </a:effectRef>
+          <a:fontRef idx="minor">
+            <a:schemeClr val="dk1"/>
+          </a:fontRef>
+        </p:style>
+        <p:txBody>
+          <a:bodyPr wrap="square" rtlCol="0">
+            <a:spAutoFit/>
+          </a:bodyPr>
+          <a:lstStyle/>
+          <a:p>
+            <a:pPr algn="ctr"/>
+            <a:r>
+              <a:rPr lang="en-US" dirty="0">
+                <a:solidFill>
+                  <a:schemeClr val="tx1"/>
+                </a:solidFill>
+                <a:latin typeface="Consolas" panose="020B0609020204030204" pitchFamily="49" charset="0"/>
+              </a:rPr>
+              <a:t>&lt;</a:t>
+            </a:r>
+            <a:r>
+              <a:rPr lang="en-US" b="0" dirty="0" err="1">
+                <a:solidFill>
+                  <a:schemeClr val="tx1"/>
+                </a:solidFill>
+                <a:effectLst/>
+                <a:latin typeface="Consolas" panose="020B0609020204030204" pitchFamily="49" charset="0"/>
+              </a:rPr>
+              <a:t>MyClinic</a:t>
+            </a:r>
+            <a:r>
+              <a:rPr lang="en-US" b="0" dirty="0">
+                <a:solidFill>
+                  <a:schemeClr val="tx1"/>
+                </a:solidFill>
+                <a:effectLst/>
+                <a:latin typeface="Consolas" panose="020B0609020204030204" pitchFamily="49" charset="0"/>
+              </a:rPr>
+              <a:t> /&gt;</a:t>
+            </a:r>
+          </a:p>
+          <a:p>
+            <a:pPr algn="ctr"/>
+            <a:r>
+              <a:rPr lang="en-US" dirty="0">
+                <a:solidFill>
+                  <a:schemeClr val="tx1"/>
+                </a:solidFill>
+                <a:latin typeface="Consolas" panose="020B0609020204030204" pitchFamily="49" charset="0"/>
+              </a:rPr>
+              <a:t>&lt;</a:t>
+            </a:r>
+            <a:r>
+              <a:rPr lang="en-US" b="0" dirty="0">
+                <a:solidFill>
+                  <a:schemeClr val="tx1"/>
+                </a:solidFill>
+                <a:effectLst/>
+                <a:latin typeface="Consolas" panose="020B0609020204030204" pitchFamily="49" charset="0"/>
+              </a:rPr>
+              <a:t>Claims /&gt;</a:t>
+            </a:r>
+          </a:p>
+          <a:p>
+            <a:pPr algn="ctr"/>
+            <a:r>
+              <a:rPr lang="en-US" dirty="0"/>
+              <a:t>…</a:t>
+            </a:r>
+            <a:endParaRPr lang="ru-RU" dirty="0"/>
+          </a:p>
+        </p:txBody>
+      </p:sp>
+      <p:cxnSp>
+        <p:nvCxnSpPr>
+          <p:cNvPr id="49" name="Прямая со стрелкой 48">
+            <a:extLst>
+              <a:ext uri="{FF2B5EF4-FFF2-40B4-BE49-F238E27FC236}">
+                <a16:creationId xmlns:a16="http://schemas.microsoft.com/office/drawing/2014/main" id="{5584B274-3141-068F-7183-3F0819B08A9E}"/>
+              </a:ext>
+            </a:extLst>
+          </p:cNvPr>
+          <p:cNvCxnSpPr>
+            <a:cxnSpLocks/>
+            <a:stCxn id="10" idx="2"/>
+            <a:endCxn id="8" idx="0"/>
+          </p:cNvCxnSpPr>
+          <p:nvPr/>
+        </p:nvCxnSpPr>
+        <p:spPr>
+          <a:xfrm>
+            <a:off x="7317187" y="4013772"/>
+            <a:ext cx="1958003" cy="517331"/>
+          </a:xfrm>
+          <a:prstGeom prst="straightConnector1">
+            <a:avLst/>
+          </a:prstGeom>
+          <a:ln>
+            <a:tailEnd type="triangle"/>
+          </a:ln>
+        </p:spPr>
+        <p:style>
+          <a:lnRef idx="1">
+            <a:schemeClr val="accent1"/>
+          </a:lnRef>
+          <a:fillRef idx="0">
+            <a:schemeClr val="accent1"/>
+          </a:fillRef>
+          <a:effectRef idx="0">
+            <a:schemeClr val="accent1"/>
+          </a:effectRef>
+          <a:fontRef idx="minor">
+            <a:schemeClr val="tx1"/>
+          </a:fontRef>
+        </p:style>
+      </p:cxnSp>
+      <p:cxnSp>
+        <p:nvCxnSpPr>
+          <p:cNvPr id="33" name="Прямая со стрелкой 32">
+            <a:extLst>
+              <a:ext uri="{FF2B5EF4-FFF2-40B4-BE49-F238E27FC236}">
+                <a16:creationId xmlns:a16="http://schemas.microsoft.com/office/drawing/2014/main" id="{D3A87899-AAA5-DD8B-45C3-56862AF8FF6A}"/>
+              </a:ext>
+            </a:extLst>
+          </p:cNvPr>
+          <p:cNvCxnSpPr>
+            <a:cxnSpLocks/>
+            <a:stCxn id="11" idx="3"/>
+          </p:cNvCxnSpPr>
+          <p:nvPr/>
+        </p:nvCxnSpPr>
+        <p:spPr>
+          <a:xfrm>
+            <a:off x="7987080" y="5910192"/>
+            <a:ext cx="465158" cy="76539"/>
+          </a:xfrm>
+          <a:prstGeom prst="straightConnector1">
+            <a:avLst/>
+          </a:prstGeom>
+          <a:ln>
+            <a:tailEnd type="triangle"/>
+          </a:ln>
+        </p:spPr>
+        <p:style>
+          <a:lnRef idx="1">
+            <a:schemeClr val="accent1"/>
+          </a:lnRef>
+          <a:fillRef idx="0">
+            <a:schemeClr val="accent1"/>
+          </a:fillRef>
+          <a:effectRef idx="0">
+            <a:schemeClr val="accent1"/>
+          </a:effectRef>
+          <a:fontRef idx="minor">
+            <a:schemeClr val="tx1"/>
+          </a:fontRef>
+        </p:style>
+      </p:cxnSp>
+      <p:sp>
+        <p:nvSpPr>
+          <p:cNvPr id="2" name="TextBox 1">
+            <a:extLst>
+              <a:ext uri="{FF2B5EF4-FFF2-40B4-BE49-F238E27FC236}">
+                <a16:creationId xmlns:a16="http://schemas.microsoft.com/office/drawing/2014/main" id="{D91FA4F4-9D4F-976C-F5F4-E47A4A404A3C}"/>
+              </a:ext>
+            </a:extLst>
+          </p:cNvPr>
+          <p:cNvSpPr txBox="1"/>
+          <p:nvPr/>
+        </p:nvSpPr>
+        <p:spPr>
+          <a:xfrm>
+            <a:off x="581893" y="647880"/>
+            <a:ext cx="2025170" cy="2031325"/>
+          </a:xfrm>
+          <a:prstGeom prst="rect">
+            <a:avLst/>
+          </a:prstGeom>
+        </p:spPr>
+        <p:style>
+          <a:lnRef idx="2">
+            <a:schemeClr val="accent2"/>
+          </a:lnRef>
+          <a:fillRef idx="1">
+            <a:schemeClr val="lt1"/>
+          </a:fillRef>
+          <a:effectRef idx="0">
+            <a:schemeClr val="accent2"/>
+          </a:effectRef>
+          <a:fontRef idx="minor">
+            <a:schemeClr val="dk1"/>
+          </a:fontRef>
+        </p:style>
+        <p:txBody>
+          <a:bodyPr wrap="none" rtlCol="0">
+            <a:spAutoFit/>
+          </a:bodyPr>
+          <a:lstStyle/>
+          <a:p>
+            <a:r>
+              <a:rPr lang="ru-RU" b="1" dirty="0"/>
+              <a:t>Бизнес</a:t>
+            </a:r>
+          </a:p>
+          <a:p>
+            <a:r>
+              <a:rPr lang="ru-RU" b="1" dirty="0"/>
+              <a:t>(данные и логика)</a:t>
+            </a:r>
+            <a:endParaRPr lang="en-US" b="1" dirty="0"/>
+          </a:p>
           <a:p>
             <a:endParaRPr lang="en-US" b="1" dirty="0"/>
           </a:p>
@@ -4516,7 +6530,7 @@
         </p:nvCxnSpPr>
         <p:spPr>
           <a:xfrm>
-            <a:off x="3593990" y="1661823"/>
+            <a:off x="2695494" y="1661823"/>
             <a:ext cx="3283892" cy="1719"/>
           </a:xfrm>
           <a:prstGeom prst="straightConnector1">
@@ -4557,7 +6571,7 @@
         </p:nvCxnSpPr>
         <p:spPr>
           <a:xfrm flipH="1">
-            <a:off x="2928052" y="6452361"/>
+            <a:off x="2029556" y="6452361"/>
             <a:ext cx="6266632" cy="0"/>
           </a:xfrm>
           <a:prstGeom prst="straightConnector1">
@@ -4598,7 +6612,7 @@
         </p:nvCxnSpPr>
         <p:spPr>
           <a:xfrm flipV="1">
-            <a:off x="2898421" y="2862470"/>
+            <a:off x="1999925" y="2862470"/>
             <a:ext cx="0" cy="3501185"/>
           </a:xfrm>
           <a:prstGeom prst="straightConnector1">
@@ -4637,7 +6651,7 @@
         </p:nvSpPr>
         <p:spPr>
           <a:xfrm>
-            <a:off x="3737472" y="1185773"/>
+            <a:off x="2838976" y="1185773"/>
             <a:ext cx="2440027" cy="369332"/>
           </a:xfrm>
           <a:prstGeom prst="rect">
@@ -4672,7 +6686,7 @@
         </p:nvSpPr>
         <p:spPr>
           <a:xfrm>
-            <a:off x="3256657" y="5897118"/>
+            <a:off x="2358161" y="5897118"/>
             <a:ext cx="2493118" cy="369332"/>
           </a:xfrm>
           <a:prstGeom prst="rect">
@@ -4707,7 +6721,7 @@
         </p:nvCxnSpPr>
         <p:spPr>
           <a:xfrm flipV="1">
-            <a:off x="2162755" y="365760"/>
+            <a:off x="1264259" y="365760"/>
             <a:ext cx="5224670" cy="5997895"/>
           </a:xfrm>
           <a:prstGeom prst="line">
@@ -4732,7 +6746,7 @@
     </p:spTree>
     <p:extLst>
       <p:ext uri="{BB962C8B-B14F-4D97-AF65-F5344CB8AC3E}">
-        <p14:creationId xmlns:p14="http://schemas.microsoft.com/office/powerpoint/2010/main" val="381816576"/>
+        <p14:creationId xmlns:p14="http://schemas.microsoft.com/office/powerpoint/2010/main" val="116691653"/>
       </p:ext>
     </p:extLst>
   </p:cSld>

</xml_diff>